<commit_message>
Good first draft of NHCS/seattle-talk
</commit_message>
<xml_diff>
--- a/nhcs/seattle-talk.pptx
+++ b/nhcs/seattle-talk.pptx
@@ -5,7 +5,7 @@
     <p:sldMasterId id="2147483648" r:id="rId1"/>
   </p:sldMasterIdLst>
   <p:notesMasterIdLst>
-    <p:notesMasterId r:id="rId29"/>
+    <p:notesMasterId r:id="rId33"/>
   </p:notesMasterIdLst>
   <p:sldIdLst>
     <p:sldId id="256" r:id="rId2"/>
@@ -35,6 +35,10 @@
     <p:sldId id="280" r:id="rId26"/>
     <p:sldId id="281" r:id="rId27"/>
     <p:sldId id="282" r:id="rId28"/>
+    <p:sldId id="283" r:id="rId29"/>
+    <p:sldId id="284" r:id="rId30"/>
+    <p:sldId id="285" r:id="rId31"/>
+    <p:sldId id="286" r:id="rId32"/>
   </p:sldIdLst>
   <p:sldSz cx="12192000" cy="6858000"/>
   <p:notesSz cx="6858000" cy="9144000"/>
@@ -550,7 +554,7 @@
             </a:pPr>
             <a:r>
               <a:rPr/>
-              <a:t>The CEI Neighborhood Housing Conditions Survey (NHCS) is a windshield survey of residential parcels. The parcel geography and other relevant information was provided by the City of Kansas City, Missouri. The conditions surveyed are those that are visible from the street on which a parcel is addressed. Parcels that are non-residential, both in structure type and use type, are noted as such and no additional information is collected, other than whether or not there is a visible address. The original form of the survey was developed by Ed Linnebur of the Kansas City Neighborhood Alliance, prior to the application of the initial KCMo survey in 2000-01. Detailed documentation for that survey is available in the Final Report for the City of Kansas City Missouri Contract No. 1999-032. That survey was primarily conducted on paper. In subsequent years, data collection was programmed on hand-held PDAs.</a:t>
+              <a:t>Before I start my talk, let me fill you in on my background. I am a data geek, with a PhD in Statistics and a faculty appointment in the Department of Biomedical and Health Informatics. I also have been providing informal consulting with the Center for Economic Information (CEI), a research group with expertise in geographic information systems, economic statistics, and big data. with a long history of working with local communities and governments in the Kansas City metropolitan area.</a:t>
             </a:r>
           </a:p>
         </p:txBody>
@@ -632,7 +636,7 @@
             </a:pPr>
             <a:r>
               <a:rPr/>
-              <a:t>A rating of 5 is the best rating. No wear, no rot, no deterioriation.</a:t>
+              <a:t>Finally, there are ratings for the infrastructure: the public sidewalk, curb, street lighting, catch basin and street.</a:t>
             </a:r>
           </a:p>
         </p:txBody>
@@ -654,7 +658,7 @@
           <a:p>
             <a:fld id="{18BDFEC3-8487-43E8-A154-7C12CBC1FFF2}" type="slidenum">
               <a:rPr lang="en-US"/>
-              <a:t>13</a:t>
+              <a:t>11</a:t>
             </a:fld>
             <a:endParaRPr lang="en-US"/>
           </a:p>
@@ -714,7 +718,7 @@
             </a:pPr>
             <a:r>
               <a:rPr/>
-              <a:t>If there is no structure on the parcel, there is no roof to be rated. This is assigned a code of 6 and this is not used in the overall assessment of housing conditions.</a:t>
+              <a:t>The condition ratings range from 1 to 5 on Likert scale with lower scores indicating more deterioration. A code of 6 is a missing value code for locations where a condition rating is not applicable. A code of 7 is a second missing value code for conditions that could not be rated because of visibility issues.</a:t>
             </a:r>
           </a:p>
         </p:txBody>
@@ -736,7 +740,7 @@
           <a:p>
             <a:fld id="{18BDFEC3-8487-43E8-A154-7C12CBC1FFF2}" type="slidenum">
               <a:rPr lang="en-US"/>
-              <a:t>14</a:t>
+              <a:t>12</a:t>
             </a:fld>
             <a:endParaRPr lang="en-US"/>
           </a:p>
@@ -796,7 +800,21 @@
             </a:pPr>
             <a:r>
               <a:rPr/>
-              <a:t>There’s one more case to consider. Sometimes, you cannot provide a rating because the roof is flat or obscured by trees. This is assigned a code of 7 and this is not used in the overall assessment of housing quality.</a:t>
+              <a:t>I want to show details for one of the fifteen conditions that are rated by the NHCS, so you can see the specificity detailed in this survey.</a:t>
+            </a:r>
+          </a:p>
+          <a:p>
+            <a:pPr lvl="0" indent="0" marL="0">
+              <a:buNone/>
+            </a:pPr>
+          </a:p>
+          <a:p>
+            <a:pPr lvl="0" indent="0" marL="0">
+              <a:buNone/>
+            </a:pPr>
+            <a:r>
+              <a:rPr/>
+              <a:t>For the roof of a structure, the lowest rating, 1, represent severe deterioration. These represent pretty extreme conditions like holes in the roof.</a:t>
             </a:r>
           </a:p>
         </p:txBody>
@@ -818,7 +836,7 @@
           <a:p>
             <a:fld id="{18BDFEC3-8487-43E8-A154-7C12CBC1FFF2}" type="slidenum">
               <a:rPr lang="en-US"/>
-              <a:t>15</a:t>
+              <a:t>13</a:t>
             </a:fld>
             <a:endParaRPr lang="en-US"/>
           </a:p>
@@ -878,21 +896,7 @@
             </a:pPr>
             <a:r>
               <a:rPr/>
-              <a:t>The training starts with a classroom session with visual aids. Then the trainees are taken to a test block, chosen for its representativeness of various levels of deterioration. The trainees join in a group discussion with the instructor on the ratings for individual parcels on this test block.</a:t>
-            </a:r>
-          </a:p>
-          <a:p>
-            <a:pPr lvl="0" indent="0" marL="0">
-              <a:buNone/>
-            </a:pPr>
-          </a:p>
-          <a:p>
-            <a:pPr lvl="0" indent="0" marL="0">
-              <a:buNone/>
-            </a:pPr>
-            <a:r>
-              <a:rPr/>
-              <a:t>Then the trainees examine two more test blocks individually. Their ratings are compared to those of the instructor and if the average deviation in rating is within plus or minus one, the trainees are certified and able to conduct surveys on their own.</a:t>
+              <a:t>The next rating, 2, represent serious deterioration. No holes, thank gooodness, but some visible sagging, and/or missing shingles.</a:t>
             </a:r>
           </a:p>
         </p:txBody>
@@ -914,7 +918,7 @@
           <a:p>
             <a:fld id="{18BDFEC3-8487-43E8-A154-7C12CBC1FFF2}" type="slidenum">
               <a:rPr lang="en-US"/>
-              <a:t>16</a:t>
+              <a:t>14</a:t>
             </a:fld>
             <a:endParaRPr lang="en-US"/>
           </a:p>
@@ -974,7 +978,7 @@
             </a:pPr>
             <a:r>
               <a:rPr/>
-              <a:t>The following quality control procedures are performed. Two blocks with a minimum of 20 residential parcels per block are randomly selected from the survey data for each survey team. These parcels are then inspected by the survey developer/trainer to provide a set of standard results for each parcel. For categorical variables (visible address, structure type, use type, residential type, and structure profile) a direct a comparison is made. For ratings variables, an overall average difference per rating is calculated. This is calculated by taking the absolute value of the difference between the original surveyor rating and the standard rating for each parcel and summing over the total number of parcels surveyed, then dividing that value by the total number of parcels surveyed. In cases where the surveyor rates an item as unrateable (a value of 6) and the standard rating was anything other than unrateable, or vice versa, the rating is not counted in the average. An average difference under one is considered passing, and means that overall the ratings fall within the range of -1 to +1 from the standard rating. Any average difference greater than one is considered as failing.</a:t>
+              <a:t>A rating of 3 represents substandard conditions. This represents a small number of missing shingles or slight rot in soffits and fascia boards.</a:t>
             </a:r>
           </a:p>
         </p:txBody>
@@ -996,7 +1000,7 @@
           <a:p>
             <a:fld id="{18BDFEC3-8487-43E8-A154-7C12CBC1FFF2}" type="slidenum">
               <a:rPr lang="en-US"/>
-              <a:t>17</a:t>
+              <a:t>15</a:t>
             </a:fld>
             <a:endParaRPr lang="en-US"/>
           </a:p>
@@ -1056,21 +1060,7 @@
             </a:pPr>
             <a:r>
               <a:rPr/>
-              <a:t>First, parcel level mapping of residential property conditions is of real interest in its own right, to several major urban and community development constituencies. Conventional CDCs whose principle activity is the development of affordable housing in low-income neighborhoods, city urban planners, neighborhood residents themselves, and a variety of private sector interests including developers, real estate agencies, mortgage bankers, construction contractors, and insurance companies, just to name the most obvious, all have a keen interest in the collection and mapping of residential conditions data.</a:t>
-            </a:r>
-          </a:p>
-          <a:p>
-            <a:pPr lvl="0" indent="0" marL="0">
-              <a:buNone/>
-            </a:pPr>
-          </a:p>
-          <a:p>
-            <a:pPr lvl="0" indent="0" marL="0">
-              <a:buNone/>
-            </a:pPr>
-            <a:r>
-              <a:rPr/>
-              <a:t>The second (arguably even more) important feature of the GPLAN project is that it establishes a methodological framework for geographic community modeling with virtually unlimited potential. The development of a parcel-level geographic database allows the collection and representation of social and economic data at the finest possible level of “social resolution,” i.e., the houshold.5 Higher level social “geographies” (e.g. “blocks” or “neighborhoods” or “communities”) are (more or less) easily added to the household/institution/enterprise-level model. This, of course, includes the conventional social geographies such as low-level census geography (blocks, block groups and tracts), zip codes, school districts, voting districts, cities, counties, and MSAs.6 The database functions of GIS allow the linkage of virtually unlimited datasets to whatever levels of geography for which they may be relevant and available. The implicit role of space and spatial relationships in the study of community development is rendered integral, explicit, and amenable to formal analysis.</a:t>
+              <a:t>A rating of 4 represents slight wear and discoloration.</a:t>
             </a:r>
           </a:p>
         </p:txBody>
@@ -1092,7 +1082,7 @@
           <a:p>
             <a:fld id="{18BDFEC3-8487-43E8-A154-7C12CBC1FFF2}" type="slidenum">
               <a:rPr lang="en-US"/>
-              <a:t>18</a:t>
+              <a:t>16</a:t>
             </a:fld>
             <a:endParaRPr lang="en-US"/>
           </a:p>
@@ -1152,21 +1142,7 @@
             </a:pPr>
             <a:r>
               <a:rPr/>
-              <a:t>This map shows where the NHCS has been used up to 2014. The survey has been largely inactive since then due to budget problems, but we are using the survey again in the current grant we have received from HUD.</a:t>
-            </a:r>
-          </a:p>
-          <a:p>
-            <a:pPr lvl="0" indent="0" marL="0">
-              <a:buNone/>
-            </a:pPr>
-          </a:p>
-          <a:p>
-            <a:pPr lvl="0" indent="0" marL="0">
-              <a:buNone/>
-            </a:pPr>
-            <a:r>
-              <a:rPr/>
-              <a:t>Those of you who know and love Kansas City will notice two important features of this map. First, we have done surveys on both sides of the state line. Second, we have done survey both north and south of the Missouri river.</a:t>
+              <a:t>A rating of 5 is the best rating. No wear, no rot, no deterioriation.</a:t>
             </a:r>
           </a:p>
         </p:txBody>
@@ -1188,7 +1164,7 @@
           <a:p>
             <a:fld id="{18BDFEC3-8487-43E8-A154-7C12CBC1FFF2}" type="slidenum">
               <a:rPr lang="en-US"/>
-              <a:t>19</a:t>
+              <a:t>17</a:t>
             </a:fld>
             <a:endParaRPr lang="en-US"/>
           </a:p>
@@ -1248,35 +1224,7 @@
             </a:pPr>
             <a:r>
               <a:rPr/>
-              <a:t>I worked for quite a few years at Children’s Mercy Hospital and did some great work with various departments at the hospital including the Department of Asthma and Allergy. That group knew that it made no sense to treat serious asthma problems at the hospital and then return the child to an environment that would just create the same problem over and over again. So they set up a program more than two decades ago to help families with home remediation because fixing the environment was the best way to help their asthma patients.</a:t>
-            </a:r>
-          </a:p>
-          <a:p>
-            <a:pPr lvl="0" indent="0" marL="0">
-              <a:buNone/>
-            </a:pPr>
-          </a:p>
-          <a:p>
-            <a:pPr lvl="0" indent="0" marL="0">
-              <a:buNone/>
-            </a:pPr>
-            <a:r>
-              <a:rPr/>
-              <a:t>I’m no longer with Children’s Mercy, but I still collaborate with them on various research studies.</a:t>
-            </a:r>
-          </a:p>
-          <a:p>
-            <a:pPr lvl="0" indent="0" marL="0">
-              <a:buNone/>
-            </a:pPr>
-          </a:p>
-          <a:p>
-            <a:pPr lvl="0" indent="0" marL="0">
-              <a:buNone/>
-            </a:pPr>
-            <a:r>
-              <a:rPr/>
-              <a:t>This is a picture of Natalie Kane. She currently workks at Children’s Mercy, but I knew her from her work on a dissertation that she successfully defended in 2020. She linked the NCHS data with medical records of asthma visits at Children’s Mercy Hospital and additional geographic markers of pollution to establish a link between disparities in home environment and rates of acute pediatric asthma care encounters.</a:t>
+              <a:t>If there is no structure on the parcel, there is no roof to be rated. This is assigned a code of 6 and this is not used in the overall assessment of housing conditions.</a:t>
             </a:r>
           </a:p>
         </p:txBody>
@@ -1298,7 +1246,7 @@
           <a:p>
             <a:fld id="{18BDFEC3-8487-43E8-A154-7C12CBC1FFF2}" type="slidenum">
               <a:rPr lang="en-US"/>
-              <a:t>21</a:t>
+              <a:t>18</a:t>
             </a:fld>
             <a:endParaRPr lang="en-US"/>
           </a:p>
@@ -1358,7 +1306,7 @@
             </a:pPr>
             <a:r>
               <a:rPr/>
-              <a:t>Here’s a picture of Dr. Neal Wilson. Like Natalie Kane, he took NHCS data and linked it to medical records, this time with blood testing data from the Kansas City, Missouri Department of Health. He showed a strong association between housing conditions and elevated blood lead levels in children. He successfully defended his dissertation on this topic in 2021 and has continued his work in this area with the</a:t>
+              <a:t>There’s one more case to consider. Sometimes, you cannot provide a rating because the roof is flat or obscured by trees. This is assigned a code of 7 and this is not used in the overall assessment of housing quality.</a:t>
             </a:r>
           </a:p>
         </p:txBody>
@@ -1380,7 +1328,103 @@
           <a:p>
             <a:fld id="{18BDFEC3-8487-43E8-A154-7C12CBC1FFF2}" type="slidenum">
               <a:rPr lang="en-US"/>
-              <a:t>22</a:t>
+              <a:t>19</a:t>
+            </a:fld>
+            <a:endParaRPr lang="en-US"/>
+          </a:p>
+        </p:txBody>
+      </p:sp>
+    </p:spTree>
+  </p:cSld>
+</p:notes>
+</file>
+
+<file path=ppt/notesSlides/notesSlide19.xml><?xml version="1.0" encoding="utf-8"?>
+<p:notes xmlns:a="http://schemas.openxmlformats.org/drawingml/2006/main" xmlns:r="http://schemas.openxmlformats.org/officeDocument/2006/relationships" xmlns:p="http://schemas.openxmlformats.org/presentationml/2006/main">
+  <p:cSld>
+    <p:spTree>
+      <p:nvGrpSpPr>
+        <p:cNvPr id="1" name=""/>
+        <p:cNvGrpSpPr/>
+        <p:nvPr/>
+      </p:nvGrpSpPr>
+      <p:grpSpPr>
+        <a:xfrm>
+          <a:off x="0" y="0"/>
+          <a:ext cx="0" cy="0"/>
+          <a:chOff x="0" y="0"/>
+          <a:chExt cx="0" cy="0"/>
+        </a:xfrm>
+      </p:grpSpPr>
+      <p:sp>
+        <p:nvSpPr>
+          <p:cNvPr id="2" name="Slide Image Placeholder 1"/>
+          <p:cNvSpPr>
+            <a:spLocks noGrp="1" noRot="1" noChangeAspect="1"/>
+          </p:cNvSpPr>
+          <p:nvPr>
+            <p:ph type="sldImg"/>
+          </p:nvPr>
+        </p:nvSpPr>
+        <p:spPr/>
+      </p:sp>
+      <p:sp>
+        <p:nvSpPr>
+          <p:cNvPr id="3" name="Notes Placeholder 2"/>
+          <p:cNvSpPr>
+            <a:spLocks noGrp="1"/>
+          </p:cNvSpPr>
+          <p:nvPr>
+            <p:ph type="body" idx="1"/>
+          </p:nvPr>
+        </p:nvSpPr>
+        <p:spPr/>
+        <p:txBody>
+          <a:bodyPr/>
+          <a:lstStyle/>
+          <a:p>
+            <a:pPr lvl="0" indent="0" marL="0">
+              <a:buNone/>
+            </a:pPr>
+            <a:r>
+              <a:rPr/>
+              <a:t>The training starts with a classroom session with visual aids. Then the trainees are taken to a test block, chosen for its representativeness of various levels of deterioration. The trainees join in a group discussion with the instructor on the ratings for individual parcels on this test block.</a:t>
+            </a:r>
+          </a:p>
+          <a:p>
+            <a:pPr lvl="0" indent="0" marL="0">
+              <a:buNone/>
+            </a:pPr>
+          </a:p>
+          <a:p>
+            <a:pPr lvl="0" indent="0" marL="0">
+              <a:buNone/>
+            </a:pPr>
+            <a:r>
+              <a:rPr/>
+              <a:t>Then the trainees examine two more test blocks individually. Their ratings are compared to those of the instructor and if the average deviation in rating is within plus or minus one rating point, the trainees are certified and able to conduct surveys on their own.</a:t>
+            </a:r>
+          </a:p>
+        </p:txBody>
+      </p:sp>
+      <p:sp>
+        <p:nvSpPr>
+          <p:cNvPr id="4" name="Slide Number Placeholder 3"/>
+          <p:cNvSpPr>
+            <a:spLocks noGrp="1"/>
+          </p:cNvSpPr>
+          <p:nvPr>
+            <p:ph type="sldNum" sz="quarter" idx="10"/>
+          </p:nvPr>
+        </p:nvSpPr>
+        <p:spPr/>
+        <p:txBody>
+          <a:bodyPr/>
+          <a:lstStyle/>
+          <a:p>
+            <a:fld id="{18BDFEC3-8487-43E8-A154-7C12CBC1FFF2}" type="slidenum">
+              <a:rPr lang="en-US"/>
+              <a:t>20</a:t>
             </a:fld>
             <a:endParaRPr lang="en-US"/>
           </a:p>
@@ -1440,21 +1484,7 @@
             </a:pPr>
             <a:r>
               <a:rPr/>
-              <a:t>The housing survey collects two types of data. It collecting information that classifies the type of structure, its use, whether it is residential, the profile of the structure, and the visible address. It also collects data on 15 housing conditions, groups into conditions about the structure itself, the grounds, and the infrastructure.</a:t>
-            </a:r>
-          </a:p>
-          <a:p>
-            <a:pPr lvl="0" indent="0" marL="0">
-              <a:buNone/>
-            </a:pPr>
-          </a:p>
-          <a:p>
-            <a:pPr lvl="0" indent="0" marL="0">
-              <a:buNone/>
-            </a:pPr>
-            <a:r>
-              <a:rPr/>
-              <a:t>The first type is classification data. The second type is conditions data. Classification data includes structure type, use type, residential type, structure profile, and visible address. For all parcels other than those that are classified as non-residential in both structure type and use type, conditions data is collected. This report will discuss each of the 15 surveyed conditions both individually, and grouped into three general categories of conditions. The groupings and their component elements are listed in Table I-1:</a:t>
+              <a:t>Research is a team sport, and I need to acknowledge my partners in this work at Children’s Mercy Hospital and the Kansas City, Missouri Department of Health.</a:t>
             </a:r>
           </a:p>
         </p:txBody>
@@ -1477,6 +1507,952 @@
             <a:fld id="{18BDFEC3-8487-43E8-A154-7C12CBC1FFF2}" type="slidenum">
               <a:rPr lang="en-US"/>
               <a:t>3</a:t>
+            </a:fld>
+            <a:endParaRPr lang="en-US"/>
+          </a:p>
+        </p:txBody>
+      </p:sp>
+    </p:spTree>
+  </p:cSld>
+</p:notes>
+</file>
+
+<file path=ppt/notesSlides/notesSlide20.xml><?xml version="1.0" encoding="utf-8"?>
+<p:notes xmlns:a="http://schemas.openxmlformats.org/drawingml/2006/main" xmlns:r="http://schemas.openxmlformats.org/officeDocument/2006/relationships" xmlns:p="http://schemas.openxmlformats.org/presentationml/2006/main">
+  <p:cSld>
+    <p:spTree>
+      <p:nvGrpSpPr>
+        <p:cNvPr id="1" name=""/>
+        <p:cNvGrpSpPr/>
+        <p:nvPr/>
+      </p:nvGrpSpPr>
+      <p:grpSpPr>
+        <a:xfrm>
+          <a:off x="0" y="0"/>
+          <a:ext cx="0" cy="0"/>
+          <a:chOff x="0" y="0"/>
+          <a:chExt cx="0" cy="0"/>
+        </a:xfrm>
+      </p:grpSpPr>
+      <p:sp>
+        <p:nvSpPr>
+          <p:cNvPr id="2" name="Slide Image Placeholder 1"/>
+          <p:cNvSpPr>
+            <a:spLocks noGrp="1" noRot="1" noChangeAspect="1"/>
+          </p:cNvSpPr>
+          <p:nvPr>
+            <p:ph type="sldImg"/>
+          </p:nvPr>
+        </p:nvSpPr>
+        <p:spPr/>
+      </p:sp>
+      <p:sp>
+        <p:nvSpPr>
+          <p:cNvPr id="3" name="Notes Placeholder 2"/>
+          <p:cNvSpPr>
+            <a:spLocks noGrp="1"/>
+          </p:cNvSpPr>
+          <p:nvPr>
+            <p:ph type="body" idx="1"/>
+          </p:nvPr>
+        </p:nvSpPr>
+        <p:spPr/>
+        <p:txBody>
+          <a:bodyPr/>
+          <a:lstStyle/>
+          <a:p>
+            <a:pPr lvl="0" indent="0" marL="0">
+              <a:buNone/>
+            </a:pPr>
+            <a:r>
+              <a:rPr/>
+              <a:t>The NHCS has several quality checks built in. First, and most importantly, there are two independent ratings on every parcel. In addition, two blocks are randomly selected and inspected by an expert who compares their results on both the qualitative classification data and the quantitative condition data. The quantitative data must not deviation on average by more than one rating unit on average.</a:t>
+            </a:r>
+          </a:p>
+        </p:txBody>
+      </p:sp>
+      <p:sp>
+        <p:nvSpPr>
+          <p:cNvPr id="4" name="Slide Number Placeholder 3"/>
+          <p:cNvSpPr>
+            <a:spLocks noGrp="1"/>
+          </p:cNvSpPr>
+          <p:nvPr>
+            <p:ph type="sldNum" sz="quarter" idx="10"/>
+          </p:nvPr>
+        </p:nvSpPr>
+        <p:spPr/>
+        <p:txBody>
+          <a:bodyPr/>
+          <a:lstStyle/>
+          <a:p>
+            <a:fld id="{18BDFEC3-8487-43E8-A154-7C12CBC1FFF2}" type="slidenum">
+              <a:rPr lang="en-US"/>
+              <a:t>21</a:t>
+            </a:fld>
+            <a:endParaRPr lang="en-US"/>
+          </a:p>
+        </p:txBody>
+      </p:sp>
+    </p:spTree>
+  </p:cSld>
+</p:notes>
+</file>
+
+<file path=ppt/notesSlides/notesSlide21.xml><?xml version="1.0" encoding="utf-8"?>
+<p:notes xmlns:a="http://schemas.openxmlformats.org/drawingml/2006/main" xmlns:r="http://schemas.openxmlformats.org/officeDocument/2006/relationships" xmlns:p="http://schemas.openxmlformats.org/presentationml/2006/main">
+  <p:cSld>
+    <p:spTree>
+      <p:nvGrpSpPr>
+        <p:cNvPr id="1" name=""/>
+        <p:cNvGrpSpPr/>
+        <p:nvPr/>
+      </p:nvGrpSpPr>
+      <p:grpSpPr>
+        <a:xfrm>
+          <a:off x="0" y="0"/>
+          <a:ext cx="0" cy="0"/>
+          <a:chOff x="0" y="0"/>
+          <a:chExt cx="0" cy="0"/>
+        </a:xfrm>
+      </p:grpSpPr>
+      <p:sp>
+        <p:nvSpPr>
+          <p:cNvPr id="2" name="Slide Image Placeholder 1"/>
+          <p:cNvSpPr>
+            <a:spLocks noGrp="1" noRot="1" noChangeAspect="1"/>
+          </p:cNvSpPr>
+          <p:nvPr>
+            <p:ph type="sldImg"/>
+          </p:nvPr>
+        </p:nvSpPr>
+        <p:spPr/>
+      </p:sp>
+      <p:sp>
+        <p:nvSpPr>
+          <p:cNvPr id="3" name="Notes Placeholder 2"/>
+          <p:cNvSpPr>
+            <a:spLocks noGrp="1"/>
+          </p:cNvSpPr>
+          <p:nvPr>
+            <p:ph type="body" idx="1"/>
+          </p:nvPr>
+        </p:nvSpPr>
+        <p:spPr/>
+        <p:txBody>
+          <a:bodyPr/>
+          <a:lstStyle/>
+          <a:p>
+            <a:pPr lvl="0" indent="0" marL="0">
+              <a:buNone/>
+            </a:pPr>
+            <a:r>
+              <a:rPr/>
+              <a:t>There are a broad range of individuals and groups who are interested in the NHCS data.</a:t>
+            </a:r>
+          </a:p>
+          <a:p>
+            <a:pPr lvl="0" indent="0" marL="0">
+              <a:buNone/>
+            </a:pPr>
+          </a:p>
+          <a:p>
+            <a:pPr lvl="0" indent="0" marL="0">
+              <a:buNone/>
+            </a:pPr>
+            <a:r>
+              <a:rPr/>
+              <a:t>I want to focus, though, on the last bullet point, neighborhood and community associations. These groups are very eager to find and use data that will help them advocate on behalf of the places where they live.</a:t>
+            </a:r>
+          </a:p>
+        </p:txBody>
+      </p:sp>
+      <p:sp>
+        <p:nvSpPr>
+          <p:cNvPr id="4" name="Slide Number Placeholder 3"/>
+          <p:cNvSpPr>
+            <a:spLocks noGrp="1"/>
+          </p:cNvSpPr>
+          <p:nvPr>
+            <p:ph type="sldNum" sz="quarter" idx="10"/>
+          </p:nvPr>
+        </p:nvSpPr>
+        <p:spPr/>
+        <p:txBody>
+          <a:bodyPr/>
+          <a:lstStyle/>
+          <a:p>
+            <a:fld id="{18BDFEC3-8487-43E8-A154-7C12CBC1FFF2}" type="slidenum">
+              <a:rPr lang="en-US"/>
+              <a:t>22</a:t>
+            </a:fld>
+            <a:endParaRPr lang="en-US"/>
+          </a:p>
+        </p:txBody>
+      </p:sp>
+    </p:spTree>
+  </p:cSld>
+</p:notes>
+</file>
+
+<file path=ppt/notesSlides/notesSlide22.xml><?xml version="1.0" encoding="utf-8"?>
+<p:notes xmlns:a="http://schemas.openxmlformats.org/drawingml/2006/main" xmlns:r="http://schemas.openxmlformats.org/officeDocument/2006/relationships" xmlns:p="http://schemas.openxmlformats.org/presentationml/2006/main">
+  <p:cSld>
+    <p:spTree>
+      <p:nvGrpSpPr>
+        <p:cNvPr id="1" name=""/>
+        <p:cNvGrpSpPr/>
+        <p:nvPr/>
+      </p:nvGrpSpPr>
+      <p:grpSpPr>
+        <a:xfrm>
+          <a:off x="0" y="0"/>
+          <a:ext cx="0" cy="0"/>
+          <a:chOff x="0" y="0"/>
+          <a:chExt cx="0" cy="0"/>
+        </a:xfrm>
+      </p:grpSpPr>
+      <p:sp>
+        <p:nvSpPr>
+          <p:cNvPr id="2" name="Slide Image Placeholder 1"/>
+          <p:cNvSpPr>
+            <a:spLocks noGrp="1" noRot="1" noChangeAspect="1"/>
+          </p:cNvSpPr>
+          <p:nvPr>
+            <p:ph type="sldImg"/>
+          </p:nvPr>
+        </p:nvSpPr>
+        <p:spPr/>
+      </p:sp>
+      <p:sp>
+        <p:nvSpPr>
+          <p:cNvPr id="3" name="Notes Placeholder 2"/>
+          <p:cNvSpPr>
+            <a:spLocks noGrp="1"/>
+          </p:cNvSpPr>
+          <p:nvPr>
+            <p:ph type="body" idx="1"/>
+          </p:nvPr>
+        </p:nvSpPr>
+        <p:spPr/>
+        <p:txBody>
+          <a:bodyPr/>
+          <a:lstStyle/>
+          <a:p>
+            <a:pPr lvl="0" indent="0" marL="0">
+              <a:buNone/>
+            </a:pPr>
+            <a:r>
+              <a:rPr/>
+              <a:t>I would be remiss in my duties as a data geek if I did not point out the research applications of the NHCS.</a:t>
+            </a:r>
+          </a:p>
+          <a:p>
+            <a:pPr lvl="0" indent="0" marL="0">
+              <a:buNone/>
+            </a:pPr>
+          </a:p>
+          <a:p>
+            <a:pPr lvl="0" indent="0" marL="0">
+              <a:buNone/>
+            </a:pPr>
+            <a:r>
+              <a:rPr/>
+              <a:t>Too many studies of geographic features lump everyone into a large groups, like zip codes or counties. This mixes apples, oranges, and every type of fruit together in a one big batch and pretends that a single summary number can characterize such a diverse group.</a:t>
+            </a:r>
+          </a:p>
+          <a:p>
+            <a:pPr lvl="0" indent="0" marL="0">
+              <a:buNone/>
+            </a:pPr>
+          </a:p>
+          <a:p>
+            <a:pPr lvl="0" indent="0" marL="0">
+              <a:buNone/>
+            </a:pPr>
+            <a:r>
+              <a:rPr/>
+              <a:t>The NHCS, on the other hand, collects data at the finest possible level of social resolution, the household.</a:t>
+            </a:r>
+          </a:p>
+          <a:p>
+            <a:pPr lvl="0" indent="0" marL="0">
+              <a:buNone/>
+            </a:pPr>
+          </a:p>
+          <a:p>
+            <a:pPr lvl="0" indent="0" marL="0">
+              <a:buNone/>
+            </a:pPr>
+            <a:r>
+              <a:rPr/>
+              <a:t>You can still be easily incorporated with data at higher level geographies like the American Community Survey which collects data at the Census block group and tract level.</a:t>
+            </a:r>
+          </a:p>
+          <a:p>
+            <a:pPr lvl="0" indent="0" marL="0">
+              <a:buNone/>
+            </a:pPr>
+          </a:p>
+          <a:p>
+            <a:pPr lvl="0" indent="0" marL="0">
+              <a:buNone/>
+            </a:pPr>
+            <a:r>
+              <a:rPr/>
+              <a:t>You also have the option of linking this data with other records at the address level. Of particular interest to me is the linking of the NHCS data with data from the electronic health record. There are serious privacy concerns with such matching of course that require careful oversight by the Institutional Review Board. But I will cite two examples shortly that show how productive this linkage can be.</a:t>
+            </a:r>
+          </a:p>
+        </p:txBody>
+      </p:sp>
+      <p:sp>
+        <p:nvSpPr>
+          <p:cNvPr id="4" name="Slide Number Placeholder 3"/>
+          <p:cNvSpPr>
+            <a:spLocks noGrp="1"/>
+          </p:cNvSpPr>
+          <p:nvPr>
+            <p:ph type="sldNum" sz="quarter" idx="10"/>
+          </p:nvPr>
+        </p:nvSpPr>
+        <p:spPr/>
+        <p:txBody>
+          <a:bodyPr/>
+          <a:lstStyle/>
+          <a:p>
+            <a:fld id="{18BDFEC3-8487-43E8-A154-7C12CBC1FFF2}" type="slidenum">
+              <a:rPr lang="en-US"/>
+              <a:t>23</a:t>
+            </a:fld>
+            <a:endParaRPr lang="en-US"/>
+          </a:p>
+        </p:txBody>
+      </p:sp>
+    </p:spTree>
+  </p:cSld>
+</p:notes>
+</file>
+
+<file path=ppt/notesSlides/notesSlide23.xml><?xml version="1.0" encoding="utf-8"?>
+<p:notes xmlns:a="http://schemas.openxmlformats.org/drawingml/2006/main" xmlns:r="http://schemas.openxmlformats.org/officeDocument/2006/relationships" xmlns:p="http://schemas.openxmlformats.org/presentationml/2006/main">
+  <p:cSld>
+    <p:spTree>
+      <p:nvGrpSpPr>
+        <p:cNvPr id="1" name=""/>
+        <p:cNvGrpSpPr/>
+        <p:nvPr/>
+      </p:nvGrpSpPr>
+      <p:grpSpPr>
+        <a:xfrm>
+          <a:off x="0" y="0"/>
+          <a:ext cx="0" cy="0"/>
+          <a:chOff x="0" y="0"/>
+          <a:chExt cx="0" cy="0"/>
+        </a:xfrm>
+      </p:grpSpPr>
+      <p:sp>
+        <p:nvSpPr>
+          <p:cNvPr id="2" name="Slide Image Placeholder 1"/>
+          <p:cNvSpPr>
+            <a:spLocks noGrp="1" noRot="1" noChangeAspect="1"/>
+          </p:cNvSpPr>
+          <p:nvPr>
+            <p:ph type="sldImg"/>
+          </p:nvPr>
+        </p:nvSpPr>
+        <p:spPr/>
+      </p:sp>
+      <p:sp>
+        <p:nvSpPr>
+          <p:cNvPr id="3" name="Notes Placeholder 2"/>
+          <p:cNvSpPr>
+            <a:spLocks noGrp="1"/>
+          </p:cNvSpPr>
+          <p:nvPr>
+            <p:ph type="body" idx="1"/>
+          </p:nvPr>
+        </p:nvSpPr>
+        <p:spPr/>
+        <p:txBody>
+          <a:bodyPr/>
+          <a:lstStyle/>
+          <a:p>
+            <a:pPr lvl="0" indent="0" marL="0">
+              <a:buNone/>
+            </a:pPr>
+            <a:r>
+              <a:rPr/>
+              <a:t>The NCHS has been used for over 200,000 parcels over a fifteen year span.</a:t>
+            </a:r>
+          </a:p>
+          <a:p>
+            <a:pPr lvl="0" indent="0" marL="0">
+              <a:buNone/>
+            </a:pPr>
+          </a:p>
+          <a:p>
+            <a:pPr lvl="0" indent="0" marL="0">
+              <a:buNone/>
+            </a:pPr>
+            <a:r>
+              <a:rPr/>
+              <a:t>This map shows where the NHCS has been used. Those of you who know and love Kansas City will notice two important features of this map. First, we have done surveys on both sides of the state line. Second, we have done survey both north and south of the Missouri river.</a:t>
+            </a:r>
+          </a:p>
+          <a:p>
+            <a:pPr lvl="0" indent="0" marL="0">
+              <a:buNone/>
+            </a:pPr>
+          </a:p>
+          <a:p>
+            <a:pPr lvl="0" indent="0" marL="0">
+              <a:buNone/>
+            </a:pPr>
+            <a:r>
+              <a:rPr/>
+              <a:t>The survey has been largely inactive since 2014 due to budget problems, but we are using the survey again in the current grant we have received from HUD.</a:t>
+            </a:r>
+          </a:p>
+        </p:txBody>
+      </p:sp>
+      <p:sp>
+        <p:nvSpPr>
+          <p:cNvPr id="4" name="Slide Number Placeholder 3"/>
+          <p:cNvSpPr>
+            <a:spLocks noGrp="1"/>
+          </p:cNvSpPr>
+          <p:nvPr>
+            <p:ph type="sldNum" sz="quarter" idx="10"/>
+          </p:nvPr>
+        </p:nvSpPr>
+        <p:spPr/>
+        <p:txBody>
+          <a:bodyPr/>
+          <a:lstStyle/>
+          <a:p>
+            <a:fld id="{18BDFEC3-8487-43E8-A154-7C12CBC1FFF2}" type="slidenum">
+              <a:rPr lang="en-US"/>
+              <a:t>24</a:t>
+            </a:fld>
+            <a:endParaRPr lang="en-US"/>
+          </a:p>
+        </p:txBody>
+      </p:sp>
+    </p:spTree>
+  </p:cSld>
+</p:notes>
+</file>
+
+<file path=ppt/notesSlides/notesSlide24.xml><?xml version="1.0" encoding="utf-8"?>
+<p:notes xmlns:a="http://schemas.openxmlformats.org/drawingml/2006/main" xmlns:r="http://schemas.openxmlformats.org/officeDocument/2006/relationships" xmlns:p="http://schemas.openxmlformats.org/presentationml/2006/main">
+  <p:cSld>
+    <p:spTree>
+      <p:nvGrpSpPr>
+        <p:cNvPr id="1" name=""/>
+        <p:cNvGrpSpPr/>
+        <p:nvPr/>
+      </p:nvGrpSpPr>
+      <p:grpSpPr>
+        <a:xfrm>
+          <a:off x="0" y="0"/>
+          <a:ext cx="0" cy="0"/>
+          <a:chOff x="0" y="0"/>
+          <a:chExt cx="0" cy="0"/>
+        </a:xfrm>
+      </p:grpSpPr>
+      <p:sp>
+        <p:nvSpPr>
+          <p:cNvPr id="2" name="Slide Image Placeholder 1"/>
+          <p:cNvSpPr>
+            <a:spLocks noGrp="1" noRot="1" noChangeAspect="1"/>
+          </p:cNvSpPr>
+          <p:nvPr>
+            <p:ph type="sldImg"/>
+          </p:nvPr>
+        </p:nvSpPr>
+        <p:spPr/>
+      </p:sp>
+      <p:sp>
+        <p:nvSpPr>
+          <p:cNvPr id="3" name="Notes Placeholder 2"/>
+          <p:cNvSpPr>
+            <a:spLocks noGrp="1"/>
+          </p:cNvSpPr>
+          <p:nvPr>
+            <p:ph type="body" idx="1"/>
+          </p:nvPr>
+        </p:nvSpPr>
+        <p:spPr/>
+        <p:txBody>
+          <a:bodyPr/>
+          <a:lstStyle/>
+          <a:p>
+            <a:pPr lvl="0" indent="0" marL="0">
+              <a:buNone/>
+            </a:pPr>
+            <a:r>
+              <a:rPr/>
+              <a:t>The NHCS is fast and inexpensive. For our current grant, we estimated the total costs (including labor) for the NHCS to be $6.50 per parcel, though there is evidence that the costs would be even less for larger surveys. The NHCS scales very well.</a:t>
+            </a:r>
+          </a:p>
+        </p:txBody>
+      </p:sp>
+      <p:sp>
+        <p:nvSpPr>
+          <p:cNvPr id="4" name="Slide Number Placeholder 3"/>
+          <p:cNvSpPr>
+            <a:spLocks noGrp="1"/>
+          </p:cNvSpPr>
+          <p:nvPr>
+            <p:ph type="sldNum" sz="quarter" idx="10"/>
+          </p:nvPr>
+        </p:nvSpPr>
+        <p:spPr/>
+        <p:txBody>
+          <a:bodyPr/>
+          <a:lstStyle/>
+          <a:p>
+            <a:fld id="{18BDFEC3-8487-43E8-A154-7C12CBC1FFF2}" type="slidenum">
+              <a:rPr lang="en-US"/>
+              <a:t>25</a:t>
+            </a:fld>
+            <a:endParaRPr lang="en-US"/>
+          </a:p>
+        </p:txBody>
+      </p:sp>
+    </p:spTree>
+  </p:cSld>
+</p:notes>
+</file>
+
+<file path=ppt/notesSlides/notesSlide25.xml><?xml version="1.0" encoding="utf-8"?>
+<p:notes xmlns:a="http://schemas.openxmlformats.org/drawingml/2006/main" xmlns:r="http://schemas.openxmlformats.org/officeDocument/2006/relationships" xmlns:p="http://schemas.openxmlformats.org/presentationml/2006/main">
+  <p:cSld>
+    <p:spTree>
+      <p:nvGrpSpPr>
+        <p:cNvPr id="1" name=""/>
+        <p:cNvGrpSpPr/>
+        <p:nvPr/>
+      </p:nvGrpSpPr>
+      <p:grpSpPr>
+        <a:xfrm>
+          <a:off x="0" y="0"/>
+          <a:ext cx="0" cy="0"/>
+          <a:chOff x="0" y="0"/>
+          <a:chExt cx="0" cy="0"/>
+        </a:xfrm>
+      </p:grpSpPr>
+      <p:sp>
+        <p:nvSpPr>
+          <p:cNvPr id="2" name="Slide Image Placeholder 1"/>
+          <p:cNvSpPr>
+            <a:spLocks noGrp="1" noRot="1" noChangeAspect="1"/>
+          </p:cNvSpPr>
+          <p:nvPr>
+            <p:ph type="sldImg"/>
+          </p:nvPr>
+        </p:nvSpPr>
+        <p:spPr/>
+      </p:sp>
+      <p:sp>
+        <p:nvSpPr>
+          <p:cNvPr id="3" name="Notes Placeholder 2"/>
+          <p:cNvSpPr>
+            <a:spLocks noGrp="1"/>
+          </p:cNvSpPr>
+          <p:nvPr>
+            <p:ph type="body" idx="1"/>
+          </p:nvPr>
+        </p:nvSpPr>
+        <p:spPr/>
+        <p:txBody>
+          <a:bodyPr/>
+          <a:lstStyle/>
+          <a:p>
+            <a:pPr lvl="0" indent="0" marL="0">
+              <a:buNone/>
+            </a:pPr>
+            <a:r>
+              <a:rPr/>
+              <a:t>The revitalization of the NHCS should be credited to two graduate students, Natalie Kane and Neal Wilson.</a:t>
+            </a:r>
+          </a:p>
+          <a:p>
+            <a:pPr lvl="0" indent="0" marL="0">
+              <a:buNone/>
+            </a:pPr>
+          </a:p>
+          <a:p>
+            <a:pPr lvl="0" indent="0" marL="0">
+              <a:buNone/>
+            </a:pPr>
+            <a:r>
+              <a:rPr/>
+              <a:t>This is a picture of Natalie Kane. She currently works at Children’s Mercy, but I knew her from her work on a dissertation that she successfully defended in 2020. She linked the NCHS data with medical records of asthma visits at Children’s Mercy Hospital and additional geographic markers of pollution to establish a link between disparities in home environment and rates of acute pediatric asthma care encounters.</a:t>
+            </a:r>
+          </a:p>
+        </p:txBody>
+      </p:sp>
+      <p:sp>
+        <p:nvSpPr>
+          <p:cNvPr id="4" name="Slide Number Placeholder 3"/>
+          <p:cNvSpPr>
+            <a:spLocks noGrp="1"/>
+          </p:cNvSpPr>
+          <p:nvPr>
+            <p:ph type="sldNum" sz="quarter" idx="10"/>
+          </p:nvPr>
+        </p:nvSpPr>
+        <p:spPr/>
+        <p:txBody>
+          <a:bodyPr/>
+          <a:lstStyle/>
+          <a:p>
+            <a:fld id="{18BDFEC3-8487-43E8-A154-7C12CBC1FFF2}" type="slidenum">
+              <a:rPr lang="en-US"/>
+              <a:t>26</a:t>
+            </a:fld>
+            <a:endParaRPr lang="en-US"/>
+          </a:p>
+        </p:txBody>
+      </p:sp>
+    </p:spTree>
+  </p:cSld>
+</p:notes>
+</file>
+
+<file path=ppt/notesSlides/notesSlide26.xml><?xml version="1.0" encoding="utf-8"?>
+<p:notes xmlns:a="http://schemas.openxmlformats.org/drawingml/2006/main" xmlns:r="http://schemas.openxmlformats.org/officeDocument/2006/relationships" xmlns:p="http://schemas.openxmlformats.org/presentationml/2006/main">
+  <p:cSld>
+    <p:spTree>
+      <p:nvGrpSpPr>
+        <p:cNvPr id="1" name=""/>
+        <p:cNvGrpSpPr/>
+        <p:nvPr/>
+      </p:nvGrpSpPr>
+      <p:grpSpPr>
+        <a:xfrm>
+          <a:off x="0" y="0"/>
+          <a:ext cx="0" cy="0"/>
+          <a:chOff x="0" y="0"/>
+          <a:chExt cx="0" cy="0"/>
+        </a:xfrm>
+      </p:grpSpPr>
+      <p:sp>
+        <p:nvSpPr>
+          <p:cNvPr id="2" name="Slide Image Placeholder 1"/>
+          <p:cNvSpPr>
+            <a:spLocks noGrp="1" noRot="1" noChangeAspect="1"/>
+          </p:cNvSpPr>
+          <p:nvPr>
+            <p:ph type="sldImg"/>
+          </p:nvPr>
+        </p:nvSpPr>
+        <p:spPr/>
+      </p:sp>
+      <p:sp>
+        <p:nvSpPr>
+          <p:cNvPr id="3" name="Notes Placeholder 2"/>
+          <p:cNvSpPr>
+            <a:spLocks noGrp="1"/>
+          </p:cNvSpPr>
+          <p:nvPr>
+            <p:ph type="body" idx="1"/>
+          </p:nvPr>
+        </p:nvSpPr>
+        <p:spPr/>
+        <p:txBody>
+          <a:bodyPr/>
+          <a:lstStyle/>
+          <a:p>
+            <a:pPr lvl="0" indent="0" marL="0">
+              <a:buNone/>
+            </a:pPr>
+            <a:r>
+              <a:rPr/>
+              <a:t>Here’s a picture of Dr. Neal Wilson. Like Natalie Kane, he took NHCS data and linked it to medical records, this time with blood testing data from the Kansas City, Missouri Department of Health. He showed a strong association between housing conditions and elevated blood lead levels in children. He successfully defended his dissertation on this topic in 2021 and has continued his work in this area with the Impact Lead-Kansas City grant that I will describe on the next few slides.</a:t>
+            </a:r>
+          </a:p>
+        </p:txBody>
+      </p:sp>
+      <p:sp>
+        <p:nvSpPr>
+          <p:cNvPr id="4" name="Slide Number Placeholder 3"/>
+          <p:cNvSpPr>
+            <a:spLocks noGrp="1"/>
+          </p:cNvSpPr>
+          <p:nvPr>
+            <p:ph type="sldNum" sz="quarter" idx="10"/>
+          </p:nvPr>
+        </p:nvSpPr>
+        <p:spPr/>
+        <p:txBody>
+          <a:bodyPr/>
+          <a:lstStyle/>
+          <a:p>
+            <a:fld id="{18BDFEC3-8487-43E8-A154-7C12CBC1FFF2}" type="slidenum">
+              <a:rPr lang="en-US"/>
+              <a:t>27</a:t>
+            </a:fld>
+            <a:endParaRPr lang="en-US"/>
+          </a:p>
+        </p:txBody>
+      </p:sp>
+    </p:spTree>
+  </p:cSld>
+</p:notes>
+</file>
+
+<file path=ppt/notesSlides/notesSlide27.xml><?xml version="1.0" encoding="utf-8"?>
+<p:notes xmlns:a="http://schemas.openxmlformats.org/drawingml/2006/main" xmlns:r="http://schemas.openxmlformats.org/officeDocument/2006/relationships" xmlns:p="http://schemas.openxmlformats.org/presentationml/2006/main">
+  <p:cSld>
+    <p:spTree>
+      <p:nvGrpSpPr>
+        <p:cNvPr id="1" name=""/>
+        <p:cNvGrpSpPr/>
+        <p:nvPr/>
+      </p:nvGrpSpPr>
+      <p:grpSpPr>
+        <a:xfrm>
+          <a:off x="0" y="0"/>
+          <a:ext cx="0" cy="0"/>
+          <a:chOff x="0" y="0"/>
+          <a:chExt cx="0" cy="0"/>
+        </a:xfrm>
+      </p:grpSpPr>
+      <p:sp>
+        <p:nvSpPr>
+          <p:cNvPr id="2" name="Slide Image Placeholder 1"/>
+          <p:cNvSpPr>
+            <a:spLocks noGrp="1" noRot="1" noChangeAspect="1"/>
+          </p:cNvSpPr>
+          <p:nvPr>
+            <p:ph type="sldImg"/>
+          </p:nvPr>
+        </p:nvSpPr>
+        <p:spPr/>
+      </p:sp>
+      <p:sp>
+        <p:nvSpPr>
+          <p:cNvPr id="3" name="Notes Placeholder 2"/>
+          <p:cNvSpPr>
+            <a:spLocks noGrp="1"/>
+          </p:cNvSpPr>
+          <p:nvPr>
+            <p:ph type="body" idx="1"/>
+          </p:nvPr>
+        </p:nvSpPr>
+        <p:spPr/>
+        <p:txBody>
+          <a:bodyPr/>
+          <a:lstStyle/>
+          <a:p>
+            <a:pPr lvl="0" indent="0" marL="0">
+              <a:buNone/>
+            </a:pPr>
+            <a:r>
+              <a:rPr/>
+              <a:t>Here is a map of housing units in a Kansas City neighborhood. It is just west of the infamous Benton curve of I-70. The houses are color coded by era of construction. If you are interested in lead remediation efforts, the age of the house is your first criteria for where to focus your work.</a:t>
+            </a:r>
+          </a:p>
+          <a:p>
+            <a:pPr lvl="0" indent="0" marL="0">
+              <a:buNone/>
+            </a:pPr>
+          </a:p>
+          <a:p>
+            <a:pPr lvl="0" indent="0" marL="0">
+              <a:buNone/>
+            </a:pPr>
+            <a:r>
+              <a:rPr/>
+              <a:t>This is a map shows where the houses that you should skip: the white houses built after 1977. Earlier construction is worth looking at, but especially the homes in dark orange, built in 1952 or earlier. You can see on this map that there are quite a few orange rectangles.</a:t>
+            </a:r>
+          </a:p>
+        </p:txBody>
+      </p:sp>
+      <p:sp>
+        <p:nvSpPr>
+          <p:cNvPr id="4" name="Slide Number Placeholder 3"/>
+          <p:cNvSpPr>
+            <a:spLocks noGrp="1"/>
+          </p:cNvSpPr>
+          <p:nvPr>
+            <p:ph type="sldNum" sz="quarter" idx="10"/>
+          </p:nvPr>
+        </p:nvSpPr>
+        <p:spPr/>
+        <p:txBody>
+          <a:bodyPr/>
+          <a:lstStyle/>
+          <a:p>
+            <a:fld id="{18BDFEC3-8487-43E8-A154-7C12CBC1FFF2}" type="slidenum">
+              <a:rPr lang="en-US"/>
+              <a:t>28</a:t>
+            </a:fld>
+            <a:endParaRPr lang="en-US"/>
+          </a:p>
+        </p:txBody>
+      </p:sp>
+    </p:spTree>
+  </p:cSld>
+</p:notes>
+</file>
+
+<file path=ppt/notesSlides/notesSlide28.xml><?xml version="1.0" encoding="utf-8"?>
+<p:notes xmlns:a="http://schemas.openxmlformats.org/drawingml/2006/main" xmlns:r="http://schemas.openxmlformats.org/officeDocument/2006/relationships" xmlns:p="http://schemas.openxmlformats.org/presentationml/2006/main">
+  <p:cSld>
+    <p:spTree>
+      <p:nvGrpSpPr>
+        <p:cNvPr id="1" name=""/>
+        <p:cNvGrpSpPr/>
+        <p:nvPr/>
+      </p:nvGrpSpPr>
+      <p:grpSpPr>
+        <a:xfrm>
+          <a:off x="0" y="0"/>
+          <a:ext cx="0" cy="0"/>
+          <a:chOff x="0" y="0"/>
+          <a:chExt cx="0" cy="0"/>
+        </a:xfrm>
+      </p:grpSpPr>
+      <p:sp>
+        <p:nvSpPr>
+          <p:cNvPr id="2" name="Slide Image Placeholder 1"/>
+          <p:cNvSpPr>
+            <a:spLocks noGrp="1" noRot="1" noChangeAspect="1"/>
+          </p:cNvSpPr>
+          <p:nvPr>
+            <p:ph type="sldImg"/>
+          </p:nvPr>
+        </p:nvSpPr>
+        <p:spPr/>
+      </p:sp>
+      <p:sp>
+        <p:nvSpPr>
+          <p:cNvPr id="3" name="Notes Placeholder 2"/>
+          <p:cNvSpPr>
+            <a:spLocks noGrp="1"/>
+          </p:cNvSpPr>
+          <p:nvPr>
+            <p:ph type="body" idx="1"/>
+          </p:nvPr>
+        </p:nvSpPr>
+        <p:spPr/>
+        <p:txBody>
+          <a:bodyPr/>
+          <a:lstStyle/>
+          <a:p>
+            <a:pPr lvl="0" indent="0" marL="0">
+              <a:buNone/>
+            </a:pPr>
+            <a:r>
+              <a:rPr/>
+              <a:t>Work on this is not quite complete, but Neal Wilson is creating an index that accounts for both the construction era and the information from the NHCS. This map is drawn with color coding using this index. Note that there are substantially more distinctions among the housing units. There are seventeen different colors on this graph, compared to only three in the previous map. If these index proves to be more strongly associated with lead exposure than era of construction alone, and we think it will, then you have a lot fewer dark orange rectangles to focus on.</a:t>
+            </a:r>
+          </a:p>
+        </p:txBody>
+      </p:sp>
+      <p:sp>
+        <p:nvSpPr>
+          <p:cNvPr id="4" name="Slide Number Placeholder 3"/>
+          <p:cNvSpPr>
+            <a:spLocks noGrp="1"/>
+          </p:cNvSpPr>
+          <p:nvPr>
+            <p:ph type="sldNum" sz="quarter" idx="10"/>
+          </p:nvPr>
+        </p:nvSpPr>
+        <p:spPr/>
+        <p:txBody>
+          <a:bodyPr/>
+          <a:lstStyle/>
+          <a:p>
+            <a:fld id="{18BDFEC3-8487-43E8-A154-7C12CBC1FFF2}" type="slidenum">
+              <a:rPr lang="en-US"/>
+              <a:t>29</a:t>
+            </a:fld>
+            <a:endParaRPr lang="en-US"/>
+          </a:p>
+        </p:txBody>
+      </p:sp>
+    </p:spTree>
+  </p:cSld>
+</p:notes>
+</file>
+
+<file path=ppt/notesSlides/notesSlide29.xml><?xml version="1.0" encoding="utf-8"?>
+<p:notes xmlns:a="http://schemas.openxmlformats.org/drawingml/2006/main" xmlns:r="http://schemas.openxmlformats.org/officeDocument/2006/relationships" xmlns:p="http://schemas.openxmlformats.org/presentationml/2006/main">
+  <p:cSld>
+    <p:spTree>
+      <p:nvGrpSpPr>
+        <p:cNvPr id="1" name=""/>
+        <p:cNvGrpSpPr/>
+        <p:nvPr/>
+      </p:nvGrpSpPr>
+      <p:grpSpPr>
+        <a:xfrm>
+          <a:off x="0" y="0"/>
+          <a:ext cx="0" cy="0"/>
+          <a:chOff x="0" y="0"/>
+          <a:chExt cx="0" cy="0"/>
+        </a:xfrm>
+      </p:grpSpPr>
+      <p:sp>
+        <p:nvSpPr>
+          <p:cNvPr id="2" name="Slide Image Placeholder 1"/>
+          <p:cNvSpPr>
+            <a:spLocks noGrp="1" noRot="1" noChangeAspect="1"/>
+          </p:cNvSpPr>
+          <p:nvPr>
+            <p:ph type="sldImg"/>
+          </p:nvPr>
+        </p:nvSpPr>
+        <p:spPr/>
+      </p:sp>
+      <p:sp>
+        <p:nvSpPr>
+          <p:cNvPr id="3" name="Notes Placeholder 2"/>
+          <p:cNvSpPr>
+            <a:spLocks noGrp="1"/>
+          </p:cNvSpPr>
+          <p:nvPr>
+            <p:ph type="body" idx="1"/>
+          </p:nvPr>
+        </p:nvSpPr>
+        <p:spPr/>
+        <p:txBody>
+          <a:bodyPr/>
+          <a:lstStyle/>
+          <a:p>
+            <a:pPr lvl="0" indent="0" marL="0">
+              <a:buNone/>
+            </a:pPr>
+            <a:r>
+              <a:rPr/>
+              <a:t>We are currently surveying about 6,000 housing units in six neighborhoods in the Kansas City area. These houses are all on the Missouri side of the state line because of our partnership with the Kansas City, Missouri Department of Health. These neighborhoods have predominantly older construction. We plan to recruit 50 owners or renters in homes that score poorly on the NCHS and get permission to do detailed assessment of environmental lead exposure. These will be compared to a matched set of 50 control housing units. Our hypothesis is that poor exterior conditions as measured by the NHCS are predictive of increased risk of lead exposure in the interior of the home.</a:t>
+            </a:r>
+          </a:p>
+        </p:txBody>
+      </p:sp>
+      <p:sp>
+        <p:nvSpPr>
+          <p:cNvPr id="4" name="Slide Number Placeholder 3"/>
+          <p:cNvSpPr>
+            <a:spLocks noGrp="1"/>
+          </p:cNvSpPr>
+          <p:nvPr>
+            <p:ph type="sldNum" sz="quarter" idx="10"/>
+          </p:nvPr>
+        </p:nvSpPr>
+        <p:spPr/>
+        <p:txBody>
+          <a:bodyPr/>
+          <a:lstStyle/>
+          <a:p>
+            <a:fld id="{18BDFEC3-8487-43E8-A154-7C12CBC1FFF2}" type="slidenum">
+              <a:rPr lang="en-US"/>
+              <a:t>30</a:t>
             </a:fld>
             <a:endParaRPr lang="en-US"/>
           </a:p>
@@ -1536,21 +2512,7 @@
             </a:pPr>
             <a:r>
               <a:rPr/>
-              <a:t>The housing survey collects two types of data. It collecting information that classifies the type of structure, its use, whether it is residential, the profile of the structure, and the visible address. It also collects data on 15 housing conditions, groups into conditions about the structure itself, the grounds, and the infrastructure.</a:t>
-            </a:r>
-          </a:p>
-          <a:p>
-            <a:pPr lvl="0" indent="0" marL="0">
-              <a:buNone/>
-            </a:pPr>
-          </a:p>
-          <a:p>
-            <a:pPr lvl="0" indent="0" marL="0">
-              <a:buNone/>
-            </a:pPr>
-            <a:r>
-              <a:rPr/>
-              <a:t>The first type is classification data. The second type is conditions data. Classification data includes structure type, use type, residential type, structure profile, and visible address. For all parcels other than those that are classified as non-residential in both structure type and use type, conditions data is collected. This report will discuss each of the 15 surveyed conditions both individually, and grouped into three general categories of conditions. The groupings and their component elements are listed in Table I-1:</a:t>
+              <a:t>I work at the University of Missouri-Kansas City, and we have many others where I work helping out with this research. I should pay special thanks to the army of graduate students who have done all the heavly lifting in the work I am about to describe.</a:t>
             </a:r>
           </a:p>
         </p:txBody>
@@ -1573,6 +2535,144 @@
             <a:fld id="{18BDFEC3-8487-43E8-A154-7C12CBC1FFF2}" type="slidenum">
               <a:rPr lang="en-US"/>
               <a:t>4</a:t>
+            </a:fld>
+            <a:endParaRPr lang="en-US"/>
+          </a:p>
+        </p:txBody>
+      </p:sp>
+    </p:spTree>
+  </p:cSld>
+</p:notes>
+</file>
+
+<file path=ppt/notesSlides/notesSlide30.xml><?xml version="1.0" encoding="utf-8"?>
+<p:notes xmlns:a="http://schemas.openxmlformats.org/drawingml/2006/main" xmlns:r="http://schemas.openxmlformats.org/officeDocument/2006/relationships" xmlns:p="http://schemas.openxmlformats.org/presentationml/2006/main">
+  <p:cSld>
+    <p:spTree>
+      <p:nvGrpSpPr>
+        <p:cNvPr id="1" name=""/>
+        <p:cNvGrpSpPr/>
+        <p:nvPr/>
+      </p:nvGrpSpPr>
+      <p:grpSpPr>
+        <a:xfrm>
+          <a:off x="0" y="0"/>
+          <a:ext cx="0" cy="0"/>
+          <a:chOff x="0" y="0"/>
+          <a:chExt cx="0" cy="0"/>
+        </a:xfrm>
+      </p:grpSpPr>
+      <p:sp>
+        <p:nvSpPr>
+          <p:cNvPr id="2" name="Slide Image Placeholder 1"/>
+          <p:cNvSpPr>
+            <a:spLocks noGrp="1" noRot="1" noChangeAspect="1"/>
+          </p:cNvSpPr>
+          <p:nvPr>
+            <p:ph type="sldImg"/>
+          </p:nvPr>
+        </p:nvSpPr>
+        <p:spPr/>
+      </p:sp>
+      <p:sp>
+        <p:nvSpPr>
+          <p:cNvPr id="3" name="Notes Placeholder 2"/>
+          <p:cNvSpPr>
+            <a:spLocks noGrp="1"/>
+          </p:cNvSpPr>
+          <p:nvPr>
+            <p:ph type="body" idx="1"/>
+          </p:nvPr>
+        </p:nvSpPr>
+        <p:spPr/>
+        <p:txBody>
+          <a:bodyPr/>
+          <a:lstStyle/>
+          <a:p>
+            <a:pPr lvl="0" indent="0" marL="0">
+              <a:buNone/>
+            </a:pPr>
+            <a:r>
+              <a:rPr/>
+              <a:t>While this work is interesting in its own right, I want to explore possible future applications of the NHCS.</a:t>
+            </a:r>
+          </a:p>
+          <a:p>
+            <a:pPr lvl="0" indent="0" marL="0">
+              <a:buNone/>
+            </a:pPr>
+          </a:p>
+          <a:p>
+            <a:pPr lvl="0" indent="0" marL="0">
+              <a:buNone/>
+            </a:pPr>
+            <a:r>
+              <a:rPr/>
+              <a:t>Two graduate students have shown strong links between the NHCS data and health outcomes in acute asthma visits and elevated blood lead levels. Our current work intends to show a link to environmental lead inside the home. But there are other health outcomes that can be tied to housing quality. I am not a doctor, but even I can see a potential link with acute injuries like falls. There may be others worth examining.</a:t>
+            </a:r>
+          </a:p>
+          <a:p>
+            <a:pPr lvl="0" indent="0" marL="0">
+              <a:buNone/>
+            </a:pPr>
+          </a:p>
+          <a:p>
+            <a:pPr lvl="0" indent="0" marL="0">
+              <a:buNone/>
+            </a:pPr>
+            <a:r>
+              <a:rPr/>
+              <a:t>A second application is the use of the NHCS as training data for deep learning models. You are probably aware of the many successful uses of deep learning models to analyze image data, starting with the famous study of dogs versus cats. It is very easy to collect image data on houses through street cameras mounted on garbage trucks or on drones. These deep learning models are very powerful, but they require massive amounts of training data. The NHCS can provide that data cheaply, quickly, and on a large scale.</a:t>
+            </a:r>
+          </a:p>
+          <a:p>
+            <a:pPr lvl="0" indent="0" marL="0">
+              <a:buNone/>
+            </a:pPr>
+          </a:p>
+          <a:p>
+            <a:pPr lvl="0" indent="0" marL="0">
+              <a:buNone/>
+            </a:pPr>
+            <a:r>
+              <a:rPr/>
+              <a:t>A third application is even simpler, but just as important. We have had a lot of success applying the NHCS in the Kansas City metropolitan area, and the process is well defined and carefully tested. It should not be too difficult to take the NHCS on the road to other communities and see if you can replicate the successes that we have seen in Kansas City.</a:t>
+            </a:r>
+          </a:p>
+          <a:p>
+            <a:pPr lvl="0" indent="0" marL="0">
+              <a:buNone/>
+            </a:pPr>
+          </a:p>
+          <a:p>
+            <a:pPr lvl="0" indent="0" marL="0">
+              <a:buNone/>
+            </a:pPr>
+            <a:r>
+              <a:rPr/>
+              <a:t>These slides are available on my github site. If you have any questions, please contact me.</a:t>
+            </a:r>
+          </a:p>
+        </p:txBody>
+      </p:sp>
+      <p:sp>
+        <p:nvSpPr>
+          <p:cNvPr id="4" name="Slide Number Placeholder 3"/>
+          <p:cNvSpPr>
+            <a:spLocks noGrp="1"/>
+          </p:cNvSpPr>
+          <p:nvPr>
+            <p:ph type="sldNum" sz="quarter" idx="10"/>
+          </p:nvPr>
+        </p:nvSpPr>
+        <p:spPr/>
+        <p:txBody>
+          <a:bodyPr/>
+          <a:lstStyle/>
+          <a:p>
+            <a:fld id="{18BDFEC3-8487-43E8-A154-7C12CBC1FFF2}" type="slidenum">
+              <a:rPr lang="en-US"/>
+              <a:t>31</a:t>
             </a:fld>
             <a:endParaRPr lang="en-US"/>
           </a:p>
@@ -1632,7 +2732,35 @@
             </a:pPr>
             <a:r>
               <a:rPr/>
-              <a:t>The condition of each of these elements is rated on a scale of 1 to 5, with 5 corresponding to the best condition and 1 corresponding to the worst condition. The specific meaning of each condition number for each of the above elements is contained in the Reference Guide. For parcels with no structure (vacant lots, parking lots, parks) there is only data for the Grounds and Infrastructure conditions.</a:t>
+              <a:t>I am the principal investigator on Impact Lead-Kansas City. This is a lead technical study funded by the Department of Housing and Urban Development. We’ve been funded for three years, 2021 through 2023. I appreciate this invitation to talk about the work on this grant.</a:t>
+            </a:r>
+          </a:p>
+          <a:p>
+            <a:pPr lvl="0" indent="0" marL="0">
+              <a:buNone/>
+            </a:pPr>
+          </a:p>
+          <a:p>
+            <a:pPr lvl="0" indent="0" marL="0">
+              <a:buNone/>
+            </a:pPr>
+            <a:r>
+              <a:rPr/>
+              <a:t>The grant has two aims, a retrospective review of lead remediation efforts funded by HUD through the Kansas City, Missouri Department of Health. and a prospective effort to more efficiently identify houses that might be targets for future remediation.</a:t>
+            </a:r>
+          </a:p>
+          <a:p>
+            <a:pPr lvl="0" indent="0" marL="0">
+              <a:buNone/>
+            </a:pPr>
+          </a:p>
+          <a:p>
+            <a:pPr lvl="0" indent="0" marL="0">
+              <a:buNone/>
+            </a:pPr>
+            <a:r>
+              <a:rPr/>
+              <a:t>I want to highlight a key component of the second aim, a survey that we hope will be useful in prospective identification of houses at risk for lead contamination, the Neighborhood Housing Conditions Survey. I am focussing on this survey because it has the potential for collaboration with other HUD grantees at this meeting.</a:t>
             </a:r>
           </a:p>
         </p:txBody>
@@ -1714,7 +2842,49 @@
             </a:pPr>
             <a:r>
               <a:rPr/>
-              <a:t>The condition ratings range from 1 to 5 on Likert scale with lower scores indicating more deterioration. A code of 6 is a missing value code for locations where a condition rating is not applicable. A code of 7 is a second missing value code for conditions that could not be rated because of visibility issues.</a:t>
+              <a:t>The CEI Neighborhood Housing Conditions Survey (NHCS) is a windshield survey of residential parcels. The parcel geography and other relevant information was provided by the City of Kansas City, Missouri.</a:t>
+            </a:r>
+          </a:p>
+          <a:p>
+            <a:pPr lvl="0" indent="0" marL="0">
+              <a:buNone/>
+            </a:pPr>
+          </a:p>
+          <a:p>
+            <a:pPr lvl="0" indent="0" marL="0">
+              <a:buNone/>
+            </a:pPr>
+            <a:r>
+              <a:rPr/>
+              <a:t>This is windshield survey, which means you collect the data by slowly driving down a street and observing housing conditions that are visible from the street level. You don’t have to go inside the house or even step inside the property boundaries.</a:t>
+            </a:r>
+          </a:p>
+          <a:p>
+            <a:pPr lvl="0" indent="0" marL="0">
+              <a:buNone/>
+            </a:pPr>
+          </a:p>
+          <a:p>
+            <a:pPr lvl="0" indent="0" marL="0">
+              <a:buNone/>
+            </a:pPr>
+            <a:r>
+              <a:rPr/>
+              <a:t>The primary intent of the survey is to collect conditions of residential structures. The survey will also note information on non-residential structures and vacant lots.</a:t>
+            </a:r>
+          </a:p>
+          <a:p>
+            <a:pPr lvl="0" indent="0" marL="0">
+              <a:buNone/>
+            </a:pPr>
+          </a:p>
+          <a:p>
+            <a:pPr lvl="0" indent="0" marL="0">
+              <a:buNone/>
+            </a:pPr>
+            <a:r>
+              <a:rPr/>
+              <a:t>The survey was developed in 1999 and has been applied continuously through 2014.</a:t>
             </a:r>
           </a:p>
         </p:txBody>
@@ -1736,7 +2906,7 @@
           <a:p>
             <a:fld id="{18BDFEC3-8487-43E8-A154-7C12CBC1FFF2}" type="slidenum">
               <a:rPr lang="en-US"/>
-              <a:t>8</a:t>
+              <a:t>6</a:t>
             </a:fld>
             <a:endParaRPr lang="en-US"/>
           </a:p>
@@ -1796,7 +2966,7 @@
             </a:pPr>
             <a:r>
               <a:rPr/>
-              <a:t>Let’s look at the details for one of the fifteen conditions, the structure/roof. The lowest rating, 1, represent severe deterioration. It would be marked by visible holes, sagging rafters, or severe rot and deterioration of the soffits.</a:t>
+              <a:t>The housing survey collects two types of data. It collects classification data, information that classifies the type of structure, its use, whether it is residential, the profile of the structure, and the visible address.</a:t>
             </a:r>
           </a:p>
         </p:txBody>
@@ -1818,7 +2988,7 @@
           <a:p>
             <a:fld id="{18BDFEC3-8487-43E8-A154-7C12CBC1FFF2}" type="slidenum">
               <a:rPr lang="en-US"/>
-              <a:t>9</a:t>
+              <a:t>7</a:t>
             </a:fld>
             <a:endParaRPr lang="en-US"/>
           </a:p>
@@ -1878,7 +3048,35 @@
             </a:pPr>
             <a:r>
               <a:rPr/>
-              <a:t>The next rating, 2, represent serious deterioration. No holes, but some sagging of the rafters, but not too severe. It would also be indicated by missing or extremely deteriorated roofing shingles or also by moderate rot and deterioration of the soffits and fascia boards</a:t>
+              <a:t>The NHCS also collects data on housing conditions, grouped into conditions about the structure itself, the grounds, and the infrastructure.</a:t>
+            </a:r>
+          </a:p>
+          <a:p>
+            <a:pPr lvl="0" indent="0" marL="0">
+              <a:buNone/>
+            </a:pPr>
+          </a:p>
+          <a:p>
+            <a:pPr lvl="0" indent="0" marL="0">
+              <a:buNone/>
+            </a:pPr>
+            <a:r>
+              <a:rPr/>
+              <a:t>The condition of each of these elements is rated on a scale of 1 to 5, with 5 corresponding to the best condition and 1 corresponding to the worst condition.</a:t>
+            </a:r>
+          </a:p>
+          <a:p>
+            <a:pPr lvl="0" indent="0" marL="0">
+              <a:buNone/>
+            </a:pPr>
+          </a:p>
+          <a:p>
+            <a:pPr lvl="0" indent="0" marL="0">
+              <a:buNone/>
+            </a:pPr>
+            <a:r>
+              <a:rPr/>
+              <a:t>For parcels with no structure (vacant lots, parking lots, parks) there is only data for the Grounds and Infrastructure conditions.</a:t>
             </a:r>
           </a:p>
         </p:txBody>
@@ -1900,7 +3098,7 @@
           <a:p>
             <a:fld id="{18BDFEC3-8487-43E8-A154-7C12CBC1FFF2}" type="slidenum">
               <a:rPr lang="en-US"/>
-              <a:t>10</a:t>
+              <a:t>8</a:t>
             </a:fld>
             <a:endParaRPr lang="en-US"/>
           </a:p>
@@ -1960,7 +3158,7 @@
             </a:pPr>
             <a:r>
               <a:rPr/>
-              <a:t>A rating of 3 represents substandard conditions. No holes or sagging, a small number of missing shingles, or slight rot in soffits and fascia boards.</a:t>
+              <a:t>Ratings are done on five features of the structure itself: the roof, foundation and walls, windows and doolrs, the porch, and exterior paint.</a:t>
             </a:r>
           </a:p>
         </p:txBody>
@@ -1982,7 +3180,7 @@
           <a:p>
             <a:fld id="{18BDFEC3-8487-43E8-A154-7C12CBC1FFF2}" type="slidenum">
               <a:rPr lang="en-US"/>
-              <a:t>11</a:t>
+              <a:t>9</a:t>
             </a:fld>
             <a:endParaRPr lang="en-US"/>
           </a:p>
@@ -2042,7 +3240,7 @@
             </a:pPr>
             <a:r>
               <a:rPr/>
-              <a:t>A rating of 4 represents slight wear and discoloration.</a:t>
+              <a:t>Ratings are also done on five features of the grounds: the private sidewalk, lawn, nuisance vehicles, litter, and open storage.</a:t>
             </a:r>
           </a:p>
         </p:txBody>
@@ -2064,7 +3262,7 @@
           <a:p>
             <a:fld id="{18BDFEC3-8487-43E8-A154-7C12CBC1FFF2}" type="slidenum">
               <a:rPr lang="en-US"/>
-              <a:t>12</a:t>
+              <a:t>10</a:t>
             </a:fld>
             <a:endParaRPr lang="en-US"/>
           </a:p>
@@ -5110,31 +6308,6 @@
           </a:p>
         </p:txBody>
       </p:sp>
-      <p:sp>
-        <p:nvSpPr>
-          <p:cNvPr id="4" name="Date Placeholder 3"/>
-          <p:cNvSpPr>
-            <a:spLocks noGrp="1"/>
-          </p:cNvSpPr>
-          <p:nvPr>
-            <p:ph idx="10" sz="half" type="dt"/>
-          </p:nvPr>
-        </p:nvSpPr>
-        <p:spPr/>
-        <p:txBody>
-          <a:bodyPr/>
-          <a:lstStyle/>
-          <a:p>
-            <a:pPr lvl="0" indent="0" marL="0">
-              <a:buNone/>
-            </a:pPr>
-            <a:r>
-              <a:rPr/>
-              <a:t>Created 2023-04-12</a:t>
-            </a:r>
-          </a:p>
-        </p:txBody>
-      </p:sp>
     </p:spTree>
   </p:cSld>
 </p:sld>
@@ -5177,7 +6350,7 @@
             </a:pPr>
             <a:r>
               <a:rPr/>
-              <a:t>Example Structure/roof</a:t>
+              <a:t>NHCS conditions data on grounds</a:t>
             </a:r>
           </a:p>
         </p:txBody>
@@ -5197,12 +6370,38 @@
           <a:bodyPr/>
           <a:lstStyle/>
           <a:p>
-            <a:pPr lvl="0" indent="-457200" marL="457200">
-              <a:buAutoNum startAt="2" type="arabicPeriod"/>
-            </a:pPr>
-            <a:r>
-              <a:rPr/>
-              <a:t>Seriously Deteriorated. There are no holes present. The roof has sagging rafters, but sagging is not severe. Roofing shingles are extremely deteriorated. More than five shingles are currently missing on the front exposure of the roof. It appears some sheathing needs to be replaced. Soffits and fascia boards display moderate rot and deterioration.</a:t>
+            <a:pPr lvl="0"/>
+            <a:r>
+              <a:rPr/>
+              <a:t>Private sidewalk/drive</a:t>
+            </a:r>
+          </a:p>
+          <a:p>
+            <a:pPr lvl="0"/>
+            <a:r>
+              <a:rPr/>
+              <a:t>Lawn/shrubs</a:t>
+            </a:r>
+          </a:p>
+          <a:p>
+            <a:pPr lvl="0"/>
+            <a:r>
+              <a:rPr/>
+              <a:t>Nuisance vehicles</a:t>
+            </a:r>
+          </a:p>
+          <a:p>
+            <a:pPr lvl="0"/>
+            <a:r>
+              <a:rPr/>
+              <a:t>Litter</a:t>
+            </a:r>
+          </a:p>
+          <a:p>
+            <a:pPr lvl="0"/>
+            <a:r>
+              <a:rPr/>
+              <a:t>Open storage</a:t>
             </a:r>
           </a:p>
         </p:txBody>
@@ -5249,7 +6448,7 @@
             </a:pPr>
             <a:r>
               <a:rPr/>
-              <a:t>Example Structure/roof</a:t>
+              <a:t>NHCS Infrastructure</a:t>
             </a:r>
           </a:p>
         </p:txBody>
@@ -5269,12 +6468,38 @@
           <a:bodyPr/>
           <a:lstStyle/>
           <a:p>
-            <a:pPr lvl="0" indent="-457200" marL="457200">
-              <a:buAutoNum startAt="3" type="arabicPeriod"/>
-            </a:pPr>
-            <a:r>
-              <a:rPr/>
-              <a:t>Substandard. There are no holes or sagging. Roofing shingles are deteriorated and should be removed before new shingles are installed. Less than five shingles are missing on the entire roof. Soffits and fascia boards display slight rot deterioration.</a:t>
+            <a:pPr lvl="0"/>
+            <a:r>
+              <a:rPr/>
+              <a:t>Public sidewalk</a:t>
+            </a:r>
+          </a:p>
+          <a:p>
+            <a:pPr lvl="0"/>
+            <a:r>
+              <a:rPr/>
+              <a:t>Curb</a:t>
+            </a:r>
+          </a:p>
+          <a:p>
+            <a:pPr lvl="0"/>
+            <a:r>
+              <a:rPr/>
+              <a:t>Street lighting</a:t>
+            </a:r>
+          </a:p>
+          <a:p>
+            <a:pPr lvl="0"/>
+            <a:r>
+              <a:rPr/>
+              <a:t>Catch basin</a:t>
+            </a:r>
+          </a:p>
+          <a:p>
+            <a:pPr lvl="0"/>
+            <a:r>
+              <a:rPr/>
+              <a:t>Street</a:t>
             </a:r>
           </a:p>
         </p:txBody>
@@ -5321,7 +6546,7 @@
             </a:pPr>
             <a:r>
               <a:rPr/>
-              <a:t>Example Structure/roof</a:t>
+              <a:t>Condition ratings</a:t>
             </a:r>
           </a:p>
         </p:txBody>
@@ -5341,12 +6566,66 @@
           <a:bodyPr/>
           <a:lstStyle/>
           <a:p>
-            <a:pPr lvl="0" indent="-457200" marL="457200">
-              <a:buAutoNum startAt="4" type="arabicPeriod"/>
-            </a:pPr>
-            <a:r>
-              <a:rPr/>
-              <a:t>Good. Roof shingles show slight wear. (discoloration can be seen from street, or faded color do to loss of rock). There are no holes or sagging rafters. Soffits and fascia boards may need painting, but there is no rot or deterioration.</a:t>
+            <a:pPr lvl="0"/>
+            <a:r>
+              <a:rPr/>
+              <a:t>Likert scale (1-5)</a:t>
+            </a:r>
+          </a:p>
+          <a:p>
+            <a:pPr lvl="1"/>
+            <a:r>
+              <a:rPr/>
+              <a:t>1, Severely deteriorated</a:t>
+            </a:r>
+          </a:p>
+          <a:p>
+            <a:pPr lvl="1"/>
+            <a:r>
+              <a:rPr/>
+              <a:t>2, Seriously deteriorated</a:t>
+            </a:r>
+          </a:p>
+          <a:p>
+            <a:pPr lvl="1"/>
+            <a:r>
+              <a:rPr/>
+              <a:t>3, Substandard</a:t>
+            </a:r>
+          </a:p>
+          <a:p>
+            <a:pPr lvl="1"/>
+            <a:r>
+              <a:rPr/>
+              <a:t>4, Good</a:t>
+            </a:r>
+          </a:p>
+          <a:p>
+            <a:pPr lvl="1"/>
+            <a:r>
+              <a:rPr/>
+              <a:t>5, Excellent</a:t>
+            </a:r>
+          </a:p>
+          <a:p>
+            <a:pPr lvl="0"/>
+            <a:r>
+              <a:rPr/>
+              <a:t>Missing value codes</a:t>
+            </a:r>
+          </a:p>
+          <a:p>
+            <a:pPr lvl="1"/>
+            <a:r>
+              <a:rPr/>
+              <a:t>6, not applicable</a:t>
+            </a:r>
+          </a:p>
+          <a:p>
+            <a:pPr lvl="1"/>
+            <a:r>
+              <a:rPr/>
+              <a:t>7, unable to rate</a:t>
             </a:r>
           </a:p>
         </p:txBody>
@@ -5414,11 +6693,11 @@
           <a:lstStyle/>
           <a:p>
             <a:pPr lvl="0" indent="-457200" marL="457200">
-              <a:buAutoNum startAt="5" type="arabicPeriod"/>
-            </a:pPr>
-            <a:r>
-              <a:rPr/>
-              <a:t>Excellent. Roofing shingles show no wear. Soffits and fascia boards display no rot nor deterioration and are adequately installed.</a:t>
+              <a:buAutoNum type="arabicPeriod"/>
+            </a:pPr>
+            <a:r>
+              <a:rPr/>
+              <a:t>Severely Deteriorated. There are holes visible through roof sheathing. Rafters are sagging or collapsed. Soffits and fascia boards are missing or display severe rot and deterioration.</a:t>
             </a:r>
           </a:p>
         </p:txBody>
@@ -5486,11 +6765,11 @@
           <a:lstStyle/>
           <a:p>
             <a:pPr lvl="0" indent="-457200" marL="457200">
-              <a:buAutoNum startAt="6" type="arabicPeriod"/>
-            </a:pPr>
-            <a:r>
-              <a:rPr/>
-              <a:t>Not applicable. Characteristic does not apply to rated parcel (e.g., roof rating for parcels with no structure).</a:t>
+              <a:buAutoNum startAt="2" type="arabicPeriod"/>
+            </a:pPr>
+            <a:r>
+              <a:rPr/>
+              <a:t>Seriously Deteriorated. There are no holes present. The roof has sagging rafters, but sagging is not severe. Roofing shingles are extremely deteriorated. More than five shingles are currently missing on the front exposure of the roof. It appears some sheathing needs to be replaced. Soffits and fascia boards display moderate rot and deterioration.</a:t>
             </a:r>
           </a:p>
         </p:txBody>
@@ -5558,11 +6837,11 @@
           <a:lstStyle/>
           <a:p>
             <a:pPr lvl="0" indent="-457200" marL="457200">
-              <a:buAutoNum startAt="7" type="arabicPeriod"/>
-            </a:pPr>
-            <a:r>
-              <a:rPr/>
-              <a:t>Un-ratable. Characteristic applies to rated parcel, but rating could not be determined (e.g., roof rating for structures with flat roofs, or where line of sight to roof is obscured by trees).</a:t>
+              <a:buAutoNum startAt="3" type="arabicPeriod"/>
+            </a:pPr>
+            <a:r>
+              <a:rPr/>
+              <a:t>Substandard. There are no holes or sagging. Roofing shingles are deteriorated and should be removed before new shingles are installed. Less than five shingles are missing on the entire roof. Soffits and fascia boards display slight rot deterioration.</a:t>
             </a:r>
           </a:p>
         </p:txBody>
@@ -5609,7 +6888,7 @@
             </a:pPr>
             <a:r>
               <a:rPr/>
-              <a:t>Training</a:t>
+              <a:t>Example Structure/roof</a:t>
             </a:r>
           </a:p>
         </p:txBody>
@@ -5629,31 +6908,12 @@
           <a:bodyPr/>
           <a:lstStyle/>
           <a:p>
-            <a:pPr lvl="0"/>
-            <a:r>
-              <a:rPr/>
-              <a:t>Classroom session with visual aids</a:t>
-            </a:r>
-          </a:p>
-          <a:p>
-            <a:pPr lvl="0"/>
-            <a:r>
-              <a:rPr/>
-              <a:t>Group discussion of a test block</a:t>
-            </a:r>
-          </a:p>
-          <a:p>
-            <a:pPr lvl="0"/>
-            <a:r>
-              <a:rPr/>
-              <a:t>Individual survey of two test blocks</a:t>
-            </a:r>
-          </a:p>
-          <a:p>
-            <a:pPr lvl="1"/>
-            <a:r>
-              <a:rPr/>
-              <a:t>Trainee ratings compared with expert</a:t>
+            <a:pPr lvl="0" indent="-457200" marL="457200">
+              <a:buAutoNum startAt="4" type="arabicPeriod"/>
+            </a:pPr>
+            <a:r>
+              <a:rPr/>
+              <a:t>Good. This represents slight discoloration or the need to repaint soffits and fascia boards.</a:t>
             </a:r>
           </a:p>
         </p:txBody>
@@ -5700,7 +6960,32 @@
             </a:pPr>
             <a:r>
               <a:rPr/>
-              <a:t>Quality Control</a:t>
+              <a:t>Example Structure/roof</a:t>
+            </a:r>
+          </a:p>
+        </p:txBody>
+      </p:sp>
+      <p:sp>
+        <p:nvSpPr>
+          <p:cNvPr id="3" name="Content Placeholder 2"/>
+          <p:cNvSpPr>
+            <a:spLocks noGrp="1"/>
+          </p:cNvSpPr>
+          <p:nvPr>
+            <p:ph idx="1"/>
+          </p:nvPr>
+        </p:nvSpPr>
+        <p:spPr/>
+        <p:txBody>
+          <a:bodyPr/>
+          <a:lstStyle/>
+          <a:p>
+            <a:pPr lvl="0" indent="-457200" marL="457200">
+              <a:buAutoNum startAt="5" type="arabicPeriod"/>
+            </a:pPr>
+            <a:r>
+              <a:rPr/>
+              <a:t>Excellent. Roofing shingles show no wear. Soffits and fascia boards display no rot nor deterioration and are adequately installed.</a:t>
             </a:r>
           </a:p>
         </p:txBody>
@@ -5747,7 +7032,32 @@
             </a:pPr>
             <a:r>
               <a:rPr/>
-              <a:t>Who uses the NCHS</a:t>
+              <a:t>Example Structure/roof</a:t>
+            </a:r>
+          </a:p>
+        </p:txBody>
+      </p:sp>
+      <p:sp>
+        <p:nvSpPr>
+          <p:cNvPr id="3" name="Content Placeholder 2"/>
+          <p:cNvSpPr>
+            <a:spLocks noGrp="1"/>
+          </p:cNvSpPr>
+          <p:nvPr>
+            <p:ph idx="1"/>
+          </p:nvPr>
+        </p:nvSpPr>
+        <p:spPr/>
+        <p:txBody>
+          <a:bodyPr/>
+          <a:lstStyle/>
+          <a:p>
+            <a:pPr lvl="0" indent="-457200" marL="457200">
+              <a:buAutoNum startAt="6" type="arabicPeriod"/>
+            </a:pPr>
+            <a:r>
+              <a:rPr/>
+              <a:t>Not applicable. Characteristic does not apply to rated parcel (e.g., roof rating for parcels with no structure).</a:t>
             </a:r>
           </a:p>
         </p:txBody>
@@ -5758,6 +7068,554 @@
 </file>
 
 <file path=ppt/slides/slide19.xml><?xml version="1.0" encoding="utf-8"?>
+<p:sld xmlns:a="http://schemas.openxmlformats.org/drawingml/2006/main" xmlns:r="http://schemas.openxmlformats.org/officeDocument/2006/relationships" xmlns:p="http://schemas.openxmlformats.org/presentationml/2006/main">
+  <p:cSld>
+    <p:spTree>
+      <p:nvGrpSpPr>
+        <p:cNvPr id="1" name=""/>
+        <p:cNvGrpSpPr/>
+        <p:nvPr/>
+      </p:nvGrpSpPr>
+      <p:grpSpPr>
+        <a:xfrm>
+          <a:off x="0" y="0"/>
+          <a:ext cx="0" cy="0"/>
+          <a:chOff x="0" y="0"/>
+          <a:chExt cx="0" cy="0"/>
+        </a:xfrm>
+      </p:grpSpPr>
+      <p:sp>
+        <p:nvSpPr>
+          <p:cNvPr id="2" name="Title 1"/>
+          <p:cNvSpPr>
+            <a:spLocks noGrp="1"/>
+          </p:cNvSpPr>
+          <p:nvPr>
+            <p:ph type="title"/>
+          </p:nvPr>
+        </p:nvSpPr>
+        <p:spPr/>
+        <p:txBody>
+          <a:bodyPr/>
+          <a:lstStyle/>
+          <a:p>
+            <a:pPr lvl="0" indent="0" marL="0">
+              <a:buNone/>
+            </a:pPr>
+            <a:r>
+              <a:rPr/>
+              <a:t>Example Structure/roof</a:t>
+            </a:r>
+          </a:p>
+        </p:txBody>
+      </p:sp>
+      <p:sp>
+        <p:nvSpPr>
+          <p:cNvPr id="3" name="Content Placeholder 2"/>
+          <p:cNvSpPr>
+            <a:spLocks noGrp="1"/>
+          </p:cNvSpPr>
+          <p:nvPr>
+            <p:ph idx="1"/>
+          </p:nvPr>
+        </p:nvSpPr>
+        <p:spPr/>
+        <p:txBody>
+          <a:bodyPr/>
+          <a:lstStyle/>
+          <a:p>
+            <a:pPr lvl="0" indent="-457200" marL="457200">
+              <a:buAutoNum startAt="7" type="arabicPeriod"/>
+            </a:pPr>
+            <a:r>
+              <a:rPr/>
+              <a:t>Un-ratable. Characteristic applies to rated parcel, but rating could not be determined (e.g., structures with flat roofs, or where line of sight to roof is obscured by trees).</a:t>
+            </a:r>
+          </a:p>
+        </p:txBody>
+      </p:sp>
+    </p:spTree>
+  </p:cSld>
+</p:sld>
+</file>
+
+<file path=ppt/slides/slide2.xml><?xml version="1.0" encoding="utf-8"?>
+<p:sld xmlns:a="http://schemas.openxmlformats.org/drawingml/2006/main" xmlns:r="http://schemas.openxmlformats.org/officeDocument/2006/relationships" xmlns:p="http://schemas.openxmlformats.org/presentationml/2006/main">
+  <p:cSld>
+    <p:spTree>
+      <p:nvGrpSpPr>
+        <p:cNvPr id="1" name=""/>
+        <p:cNvGrpSpPr/>
+        <p:nvPr/>
+      </p:nvGrpSpPr>
+      <p:grpSpPr>
+        <a:xfrm>
+          <a:off x="0" y="0"/>
+          <a:ext cx="0" cy="0"/>
+          <a:chOff x="0" y="0"/>
+          <a:chExt cx="0" cy="0"/>
+        </a:xfrm>
+      </p:grpSpPr>
+      <p:sp>
+        <p:nvSpPr>
+          <p:cNvPr id="2" name="Title 1"/>
+          <p:cNvSpPr>
+            <a:spLocks noGrp="1"/>
+          </p:cNvSpPr>
+          <p:nvPr>
+            <p:ph type="title"/>
+          </p:nvPr>
+        </p:nvSpPr>
+        <p:spPr/>
+        <p:txBody>
+          <a:bodyPr/>
+          <a:lstStyle/>
+          <a:p>
+            <a:pPr lvl="0" indent="0" marL="0">
+              <a:buNone/>
+            </a:pPr>
+            <a:r>
+              <a:rPr/>
+              <a:t>My background</a:t>
+            </a:r>
+          </a:p>
+        </p:txBody>
+      </p:sp>
+      <p:sp>
+        <p:nvSpPr>
+          <p:cNvPr id="3" name="Content Placeholder 2"/>
+          <p:cNvSpPr>
+            <a:spLocks noGrp="1"/>
+          </p:cNvSpPr>
+          <p:nvPr>
+            <p:ph idx="1"/>
+          </p:nvPr>
+        </p:nvSpPr>
+        <p:spPr/>
+        <p:txBody>
+          <a:bodyPr/>
+          <a:lstStyle/>
+          <a:p>
+            <a:pPr lvl="0"/>
+            <a:r>
+              <a:rPr/>
+              <a:t>PhD in Statistics</a:t>
+            </a:r>
+          </a:p>
+          <a:p>
+            <a:pPr lvl="0"/>
+            <a:r>
+              <a:rPr/>
+              <a:t>Faculty member</a:t>
+            </a:r>
+          </a:p>
+          <a:p>
+            <a:pPr lvl="1"/>
+            <a:r>
+              <a:rPr/>
+              <a:t>Department of Biomedical and Health Informatics</a:t>
+            </a:r>
+          </a:p>
+          <a:p>
+            <a:pPr lvl="1"/>
+            <a:r>
+              <a:rPr/>
+              <a:t>Informal consultant with Center for Economic Information (CEI)</a:t>
+            </a:r>
+          </a:p>
+        </p:txBody>
+      </p:sp>
+    </p:spTree>
+  </p:cSld>
+</p:sld>
+</file>
+
+<file path=ppt/slides/slide20.xml><?xml version="1.0" encoding="utf-8"?>
+<p:sld xmlns:a="http://schemas.openxmlformats.org/drawingml/2006/main" xmlns:r="http://schemas.openxmlformats.org/officeDocument/2006/relationships" xmlns:p="http://schemas.openxmlformats.org/presentationml/2006/main">
+  <p:cSld>
+    <p:spTree>
+      <p:nvGrpSpPr>
+        <p:cNvPr id="1" name=""/>
+        <p:cNvGrpSpPr/>
+        <p:nvPr/>
+      </p:nvGrpSpPr>
+      <p:grpSpPr>
+        <a:xfrm>
+          <a:off x="0" y="0"/>
+          <a:ext cx="0" cy="0"/>
+          <a:chOff x="0" y="0"/>
+          <a:chExt cx="0" cy="0"/>
+        </a:xfrm>
+      </p:grpSpPr>
+      <p:sp>
+        <p:nvSpPr>
+          <p:cNvPr id="2" name="Title 1"/>
+          <p:cNvSpPr>
+            <a:spLocks noGrp="1"/>
+          </p:cNvSpPr>
+          <p:nvPr>
+            <p:ph type="title"/>
+          </p:nvPr>
+        </p:nvSpPr>
+        <p:spPr/>
+        <p:txBody>
+          <a:bodyPr/>
+          <a:lstStyle/>
+          <a:p>
+            <a:pPr lvl="0" indent="0" marL="0">
+              <a:buNone/>
+            </a:pPr>
+            <a:r>
+              <a:rPr/>
+              <a:t>Training</a:t>
+            </a:r>
+          </a:p>
+        </p:txBody>
+      </p:sp>
+      <p:sp>
+        <p:nvSpPr>
+          <p:cNvPr id="3" name="Content Placeholder 2"/>
+          <p:cNvSpPr>
+            <a:spLocks noGrp="1"/>
+          </p:cNvSpPr>
+          <p:nvPr>
+            <p:ph idx="1"/>
+          </p:nvPr>
+        </p:nvSpPr>
+        <p:spPr/>
+        <p:txBody>
+          <a:bodyPr/>
+          <a:lstStyle/>
+          <a:p>
+            <a:pPr lvl="0"/>
+            <a:r>
+              <a:rPr/>
+              <a:t>Classroom session with visual aids</a:t>
+            </a:r>
+          </a:p>
+          <a:p>
+            <a:pPr lvl="0"/>
+            <a:r>
+              <a:rPr/>
+              <a:t>Group discussion of a test block</a:t>
+            </a:r>
+          </a:p>
+          <a:p>
+            <a:pPr lvl="0"/>
+            <a:r>
+              <a:rPr/>
+              <a:t>Individual survey of two test blocks</a:t>
+            </a:r>
+          </a:p>
+          <a:p>
+            <a:pPr lvl="1"/>
+            <a:r>
+              <a:rPr/>
+              <a:t>Trainee ratings compared with expert</a:t>
+            </a:r>
+          </a:p>
+        </p:txBody>
+      </p:sp>
+    </p:spTree>
+  </p:cSld>
+</p:sld>
+</file>
+
+<file path=ppt/slides/slide21.xml><?xml version="1.0" encoding="utf-8"?>
+<p:sld xmlns:a="http://schemas.openxmlformats.org/drawingml/2006/main" xmlns:r="http://schemas.openxmlformats.org/officeDocument/2006/relationships" xmlns:p="http://schemas.openxmlformats.org/presentationml/2006/main">
+  <p:cSld>
+    <p:spTree>
+      <p:nvGrpSpPr>
+        <p:cNvPr id="1" name=""/>
+        <p:cNvGrpSpPr/>
+        <p:nvPr/>
+      </p:nvGrpSpPr>
+      <p:grpSpPr>
+        <a:xfrm>
+          <a:off x="0" y="0"/>
+          <a:ext cx="0" cy="0"/>
+          <a:chOff x="0" y="0"/>
+          <a:chExt cx="0" cy="0"/>
+        </a:xfrm>
+      </p:grpSpPr>
+      <p:sp>
+        <p:nvSpPr>
+          <p:cNvPr id="2" name="Title 1"/>
+          <p:cNvSpPr>
+            <a:spLocks noGrp="1"/>
+          </p:cNvSpPr>
+          <p:nvPr>
+            <p:ph type="title"/>
+          </p:nvPr>
+        </p:nvSpPr>
+        <p:spPr/>
+        <p:txBody>
+          <a:bodyPr/>
+          <a:lstStyle/>
+          <a:p>
+            <a:pPr lvl="0" indent="0" marL="0">
+              <a:buNone/>
+            </a:pPr>
+            <a:r>
+              <a:rPr/>
+              <a:t>Quality Control</a:t>
+            </a:r>
+          </a:p>
+        </p:txBody>
+      </p:sp>
+      <p:sp>
+        <p:nvSpPr>
+          <p:cNvPr id="3" name="Content Placeholder 2"/>
+          <p:cNvSpPr>
+            <a:spLocks noGrp="1"/>
+          </p:cNvSpPr>
+          <p:nvPr>
+            <p:ph idx="1"/>
+          </p:nvPr>
+        </p:nvSpPr>
+        <p:spPr/>
+        <p:txBody>
+          <a:bodyPr/>
+          <a:lstStyle/>
+          <a:p>
+            <a:pPr lvl="0"/>
+            <a:r>
+              <a:rPr/>
+              <a:t>Tow raters for every parcel</a:t>
+            </a:r>
+          </a:p>
+          <a:p>
+            <a:pPr lvl="0"/>
+            <a:r>
+              <a:rPr/>
+              <a:t>Two blocks randomly select from survey data</a:t>
+            </a:r>
+          </a:p>
+          <a:p>
+            <a:pPr lvl="1"/>
+            <a:r>
+              <a:rPr/>
+              <a:t>Qualitative agreement on classification data</a:t>
+            </a:r>
+          </a:p>
+          <a:p>
+            <a:pPr lvl="1"/>
+            <a:r>
+              <a:rPr/>
+              <a:t>Quantitative agreement on condition data</a:t>
+            </a:r>
+          </a:p>
+        </p:txBody>
+      </p:sp>
+    </p:spTree>
+  </p:cSld>
+</p:sld>
+</file>
+
+<file path=ppt/slides/slide22.xml><?xml version="1.0" encoding="utf-8"?>
+<p:sld xmlns:a="http://schemas.openxmlformats.org/drawingml/2006/main" xmlns:r="http://schemas.openxmlformats.org/officeDocument/2006/relationships" xmlns:p="http://schemas.openxmlformats.org/presentationml/2006/main">
+  <p:cSld>
+    <p:spTree>
+      <p:nvGrpSpPr>
+        <p:cNvPr id="1" name=""/>
+        <p:cNvGrpSpPr/>
+        <p:nvPr/>
+      </p:nvGrpSpPr>
+      <p:grpSpPr>
+        <a:xfrm>
+          <a:off x="0" y="0"/>
+          <a:ext cx="0" cy="0"/>
+          <a:chOff x="0" y="0"/>
+          <a:chExt cx="0" cy="0"/>
+        </a:xfrm>
+      </p:grpSpPr>
+      <p:sp>
+        <p:nvSpPr>
+          <p:cNvPr id="2" name="Title 1"/>
+          <p:cNvSpPr>
+            <a:spLocks noGrp="1"/>
+          </p:cNvSpPr>
+          <p:nvPr>
+            <p:ph type="title"/>
+          </p:nvPr>
+        </p:nvSpPr>
+        <p:spPr/>
+        <p:txBody>
+          <a:bodyPr/>
+          <a:lstStyle/>
+          <a:p>
+            <a:pPr lvl="0" indent="0" marL="0">
+              <a:buNone/>
+            </a:pPr>
+            <a:r>
+              <a:rPr/>
+              <a:t>Who uses the NHCS</a:t>
+            </a:r>
+          </a:p>
+        </p:txBody>
+      </p:sp>
+      <p:sp>
+        <p:nvSpPr>
+          <p:cNvPr id="3" name="Content Placeholder 2"/>
+          <p:cNvSpPr>
+            <a:spLocks noGrp="1"/>
+          </p:cNvSpPr>
+          <p:nvPr>
+            <p:ph idx="1"/>
+          </p:nvPr>
+        </p:nvSpPr>
+        <p:spPr/>
+        <p:txBody>
+          <a:bodyPr/>
+          <a:lstStyle/>
+          <a:p>
+            <a:pPr lvl="0"/>
+            <a:r>
+              <a:rPr/>
+              <a:t>Community development corporations</a:t>
+            </a:r>
+          </a:p>
+          <a:p>
+            <a:pPr lvl="0"/>
+            <a:r>
+              <a:rPr/>
+              <a:t>City urban planners</a:t>
+            </a:r>
+          </a:p>
+          <a:p>
+            <a:pPr lvl="0"/>
+            <a:r>
+              <a:rPr/>
+              <a:t>Real estate agencies</a:t>
+            </a:r>
+          </a:p>
+          <a:p>
+            <a:pPr lvl="0"/>
+            <a:r>
+              <a:rPr/>
+              <a:t>Mortgage bankers</a:t>
+            </a:r>
+          </a:p>
+          <a:p>
+            <a:pPr lvl="0"/>
+            <a:r>
+              <a:rPr/>
+              <a:t>Construction contractors</a:t>
+            </a:r>
+          </a:p>
+          <a:p>
+            <a:pPr lvl="0"/>
+            <a:r>
+              <a:rPr/>
+              <a:t>Insurance companies</a:t>
+            </a:r>
+          </a:p>
+          <a:p>
+            <a:pPr lvl="0"/>
+            <a:r>
+              <a:rPr/>
+              <a:t>Neighborhood and community associations</a:t>
+            </a:r>
+          </a:p>
+        </p:txBody>
+      </p:sp>
+    </p:spTree>
+  </p:cSld>
+</p:sld>
+</file>
+
+<file path=ppt/slides/slide23.xml><?xml version="1.0" encoding="utf-8"?>
+<p:sld xmlns:a="http://schemas.openxmlformats.org/drawingml/2006/main" xmlns:r="http://schemas.openxmlformats.org/officeDocument/2006/relationships" xmlns:p="http://schemas.openxmlformats.org/presentationml/2006/main">
+  <p:cSld>
+    <p:spTree>
+      <p:nvGrpSpPr>
+        <p:cNvPr id="1" name=""/>
+        <p:cNvGrpSpPr/>
+        <p:nvPr/>
+      </p:nvGrpSpPr>
+      <p:grpSpPr>
+        <a:xfrm>
+          <a:off x="0" y="0"/>
+          <a:ext cx="0" cy="0"/>
+          <a:chOff x="0" y="0"/>
+          <a:chExt cx="0" cy="0"/>
+        </a:xfrm>
+      </p:grpSpPr>
+      <p:sp>
+        <p:nvSpPr>
+          <p:cNvPr id="2" name="Title 1"/>
+          <p:cNvSpPr>
+            <a:spLocks noGrp="1"/>
+          </p:cNvSpPr>
+          <p:nvPr>
+            <p:ph type="title"/>
+          </p:nvPr>
+        </p:nvSpPr>
+        <p:spPr/>
+        <p:txBody>
+          <a:bodyPr/>
+          <a:lstStyle/>
+          <a:p>
+            <a:pPr lvl="0" indent="0" marL="0">
+              <a:buNone/>
+            </a:pPr>
+            <a:r>
+              <a:rPr/>
+              <a:t>Research applications of the NHCS</a:t>
+            </a:r>
+          </a:p>
+        </p:txBody>
+      </p:sp>
+      <p:sp>
+        <p:nvSpPr>
+          <p:cNvPr id="3" name="Content Placeholder 2"/>
+          <p:cNvSpPr>
+            <a:spLocks noGrp="1"/>
+          </p:cNvSpPr>
+          <p:nvPr>
+            <p:ph idx="1"/>
+          </p:nvPr>
+        </p:nvSpPr>
+        <p:spPr/>
+        <p:txBody>
+          <a:bodyPr/>
+          <a:lstStyle/>
+          <a:p>
+            <a:pPr lvl="0"/>
+            <a:r>
+              <a:rPr/>
+              <a:t>Data at the finest level of detail</a:t>
+            </a:r>
+          </a:p>
+          <a:p>
+            <a:pPr lvl="0"/>
+            <a:r>
+              <a:rPr/>
+              <a:t>Easy to incorporate with higher level geographies</a:t>
+            </a:r>
+          </a:p>
+          <a:p>
+            <a:pPr lvl="0"/>
+            <a:r>
+              <a:rPr/>
+              <a:t>Easy to link with other records</a:t>
+            </a:r>
+          </a:p>
+          <a:p>
+            <a:pPr lvl="1"/>
+            <a:r>
+              <a:rPr/>
+              <a:t>Electronic health records</a:t>
+            </a:r>
+          </a:p>
+        </p:txBody>
+      </p:sp>
+    </p:spTree>
+  </p:cSld>
+</p:sld>
+</file>
+
+<file path=ppt/slides/slide24.xml><?xml version="1.0" encoding="utf-8"?>
 <p:sld xmlns:a="http://schemas.openxmlformats.org/drawingml/2006/main" xmlns:r="http://schemas.openxmlformats.org/officeDocument/2006/relationships" xmlns:p="http://schemas.openxmlformats.org/presentationml/2006/main">
   <p:cSld>
     <p:spTree>
@@ -5864,7 +7722,7 @@
 </p:sld>
 </file>
 
-<file path=ppt/slides/slide2.xml><?xml version="1.0" encoding="utf-8"?>
+<file path=ppt/slides/slide25.xml><?xml version="1.0" encoding="utf-8"?>
 <p:sld xmlns:a="http://schemas.openxmlformats.org/drawingml/2006/main" xmlns:r="http://schemas.openxmlformats.org/officeDocument/2006/relationships" xmlns:p="http://schemas.openxmlformats.org/presentationml/2006/main">
   <p:cSld>
     <p:spTree>
@@ -5901,7 +7759,7 @@
             </a:pPr>
             <a:r>
               <a:rPr/>
-              <a:t>Overview</a:t>
+              <a:t>Advantages of using NHCS</a:t>
             </a:r>
           </a:p>
         </p:txBody>
@@ -5924,21 +7782,42 @@
             <a:pPr lvl="0"/>
             <a:r>
               <a:rPr/>
-              <a:t>Neighborhood Housing Conditions Survey (NHCS)</a:t>
+              <a:t>Fast and inexpensive</a:t>
             </a:r>
           </a:p>
           <a:p>
             <a:pPr lvl="1"/>
             <a:r>
               <a:rPr/>
-              <a:t>Windshield survey</a:t>
+              <a:t>Estimated total costs $6.50 per parcel</a:t>
+            </a:r>
+          </a:p>
+          <a:p>
+            <a:pPr lvl="0"/>
+            <a:r>
+              <a:rPr/>
+              <a:t>Simple ethical review</a:t>
             </a:r>
           </a:p>
           <a:p>
             <a:pPr lvl="1"/>
             <a:r>
               <a:rPr/>
-              <a:t>Visible at street level</a:t>
+              <a:t>Observation in a public setting</a:t>
+            </a:r>
+          </a:p>
+          <a:p>
+            <a:pPr lvl="0"/>
+            <a:r>
+              <a:rPr/>
+              <a:t>Detailed training and quality control</a:t>
+            </a:r>
+          </a:p>
+          <a:p>
+            <a:pPr lvl="1"/>
+            <a:r>
+              <a:rPr b="1"/>
+              <a:t>Easy to use in other locations</a:t>
             </a:r>
           </a:p>
         </p:txBody>
@@ -5948,54 +7827,7 @@
 </p:sld>
 </file>
 
-<file path=ppt/slides/slide20.xml><?xml version="1.0" encoding="utf-8"?>
-<p:sld xmlns:a="http://schemas.openxmlformats.org/drawingml/2006/main" xmlns:r="http://schemas.openxmlformats.org/officeDocument/2006/relationships" xmlns:p="http://schemas.openxmlformats.org/presentationml/2006/main">
-  <p:cSld>
-    <p:spTree>
-      <p:nvGrpSpPr>
-        <p:cNvPr id="1" name=""/>
-        <p:cNvGrpSpPr/>
-        <p:nvPr/>
-      </p:nvGrpSpPr>
-      <p:grpSpPr>
-        <a:xfrm>
-          <a:off x="0" y="0"/>
-          <a:ext cx="0" cy="0"/>
-          <a:chOff x="0" y="0"/>
-          <a:chExt cx="0" cy="0"/>
-        </a:xfrm>
-      </p:grpSpPr>
-      <p:sp>
-        <p:nvSpPr>
-          <p:cNvPr id="2" name="Title 1"/>
-          <p:cNvSpPr>
-            <a:spLocks noGrp="1"/>
-          </p:cNvSpPr>
-          <p:nvPr>
-            <p:ph type="title"/>
-          </p:nvPr>
-        </p:nvSpPr>
-        <p:spPr/>
-        <p:txBody>
-          <a:bodyPr/>
-          <a:lstStyle/>
-          <a:p>
-            <a:pPr lvl="0" indent="0" marL="0">
-              <a:buNone/>
-            </a:pPr>
-            <a:r>
-              <a:rPr/>
-              <a:t>Advantages of using NHCS</a:t>
-            </a:r>
-          </a:p>
-        </p:txBody>
-      </p:sp>
-    </p:spTree>
-  </p:cSld>
-</p:sld>
-</file>
-
-<file path=ppt/slides/slide21.xml><?xml version="1.0" encoding="utf-8"?>
+<file path=ppt/slides/slide26.xml><?xml version="1.0" encoding="utf-8"?>
 <p:sld xmlns:a="http://schemas.openxmlformats.org/drawingml/2006/main" xmlns:r="http://schemas.openxmlformats.org/officeDocument/2006/relationships" xmlns:p="http://schemas.openxmlformats.org/presentationml/2006/main">
   <p:cSld>
     <p:spTree>
@@ -6102,7 +7934,7 @@
 </p:sld>
 </file>
 
-<file path=ppt/slides/slide22.xml><?xml version="1.0" encoding="utf-8"?>
+<file path=ppt/slides/slide27.xml><?xml version="1.0" encoding="utf-8"?>
 <p:sld xmlns:a="http://schemas.openxmlformats.org/drawingml/2006/main" xmlns:r="http://schemas.openxmlformats.org/officeDocument/2006/relationships" xmlns:p="http://schemas.openxmlformats.org/presentationml/2006/main">
   <p:cSld>
     <p:spTree>
@@ -6209,7 +8041,7 @@
 </p:sld>
 </file>
 
-<file path=ppt/slides/slide23.xml><?xml version="1.0" encoding="utf-8"?>
+<file path=ppt/slides/slide28.xml><?xml version="1.0" encoding="utf-8"?>
 <p:sld xmlns:a="http://schemas.openxmlformats.org/drawingml/2006/main" xmlns:r="http://schemas.openxmlformats.org/officeDocument/2006/relationships" xmlns:p="http://schemas.openxmlformats.org/presentationml/2006/main">
   <p:cSld>
     <p:spTree>
@@ -6260,7 +8092,7 @@
           <p:nvPr/>
         </p:nvPicPr>
         <p:blipFill>
-          <a:blip r:embed="rId2"/>
+          <a:blip r:embed="rId3"/>
           <a:stretch>
             <a:fillRect/>
           </a:stretch>
@@ -6316,7 +8148,7 @@
 </p:sld>
 </file>
 
-<file path=ppt/slides/slide24.xml><?xml version="1.0" encoding="utf-8"?>
+<file path=ppt/slides/slide29.xml><?xml version="1.0" encoding="utf-8"?>
 <p:sld xmlns:a="http://schemas.openxmlformats.org/drawingml/2006/main" xmlns:r="http://schemas.openxmlformats.org/officeDocument/2006/relationships" xmlns:p="http://schemas.openxmlformats.org/presentationml/2006/main">
   <p:cSld>
     <p:spTree>
@@ -6367,7 +8199,7 @@
           <p:nvPr/>
         </p:nvPicPr>
         <p:blipFill>
-          <a:blip r:embed="rId2"/>
+          <a:blip r:embed="rId3"/>
           <a:stretch>
             <a:fillRect/>
           </a:stretch>
@@ -6414,323 +8246,6 @@
             <a:r>
               <a:rPr/>
               <a:t>Figure 5. Housing data coded using NHCS data</a:t>
-            </a:r>
-          </a:p>
-        </p:txBody>
-      </p:sp>
-    </p:spTree>
-  </p:cSld>
-</p:sld>
-</file>
-
-<file path=ppt/slides/slide25.xml><?xml version="1.0" encoding="utf-8"?>
-<p:sld xmlns:a="http://schemas.openxmlformats.org/drawingml/2006/main" xmlns:r="http://schemas.openxmlformats.org/officeDocument/2006/relationships" xmlns:p="http://schemas.openxmlformats.org/presentationml/2006/main">
-  <p:cSld>
-    <p:spTree>
-      <p:nvGrpSpPr>
-        <p:cNvPr id="1" name=""/>
-        <p:cNvGrpSpPr/>
-        <p:nvPr/>
-      </p:nvGrpSpPr>
-      <p:grpSpPr>
-        <a:xfrm>
-          <a:off x="0" y="0"/>
-          <a:ext cx="0" cy="0"/>
-          <a:chOff x="0" y="0"/>
-          <a:chExt cx="0" cy="0"/>
-        </a:xfrm>
-      </p:grpSpPr>
-      <p:sp>
-        <p:nvSpPr>
-          <p:cNvPr id="2" name="Title 1"/>
-          <p:cNvSpPr>
-            <a:spLocks noGrp="1"/>
-          </p:cNvSpPr>
-          <p:nvPr>
-            <p:ph type="title"/>
-          </p:nvPr>
-        </p:nvSpPr>
-        <p:spPr/>
-        <p:txBody>
-          <a:bodyPr/>
-          <a:lstStyle/>
-          <a:p>
-            <a:pPr lvl="0" indent="0" marL="0">
-              <a:buNone/>
-            </a:pPr>
-            <a:r>
-              <a:rPr/>
-              <a:t>New NHCS surveys</a:t>
-            </a:r>
-          </a:p>
-        </p:txBody>
-      </p:sp>
-      <p:pic>
-        <p:nvPicPr>
-          <p:cNvPr descr="fig:  new-nhcs-surveys.png" id="0" name="Picture 1"/>
-          <p:cNvPicPr>
-            <a:picLocks noGrp="1" noChangeAspect="1"/>
-          </p:cNvPicPr>
-          <p:nvPr/>
-        </p:nvPicPr>
-        <p:blipFill>
-          <a:blip r:embed="rId2"/>
-          <a:stretch>
-            <a:fillRect/>
-          </a:stretch>
-        </p:blipFill>
-        <p:spPr bwMode="auto">
-          <a:xfrm>
-            <a:off x="4089400" y="1600200"/>
-            <a:ext cx="4013200" cy="4013200"/>
-          </a:xfrm>
-          <a:prstGeom prst="rect">
-            <a:avLst/>
-          </a:prstGeom>
-          <a:noFill/>
-          <a:ln w="9525">
-            <a:noFill/>
-            <a:headEnd/>
-            <a:tailEnd/>
-          </a:ln>
-        </p:spPr>
-      </p:pic>
-      <p:sp>
-        <p:nvSpPr>
-          <p:cNvPr id="1" name="TextBox 3"/>
-          <p:cNvSpPr txBox="1"/>
-          <p:nvPr/>
-        </p:nvSpPr>
-        <p:spPr>
-          <a:xfrm>
-            <a:off x="609600" y="5613400"/>
-            <a:ext cx="10972800" cy="508000"/>
-          </a:xfrm>
-          <a:prstGeom prst="rect">
-            <a:avLst/>
-          </a:prstGeom>
-          <a:noFill/>
-        </p:spPr>
-        <p:txBody>
-          <a:bodyPr/>
-          <a:lstStyle/>
-          <a:p>
-            <a:pPr lvl="0" indent="0" marL="0" algn="ctr">
-              <a:buNone/>
-            </a:pPr>
-            <a:r>
-              <a:rPr/>
-              <a:t>Figure 6. Map of current NHCS surveys</a:t>
-            </a:r>
-          </a:p>
-        </p:txBody>
-      </p:sp>
-    </p:spTree>
-  </p:cSld>
-</p:sld>
-</file>
-
-<file path=ppt/slides/slide26.xml><?xml version="1.0" encoding="utf-8"?>
-<p:sld xmlns:a="http://schemas.openxmlformats.org/drawingml/2006/main" xmlns:r="http://schemas.openxmlformats.org/officeDocument/2006/relationships" xmlns:p="http://schemas.openxmlformats.org/presentationml/2006/main">
-  <p:cSld>
-    <p:spTree>
-      <p:nvGrpSpPr>
-        <p:cNvPr id="1" name=""/>
-        <p:cNvGrpSpPr/>
-        <p:nvPr/>
-      </p:nvGrpSpPr>
-      <p:grpSpPr>
-        <a:xfrm>
-          <a:off x="0" y="0"/>
-          <a:ext cx="0" cy="0"/>
-          <a:chOff x="0" y="0"/>
-          <a:chExt cx="0" cy="0"/>
-        </a:xfrm>
-      </p:grpSpPr>
-      <p:sp>
-        <p:nvSpPr>
-          <p:cNvPr id="2" name="Title 1"/>
-          <p:cNvSpPr>
-            <a:spLocks noGrp="1"/>
-          </p:cNvSpPr>
-          <p:nvPr>
-            <p:ph type="title"/>
-          </p:nvPr>
-        </p:nvSpPr>
-        <p:spPr/>
-        <p:txBody>
-          <a:bodyPr/>
-          <a:lstStyle/>
-          <a:p>
-            <a:pPr lvl="0" indent="0" marL="0">
-              <a:buNone/>
-            </a:pPr>
-            <a:r>
-              <a:rPr/>
-              <a:t>Acknowledgements</a:t>
-            </a:r>
-          </a:p>
-        </p:txBody>
-      </p:sp>
-      <p:sp>
-        <p:nvSpPr>
-          <p:cNvPr id="3" name="Content Placeholder 2"/>
-          <p:cNvSpPr>
-            <a:spLocks noGrp="1"/>
-          </p:cNvSpPr>
-          <p:nvPr>
-            <p:ph idx="1"/>
-          </p:nvPr>
-        </p:nvSpPr>
-        <p:spPr/>
-        <p:txBody>
-          <a:bodyPr/>
-          <a:lstStyle/>
-          <a:p>
-            <a:pPr lvl="0"/>
-            <a:r>
-              <a:rPr/>
-              <a:t>Children’s Mercy Hospital</a:t>
-            </a:r>
-          </a:p>
-          <a:p>
-            <a:pPr lvl="1"/>
-            <a:r>
-              <a:rPr/>
-              <a:t>Ryan Allenbrand, Healthy Home Program Manager</a:t>
-            </a:r>
-          </a:p>
-          <a:p>
-            <a:pPr lvl="1"/>
-            <a:r>
-              <a:rPr/>
-              <a:t>Elizabeth Friedman, Medical Director of Environmental Health</a:t>
-            </a:r>
-          </a:p>
-          <a:p>
-            <a:pPr lvl="1"/>
-            <a:r>
-              <a:rPr/>
-              <a:t>Kevin Kennedy, Environmental Health Program Director</a:t>
-            </a:r>
-          </a:p>
-          <a:p>
-            <a:pPr lvl="0"/>
-            <a:r>
-              <a:rPr/>
-              <a:t>Kansas City, Missouri Department of Health</a:t>
-            </a:r>
-          </a:p>
-          <a:p>
-            <a:pPr lvl="1"/>
-            <a:r>
-              <a:rPr/>
-              <a:t>Amy Roberts, Director, Childhood Lead Poisoning Prevention Program</a:t>
-            </a:r>
-          </a:p>
-        </p:txBody>
-      </p:sp>
-    </p:spTree>
-  </p:cSld>
-</p:sld>
-</file>
-
-<file path=ppt/slides/slide27.xml><?xml version="1.0" encoding="utf-8"?>
-<p:sld xmlns:a="http://schemas.openxmlformats.org/drawingml/2006/main" xmlns:r="http://schemas.openxmlformats.org/officeDocument/2006/relationships" xmlns:p="http://schemas.openxmlformats.org/presentationml/2006/main">
-  <p:cSld>
-    <p:spTree>
-      <p:nvGrpSpPr>
-        <p:cNvPr id="1" name=""/>
-        <p:cNvGrpSpPr/>
-        <p:nvPr/>
-      </p:nvGrpSpPr>
-      <p:grpSpPr>
-        <a:xfrm>
-          <a:off x="0" y="0"/>
-          <a:ext cx="0" cy="0"/>
-          <a:chOff x="0" y="0"/>
-          <a:chExt cx="0" cy="0"/>
-        </a:xfrm>
-      </p:grpSpPr>
-      <p:sp>
-        <p:nvSpPr>
-          <p:cNvPr id="2" name="Title 1"/>
-          <p:cNvSpPr>
-            <a:spLocks noGrp="1"/>
-          </p:cNvSpPr>
-          <p:nvPr>
-            <p:ph type="title"/>
-          </p:nvPr>
-        </p:nvSpPr>
-        <p:spPr/>
-        <p:txBody>
-          <a:bodyPr/>
-          <a:lstStyle/>
-          <a:p>
-            <a:pPr lvl="0" indent="0" marL="0">
-              <a:buNone/>
-            </a:pPr>
-            <a:r>
-              <a:rPr/>
-              <a:t>Acknowledgements</a:t>
-            </a:r>
-          </a:p>
-        </p:txBody>
-      </p:sp>
-      <p:sp>
-        <p:nvSpPr>
-          <p:cNvPr id="3" name="Content Placeholder 2"/>
-          <p:cNvSpPr>
-            <a:spLocks noGrp="1"/>
-          </p:cNvSpPr>
-          <p:nvPr>
-            <p:ph idx="1"/>
-          </p:nvPr>
-        </p:nvSpPr>
-        <p:spPr/>
-        <p:txBody>
-          <a:bodyPr/>
-          <a:lstStyle/>
-          <a:p>
-            <a:pPr lvl="0"/>
-            <a:r>
-              <a:rPr/>
-              <a:t>University of Missouri-Kansas City</a:t>
-            </a:r>
-          </a:p>
-          <a:p>
-            <a:pPr lvl="1"/>
-            <a:r>
-              <a:rPr/>
-              <a:t>Matthew Applebury, Satya Golla, Chinedu Isoh, Mounika Reddy Jakkidi, Brian Matlock, Nomuunzul Munkhjargal, Lori Reierson, Matthew Robinson, Vishal Vejendla, graduate students</a:t>
-            </a:r>
-          </a:p>
-          <a:p>
-            <a:pPr lvl="1"/>
-            <a:r>
-              <a:rPr/>
-              <a:t>Doug Bowles, Past Director, Center for Economic Information (retired)</a:t>
-            </a:r>
-          </a:p>
-          <a:p>
-            <a:pPr lvl="1"/>
-            <a:r>
-              <a:rPr/>
-              <a:t>Taki Manolakos, Past Director, Center for Economic Information</a:t>
-            </a:r>
-          </a:p>
-          <a:p>
-            <a:pPr lvl="1"/>
-            <a:r>
-              <a:rPr/>
-              <a:t>Ricardo Moniz, Education Program Coordinator for Biomedical and Health Informatics</a:t>
-            </a:r>
-          </a:p>
-          <a:p>
-            <a:pPr lvl="1"/>
-            <a:r>
-              <a:rPr/>
-              <a:t>Neal Wilson, Deputy Director, Center for Economic Information</a:t>
             </a:r>
           </a:p>
         </p:txBody>
@@ -6777,7 +8292,7 @@
             </a:pPr>
             <a:r>
               <a:rPr/>
-              <a:t>NHCS</a:t>
+              <a:t>Acknowledgements</a:t>
             </a:r>
           </a:p>
         </p:txBody>
@@ -6800,42 +8315,265 @@
             <a:pPr lvl="0"/>
             <a:r>
               <a:rPr/>
-              <a:t>Classification data</a:t>
+              <a:t>Children’s Mercy Hospital</a:t>
             </a:r>
           </a:p>
           <a:p>
             <a:pPr lvl="1"/>
             <a:r>
               <a:rPr/>
-              <a:t>Structure type,</a:t>
+              <a:t>Ryan Allenbrand, Healthy Home Program Manager</a:t>
             </a:r>
           </a:p>
           <a:p>
             <a:pPr lvl="1"/>
             <a:r>
               <a:rPr/>
-              <a:t>Use type,</a:t>
+              <a:t>Elizabeth Friedman, Medical Director of Environmental Health</a:t>
             </a:r>
           </a:p>
           <a:p>
             <a:pPr lvl="1"/>
             <a:r>
               <a:rPr/>
-              <a:t>Residential type,</a:t>
+              <a:t>Kevin Kennedy, Environmental Health Program Director</a:t>
+            </a:r>
+          </a:p>
+          <a:p>
+            <a:pPr lvl="0"/>
+            <a:r>
+              <a:rPr/>
+              <a:t>Kansas City, Missouri Department of Health</a:t>
             </a:r>
           </a:p>
           <a:p>
             <a:pPr lvl="1"/>
             <a:r>
               <a:rPr/>
-              <a:t>Structure profile, and</a:t>
+              <a:t>Amy Roberts, Director, Childhood Lead Poisoning Prevention Program</a:t>
+            </a:r>
+          </a:p>
+        </p:txBody>
+      </p:sp>
+    </p:spTree>
+  </p:cSld>
+</p:sld>
+</file>
+
+<file path=ppt/slides/slide30.xml><?xml version="1.0" encoding="utf-8"?>
+<p:sld xmlns:a="http://schemas.openxmlformats.org/drawingml/2006/main" xmlns:r="http://schemas.openxmlformats.org/officeDocument/2006/relationships" xmlns:p="http://schemas.openxmlformats.org/presentationml/2006/main">
+  <p:cSld>
+    <p:spTree>
+      <p:nvGrpSpPr>
+        <p:cNvPr id="1" name=""/>
+        <p:cNvGrpSpPr/>
+        <p:nvPr/>
+      </p:nvGrpSpPr>
+      <p:grpSpPr>
+        <a:xfrm>
+          <a:off x="0" y="0"/>
+          <a:ext cx="0" cy="0"/>
+          <a:chOff x="0" y="0"/>
+          <a:chExt cx="0" cy="0"/>
+        </a:xfrm>
+      </p:grpSpPr>
+      <p:sp>
+        <p:nvSpPr>
+          <p:cNvPr id="2" name="Title 1"/>
+          <p:cNvSpPr>
+            <a:spLocks noGrp="1"/>
+          </p:cNvSpPr>
+          <p:nvPr>
+            <p:ph type="title"/>
+          </p:nvPr>
+        </p:nvSpPr>
+        <p:spPr/>
+        <p:txBody>
+          <a:bodyPr/>
+          <a:lstStyle/>
+          <a:p>
+            <a:pPr lvl="0" indent="0" marL="0">
+              <a:buNone/>
+            </a:pPr>
+            <a:r>
+              <a:rPr/>
+              <a:t>Location of current NHCS surveys</a:t>
+            </a:r>
+          </a:p>
+        </p:txBody>
+      </p:sp>
+      <p:pic>
+        <p:nvPicPr>
+          <p:cNvPr descr="fig:  new-nhcs-surveys.png" id="0" name="Picture 1"/>
+          <p:cNvPicPr>
+            <a:picLocks noGrp="1" noChangeAspect="1"/>
+          </p:cNvPicPr>
+          <p:nvPr/>
+        </p:nvPicPr>
+        <p:blipFill>
+          <a:blip r:embed="rId3"/>
+          <a:stretch>
+            <a:fillRect/>
+          </a:stretch>
+        </p:blipFill>
+        <p:spPr bwMode="auto">
+          <a:xfrm>
+            <a:off x="4089400" y="1600200"/>
+            <a:ext cx="4013200" cy="4013200"/>
+          </a:xfrm>
+          <a:prstGeom prst="rect">
+            <a:avLst/>
+          </a:prstGeom>
+          <a:noFill/>
+          <a:ln w="9525">
+            <a:noFill/>
+            <a:headEnd/>
+            <a:tailEnd/>
+          </a:ln>
+        </p:spPr>
+      </p:pic>
+      <p:sp>
+        <p:nvSpPr>
+          <p:cNvPr id="1" name="TextBox 3"/>
+          <p:cNvSpPr txBox="1"/>
+          <p:nvPr/>
+        </p:nvSpPr>
+        <p:spPr>
+          <a:xfrm>
+            <a:off x="609600" y="5613400"/>
+            <a:ext cx="10972800" cy="508000"/>
+          </a:xfrm>
+          <a:prstGeom prst="rect">
+            <a:avLst/>
+          </a:prstGeom>
+          <a:noFill/>
+        </p:spPr>
+        <p:txBody>
+          <a:bodyPr/>
+          <a:lstStyle/>
+          <a:p>
+            <a:pPr lvl="0" indent="0" marL="0" algn="ctr">
+              <a:buNone/>
+            </a:pPr>
+            <a:r>
+              <a:rPr/>
+              <a:t>Figure 6. Map of current NHCS surveys</a:t>
+            </a:r>
+          </a:p>
+        </p:txBody>
+      </p:sp>
+    </p:spTree>
+  </p:cSld>
+</p:sld>
+</file>
+
+<file path=ppt/slides/slide31.xml><?xml version="1.0" encoding="utf-8"?>
+<p:sld xmlns:a="http://schemas.openxmlformats.org/drawingml/2006/main" xmlns:r="http://schemas.openxmlformats.org/officeDocument/2006/relationships" xmlns:p="http://schemas.openxmlformats.org/presentationml/2006/main">
+  <p:cSld>
+    <p:spTree>
+      <p:nvGrpSpPr>
+        <p:cNvPr id="1" name=""/>
+        <p:cNvGrpSpPr/>
+        <p:nvPr/>
+      </p:nvGrpSpPr>
+      <p:grpSpPr>
+        <a:xfrm>
+          <a:off x="0" y="0"/>
+          <a:ext cx="0" cy="0"/>
+          <a:chOff x="0" y="0"/>
+          <a:chExt cx="0" cy="0"/>
+        </a:xfrm>
+      </p:grpSpPr>
+      <p:sp>
+        <p:nvSpPr>
+          <p:cNvPr id="2" name="Title 1"/>
+          <p:cNvSpPr>
+            <a:spLocks noGrp="1"/>
+          </p:cNvSpPr>
+          <p:nvPr>
+            <p:ph type="title"/>
+          </p:nvPr>
+        </p:nvSpPr>
+        <p:spPr/>
+        <p:txBody>
+          <a:bodyPr/>
+          <a:lstStyle/>
+          <a:p>
+            <a:pPr lvl="0" indent="0" marL="0">
+              <a:buNone/>
+            </a:pPr>
+            <a:r>
+              <a:rPr/>
+              <a:t>Possible future applications of the NHCS</a:t>
+            </a:r>
+          </a:p>
+        </p:txBody>
+      </p:sp>
+      <p:sp>
+        <p:nvSpPr>
+          <p:cNvPr id="3" name="Content Placeholder 2"/>
+          <p:cNvSpPr>
+            <a:spLocks noGrp="1"/>
+          </p:cNvSpPr>
+          <p:nvPr>
+            <p:ph idx="1"/>
+          </p:nvPr>
+        </p:nvSpPr>
+        <p:spPr/>
+        <p:txBody>
+          <a:bodyPr/>
+          <a:lstStyle/>
+          <a:p>
+            <a:pPr lvl="0"/>
+            <a:r>
+              <a:rPr/>
+              <a:t>Just a few of many possibilities</a:t>
             </a:r>
           </a:p>
           <a:p>
             <a:pPr lvl="1"/>
             <a:r>
               <a:rPr/>
-              <a:t>Visible address</a:t>
+              <a:t>Other health outcomes affected by housing quality</a:t>
+            </a:r>
+          </a:p>
+          <a:p>
+            <a:pPr lvl="1"/>
+            <a:r>
+              <a:rPr/>
+              <a:t>Training data for deep learning models</a:t>
+            </a:r>
+          </a:p>
+          <a:p>
+            <a:pPr lvl="1"/>
+            <a:r>
+              <a:rPr/>
+              <a:t>Replication in other communities</a:t>
+            </a:r>
+          </a:p>
+          <a:p>
+            <a:pPr lvl="0"/>
+            <a:r>
+              <a:rPr/>
+              <a:t>Want to learn more?</a:t>
+            </a:r>
+          </a:p>
+          <a:p>
+            <a:pPr lvl="1"/>
+            <a:r>
+              <a:rPr>
+                <a:hlinkClick r:id="rId3"/>
+              </a:rPr>
+              <a:t>https://github.com/pmean/talks/nhcs</a:t>
+            </a:r>
+          </a:p>
+          <a:p>
+            <a:pPr lvl="1"/>
+            <a:r>
+              <a:rPr>
+                <a:hlinkClick r:id="rId4"/>
+              </a:rPr>
+              <a:t>simons@umkc.edu</a:t>
             </a:r>
           </a:p>
         </p:txBody>
@@ -6882,7 +8620,7 @@
             </a:pPr>
             <a:r>
               <a:rPr/>
-              <a:t>NHCS</a:t>
+              <a:t>Acknowledgements</a:t>
             </a:r>
           </a:p>
         </p:txBody>
@@ -6905,28 +8643,42 @@
             <a:pPr lvl="0"/>
             <a:r>
               <a:rPr/>
-              <a:t>Conditions data</a:t>
+              <a:t>University of Missouri-Kansas City</a:t>
             </a:r>
           </a:p>
           <a:p>
             <a:pPr lvl="1"/>
             <a:r>
               <a:rPr/>
-              <a:t>Structure</a:t>
+              <a:t>Matthew Applebury, Satya Golla, Chinedu Isoh, Mounika Reddy Jakkidi, Brian Matlock, Nomuunzul Munkhjargal, Lori Reierson, Matthew Robinson, Vishal Vejendla, graduate students</a:t>
             </a:r>
           </a:p>
           <a:p>
             <a:pPr lvl="1"/>
             <a:r>
               <a:rPr/>
-              <a:t>Grounds</a:t>
+              <a:t>Doug Bowles, Past Director, Center for Economic Information (retired)</a:t>
             </a:r>
           </a:p>
           <a:p>
             <a:pPr lvl="1"/>
             <a:r>
               <a:rPr/>
-              <a:t>Infrastructure</a:t>
+              <a:t>Taki Manolakos, Past Director, Center for Economic Information</a:t>
+            </a:r>
+          </a:p>
+          <a:p>
+            <a:pPr lvl="1"/>
+            <a:r>
+              <a:rPr/>
+              <a:t>Ricardo Moniz, Education Program Coordinator for Biomedical and Health Informatics</a:t>
+            </a:r>
+          </a:p>
+          <a:p>
+            <a:pPr lvl="1"/>
+            <a:r>
+              <a:rPr/>
+              <a:t>Neal Wilson, Deputy Director, Center for Economic Information</a:t>
             </a:r>
           </a:p>
         </p:txBody>
@@ -6973,7 +8725,7 @@
             </a:pPr>
             <a:r>
               <a:rPr/>
-              <a:t>NHCS Structure</a:t>
+              <a:t>Impact Lead-Kansas City grant</a:t>
             </a:r>
           </a:p>
         </p:txBody>
@@ -6996,35 +8748,42 @@
             <a:pPr lvl="0"/>
             <a:r>
               <a:rPr/>
-              <a:t>Roof</a:t>
+              <a:t>Lead Technical Study funded by HUD</a:t>
             </a:r>
           </a:p>
           <a:p>
             <a:pPr lvl="0"/>
             <a:r>
               <a:rPr/>
-              <a:t>Foundation/walls</a:t>
+              <a:t>Three years, $700,000</a:t>
             </a:r>
           </a:p>
           <a:p>
             <a:pPr lvl="0"/>
             <a:r>
               <a:rPr/>
-              <a:t>Windows/doors</a:t>
+              <a:t>Aim 1, retrospective review of lead remediation efforts</a:t>
             </a:r>
           </a:p>
           <a:p>
             <a:pPr lvl="0"/>
             <a:r>
               <a:rPr/>
-              <a:t>Porch</a:t>
-            </a:r>
-          </a:p>
-          <a:p>
-            <a:pPr lvl="0"/>
-            <a:r>
-              <a:rPr/>
-              <a:t>Exterior Paint</a:t>
+              <a:t>Aim 2, prospective identification of houses at risk for lead contamination</a:t>
+            </a:r>
+          </a:p>
+          <a:p>
+            <a:pPr lvl="1"/>
+            <a:r>
+              <a:rPr/>
+              <a:t>Use of Neighborhood Housing Conditions Survey</a:t>
+            </a:r>
+          </a:p>
+          <a:p>
+            <a:pPr lvl="1"/>
+            <a:r>
+              <a:rPr b="1"/>
+              <a:t>Potential for collaboration with other HUD grantees</a:t>
             </a:r>
           </a:p>
         </p:txBody>
@@ -7071,7 +8830,7 @@
             </a:pPr>
             <a:r>
               <a:rPr/>
-              <a:t>NHCS Grounds</a:t>
+              <a:t>Overview of the Neighborhood Housing Conditions Survey (NHCS)</a:t>
             </a:r>
           </a:p>
         </p:txBody>
@@ -7094,35 +8853,21 @@
             <a:pPr lvl="0"/>
             <a:r>
               <a:rPr/>
-              <a:t>Private sidewalk/drive</a:t>
+              <a:t>Windshield survey</a:t>
             </a:r>
           </a:p>
           <a:p>
             <a:pPr lvl="0"/>
             <a:r>
               <a:rPr/>
-              <a:t>Lawn/shrubs</a:t>
+              <a:t>Features visible at street level</a:t>
             </a:r>
           </a:p>
           <a:p>
             <a:pPr lvl="0"/>
             <a:r>
               <a:rPr/>
-              <a:t>Nuisance vehicles</a:t>
-            </a:r>
-          </a:p>
-          <a:p>
-            <a:pPr lvl="0"/>
-            <a:r>
-              <a:rPr/>
-              <a:t>Litter</a:t>
-            </a:r>
-          </a:p>
-          <a:p>
-            <a:pPr lvl="0"/>
-            <a:r>
-              <a:rPr/>
-              <a:t>Open storage</a:t>
+              <a:t>Collection primarily of residential parcels</a:t>
             </a:r>
           </a:p>
         </p:txBody>
@@ -7169,7 +8914,7 @@
             </a:pPr>
             <a:r>
               <a:rPr/>
-              <a:t>NHCS Infrastructure</a:t>
+              <a:t>NHCS classification data</a:t>
             </a:r>
           </a:p>
         </p:txBody>
@@ -7192,35 +8937,35 @@
             <a:pPr lvl="0"/>
             <a:r>
               <a:rPr/>
-              <a:t>Public sidewalk</a:t>
+              <a:t>Structure type,</a:t>
             </a:r>
           </a:p>
           <a:p>
             <a:pPr lvl="0"/>
             <a:r>
               <a:rPr/>
-              <a:t>Curb</a:t>
+              <a:t>Use type,</a:t>
             </a:r>
           </a:p>
           <a:p>
             <a:pPr lvl="0"/>
             <a:r>
               <a:rPr/>
-              <a:t>Street lighting</a:t>
+              <a:t>Residential type,</a:t>
             </a:r>
           </a:p>
           <a:p>
             <a:pPr lvl="0"/>
             <a:r>
               <a:rPr/>
-              <a:t>Catch basin</a:t>
+              <a:t>Structure profile, and</a:t>
             </a:r>
           </a:p>
           <a:p>
             <a:pPr lvl="0"/>
             <a:r>
               <a:rPr/>
-              <a:t>Street</a:t>
+              <a:t>Visible address</a:t>
             </a:r>
           </a:p>
         </p:txBody>
@@ -7267,7 +9012,7 @@
             </a:pPr>
             <a:r>
               <a:rPr/>
-              <a:t>Condition ratings</a:t>
+              <a:t>NHCS conditions data</a:t>
             </a:r>
           </a:p>
         </p:txBody>
@@ -7290,63 +9035,28 @@
             <a:pPr lvl="0"/>
             <a:r>
               <a:rPr/>
-              <a:t>Likert scale (1-5)</a:t>
+              <a:t>Fifteen ratings</a:t>
             </a:r>
           </a:p>
           <a:p>
             <a:pPr lvl="1"/>
             <a:r>
               <a:rPr/>
-              <a:t>1, Severely deteriorated</a:t>
+              <a:t>Structure</a:t>
             </a:r>
           </a:p>
           <a:p>
             <a:pPr lvl="1"/>
             <a:r>
               <a:rPr/>
-              <a:t>2, Seriously deteriorated</a:t>
+              <a:t>Grounds</a:t>
             </a:r>
           </a:p>
           <a:p>
             <a:pPr lvl="1"/>
             <a:r>
               <a:rPr/>
-              <a:t>3, Substandard</a:t>
-            </a:r>
-          </a:p>
-          <a:p>
-            <a:pPr lvl="1"/>
-            <a:r>
-              <a:rPr/>
-              <a:t>4, Good</a:t>
-            </a:r>
-          </a:p>
-          <a:p>
-            <a:pPr lvl="1"/>
-            <a:r>
-              <a:rPr/>
-              <a:t>5, Excellent</a:t>
-            </a:r>
-          </a:p>
-          <a:p>
-            <a:pPr lvl="0"/>
-            <a:r>
-              <a:rPr/>
-              <a:t>Missing value codes</a:t>
-            </a:r>
-          </a:p>
-          <a:p>
-            <a:pPr lvl="1"/>
-            <a:r>
-              <a:rPr/>
-              <a:t>6, not applicable</a:t>
-            </a:r>
-          </a:p>
-          <a:p>
-            <a:pPr lvl="1"/>
-            <a:r>
-              <a:rPr/>
-              <a:t>7, unable to rate</a:t>
+              <a:t>Infrastructure</a:t>
             </a:r>
           </a:p>
         </p:txBody>
@@ -7393,7 +9103,7 @@
             </a:pPr>
             <a:r>
               <a:rPr/>
-              <a:t>Example Structure/roof</a:t>
+              <a:t>NHCS conditions data on structure</a:t>
             </a:r>
           </a:p>
         </p:txBody>
@@ -7413,12 +9123,38 @@
           <a:bodyPr/>
           <a:lstStyle/>
           <a:p>
-            <a:pPr lvl="0" indent="-457200" marL="457200">
-              <a:buAutoNum type="arabicPeriod"/>
-            </a:pPr>
-            <a:r>
-              <a:rPr/>
-              <a:t>Severely Deteriorated. There are holes visible through roof sheathing. Rafters are sagging or collapsed. Soffits and fascia boards are missing or display severe rot and deterioration.</a:t>
+            <a:pPr lvl="0"/>
+            <a:r>
+              <a:rPr/>
+              <a:t>Roof</a:t>
+            </a:r>
+          </a:p>
+          <a:p>
+            <a:pPr lvl="0"/>
+            <a:r>
+              <a:rPr/>
+              <a:t>Foundation/walls</a:t>
+            </a:r>
+          </a:p>
+          <a:p>
+            <a:pPr lvl="0"/>
+            <a:r>
+              <a:rPr/>
+              <a:t>Windows/doors</a:t>
+            </a:r>
+          </a:p>
+          <a:p>
+            <a:pPr lvl="0"/>
+            <a:r>
+              <a:rPr/>
+              <a:t>Porch</a:t>
+            </a:r>
+          </a:p>
+          <a:p>
+            <a:pPr lvl="0"/>
+            <a:r>
+              <a:rPr/>
+              <a:t>Exterior Paint</a:t>
             </a:r>
           </a:p>
         </p:txBody>

</xml_diff>

<commit_message>
Minor edit to seattle-talk under nhcs
</commit_message>
<xml_diff>
--- a/nhcs/seattle-talk.pptx
+++ b/nhcs/seattle-talk.pptx
@@ -1,6 +1,6 @@
 
 <file path=ppt/presentation.xml><?xml version="1.0" encoding="utf-8"?>
-<p:presentation xmlns:a="http://schemas.openxmlformats.org/drawingml/2006/main" xmlns:p="http://schemas.openxmlformats.org/presentationml/2006/main" xmlns:r="http://schemas.openxmlformats.org/officeDocument/2006/relationships" autoCompressPictures="0" saveSubsetFonts="1">
+<p:presentation xmlns:a="http://schemas.openxmlformats.org/drawingml/2006/main" xmlns:r="http://schemas.openxmlformats.org/officeDocument/2006/relationships" xmlns:p="http://schemas.openxmlformats.org/presentationml/2006/main" saveSubsetFonts="1" autoCompressPictures="0">
   <p:sldMasterIdLst>
     <p:sldMasterId id="2147483648" r:id="rId1"/>
   </p:sldMasterIdLst>
@@ -46,8 +46,8 @@
     <a:defPPr>
       <a:defRPr lang="en-US"/>
     </a:defPPr>
-    <a:lvl1pPr algn="l" defTabSz="457200" eaLnBrk="1" hangingPunct="1" latinLnBrk="0" marL="0" rtl="0">
-      <a:defRPr kern="1200" sz="1800">
+    <a:lvl1pPr marL="0" algn="l" defTabSz="457200" rtl="0" eaLnBrk="1" latinLnBrk="0" hangingPunct="1">
+      <a:defRPr sz="1800" kern="1200">
         <a:solidFill>
           <a:schemeClr val="tx1"/>
         </a:solidFill>
@@ -56,8 +56,8 @@
         <a:cs typeface="+mn-cs"/>
       </a:defRPr>
     </a:lvl1pPr>
-    <a:lvl2pPr algn="l" defTabSz="457200" eaLnBrk="1" hangingPunct="1" latinLnBrk="0" marL="457200" rtl="0">
-      <a:defRPr kern="1200" sz="1800">
+    <a:lvl2pPr marL="457200" algn="l" defTabSz="457200" rtl="0" eaLnBrk="1" latinLnBrk="0" hangingPunct="1">
+      <a:defRPr sz="1800" kern="1200">
         <a:solidFill>
           <a:schemeClr val="tx1"/>
         </a:solidFill>
@@ -66,8 +66,8 @@
         <a:cs typeface="+mn-cs"/>
       </a:defRPr>
     </a:lvl2pPr>
-    <a:lvl3pPr algn="l" defTabSz="457200" eaLnBrk="1" hangingPunct="1" latinLnBrk="0" marL="914400" rtl="0">
-      <a:defRPr kern="1200" sz="1800">
+    <a:lvl3pPr marL="914400" algn="l" defTabSz="457200" rtl="0" eaLnBrk="1" latinLnBrk="0" hangingPunct="1">
+      <a:defRPr sz="1800" kern="1200">
         <a:solidFill>
           <a:schemeClr val="tx1"/>
         </a:solidFill>
@@ -76,8 +76,8 @@
         <a:cs typeface="+mn-cs"/>
       </a:defRPr>
     </a:lvl3pPr>
-    <a:lvl4pPr algn="l" defTabSz="457200" eaLnBrk="1" hangingPunct="1" latinLnBrk="0" marL="1371600" rtl="0">
-      <a:defRPr kern="1200" sz="1800">
+    <a:lvl4pPr marL="1371600" algn="l" defTabSz="457200" rtl="0" eaLnBrk="1" latinLnBrk="0" hangingPunct="1">
+      <a:defRPr sz="1800" kern="1200">
         <a:solidFill>
           <a:schemeClr val="tx1"/>
         </a:solidFill>
@@ -86,8 +86,8 @@
         <a:cs typeface="+mn-cs"/>
       </a:defRPr>
     </a:lvl4pPr>
-    <a:lvl5pPr algn="l" defTabSz="457200" eaLnBrk="1" hangingPunct="1" latinLnBrk="0" marL="1828800" rtl="0">
-      <a:defRPr kern="1200" sz="1800">
+    <a:lvl5pPr marL="1828800" algn="l" defTabSz="457200" rtl="0" eaLnBrk="1" latinLnBrk="0" hangingPunct="1">
+      <a:defRPr sz="1800" kern="1200">
         <a:solidFill>
           <a:schemeClr val="tx1"/>
         </a:solidFill>
@@ -96,8 +96,8 @@
         <a:cs typeface="+mn-cs"/>
       </a:defRPr>
     </a:lvl5pPr>
-    <a:lvl6pPr algn="l" defTabSz="457200" eaLnBrk="1" hangingPunct="1" latinLnBrk="0" marL="2286000" rtl="0">
-      <a:defRPr kern="1200" sz="1800">
+    <a:lvl6pPr marL="2286000" algn="l" defTabSz="457200" rtl="0" eaLnBrk="1" latinLnBrk="0" hangingPunct="1">
+      <a:defRPr sz="1800" kern="1200">
         <a:solidFill>
           <a:schemeClr val="tx1"/>
         </a:solidFill>
@@ -106,8 +106,8 @@
         <a:cs typeface="+mn-cs"/>
       </a:defRPr>
     </a:lvl6pPr>
-    <a:lvl7pPr algn="l" defTabSz="457200" eaLnBrk="1" hangingPunct="1" latinLnBrk="0" marL="2743200" rtl="0">
-      <a:defRPr kern="1200" sz="1800">
+    <a:lvl7pPr marL="2743200" algn="l" defTabSz="457200" rtl="0" eaLnBrk="1" latinLnBrk="0" hangingPunct="1">
+      <a:defRPr sz="1800" kern="1200">
         <a:solidFill>
           <a:schemeClr val="tx1"/>
         </a:solidFill>
@@ -116,8 +116,8 @@
         <a:cs typeface="+mn-cs"/>
       </a:defRPr>
     </a:lvl7pPr>
-    <a:lvl8pPr algn="l" defTabSz="457200" eaLnBrk="1" hangingPunct="1" latinLnBrk="0" marL="3200400" rtl="0">
-      <a:defRPr kern="1200" sz="1800">
+    <a:lvl8pPr marL="3200400" algn="l" defTabSz="457200" rtl="0" eaLnBrk="1" latinLnBrk="0" hangingPunct="1">
+      <a:defRPr sz="1800" kern="1200">
         <a:solidFill>
           <a:schemeClr val="tx1"/>
         </a:solidFill>
@@ -126,8 +126,8 @@
         <a:cs typeface="+mn-cs"/>
       </a:defRPr>
     </a:lvl8pPr>
-    <a:lvl9pPr algn="l" defTabSz="457200" eaLnBrk="1" hangingPunct="1" latinLnBrk="0" marL="3657600" rtl="0">
-      <a:defRPr kern="1200" sz="1800">
+    <a:lvl9pPr marL="3657600" algn="l" defTabSz="457200" rtl="0" eaLnBrk="1" latinLnBrk="0" hangingPunct="1">
+      <a:defRPr sz="1800" kern="1200">
         <a:solidFill>
           <a:schemeClr val="tx1"/>
         </a:solidFill>
@@ -238,7 +238,7 @@
           <a:p>
             <a:fld id="{0F9C1CCF-B725-44A7-AA57-5E433BD85C9F}" type="datetimeFigureOut">
               <a:rPr lang="en-US" smtClean="0"/>
-              <a:t>4/13/2023</a:t>
+              <a:t>4/17/2023</a:t>
             </a:fld>
             <a:endParaRPr lang="en-US"/>
           </a:p>
@@ -549,11 +549,10 @@
           <a:bodyPr/>
           <a:lstStyle/>
           <a:p>
-            <a:pPr lvl="0" indent="0" marL="0">
-              <a:buNone/>
-            </a:pPr>
-            <a:r>
-              <a:rPr/>
+            <a:pPr marL="0" lvl="0" indent="0">
+              <a:buNone/>
+            </a:pPr>
+            <a:r>
               <a:t>Before I start my talk, let me fill you in on my background. I am a data geek, with a PhD in Statistics and a faculty appointment in the Department of Biomedical and Health Informatics. I also have been providing informal consulting with the Center for Economic Information (CEI), a research group with expertise in geographic information systems, economic statistics, and big data. with a long history of working with local communities and governments in the Kansas City metropolitan area.</a:t>
             </a:r>
           </a:p>
@@ -584,6 +583,9 @@
       </p:sp>
     </p:spTree>
   </p:cSld>
+  <p:clrMapOvr>
+    <a:masterClrMapping/>
+  </p:clrMapOvr>
 </p:notes>
 </file>
 
@@ -631,11 +633,10 @@
           <a:bodyPr/>
           <a:lstStyle/>
           <a:p>
-            <a:pPr lvl="0" indent="0" marL="0">
-              <a:buNone/>
-            </a:pPr>
-            <a:r>
-              <a:rPr/>
+            <a:pPr marL="0" lvl="0" indent="0">
+              <a:buNone/>
+            </a:pPr>
+            <a:r>
               <a:t>Finally, there are ratings for the infrastructure: the public sidewalk, curb, street lighting, catch basin and street.</a:t>
             </a:r>
           </a:p>
@@ -666,6 +667,9 @@
       </p:sp>
     </p:spTree>
   </p:cSld>
+  <p:clrMapOvr>
+    <a:masterClrMapping/>
+  </p:clrMapOvr>
 </p:notes>
 </file>
 
@@ -713,11 +717,10 @@
           <a:bodyPr/>
           <a:lstStyle/>
           <a:p>
-            <a:pPr lvl="0" indent="0" marL="0">
-              <a:buNone/>
-            </a:pPr>
-            <a:r>
-              <a:rPr/>
+            <a:pPr marL="0" lvl="0" indent="0">
+              <a:buNone/>
+            </a:pPr>
+            <a:r>
               <a:t>The condition ratings range from 1 to 5 on Likert scale with lower scores indicating more deterioration. A code of 6 is a missing value code for locations where a condition rating is not applicable. A code of 7 is a second missing value code for conditions that could not be rated because of visibility issues.</a:t>
             </a:r>
           </a:p>
@@ -748,6 +751,9 @@
       </p:sp>
     </p:spTree>
   </p:cSld>
+  <p:clrMapOvr>
+    <a:masterClrMapping/>
+  </p:clrMapOvr>
 </p:notes>
 </file>
 
@@ -795,25 +801,24 @@
           <a:bodyPr/>
           <a:lstStyle/>
           <a:p>
-            <a:pPr lvl="0" indent="0" marL="0">
-              <a:buNone/>
-            </a:pPr>
-            <a:r>
-              <a:rPr/>
+            <a:pPr marL="0" lvl="0" indent="0">
+              <a:buNone/>
+            </a:pPr>
+            <a:r>
               <a:t>I want to show details for one of the fifteen conditions that are rated by the NHCS, so you can see the specificity detailed in this survey.</a:t>
             </a:r>
           </a:p>
           <a:p>
-            <a:pPr lvl="0" indent="0" marL="0">
-              <a:buNone/>
-            </a:pPr>
-          </a:p>
-          <a:p>
-            <a:pPr lvl="0" indent="0" marL="0">
-              <a:buNone/>
-            </a:pPr>
-            <a:r>
-              <a:rPr/>
+            <a:pPr marL="0" lvl="0" indent="0">
+              <a:buNone/>
+            </a:pPr>
+            <a:endParaRPr/>
+          </a:p>
+          <a:p>
+            <a:pPr marL="0" lvl="0" indent="0">
+              <a:buNone/>
+            </a:pPr>
+            <a:r>
               <a:t>For the roof of a structure, the lowest rating, 1, represent severe deterioration. These represent pretty extreme conditions like holes in the roof.</a:t>
             </a:r>
           </a:p>
@@ -844,6 +849,9 @@
       </p:sp>
     </p:spTree>
   </p:cSld>
+  <p:clrMapOvr>
+    <a:masterClrMapping/>
+  </p:clrMapOvr>
 </p:notes>
 </file>
 
@@ -891,11 +899,10 @@
           <a:bodyPr/>
           <a:lstStyle/>
           <a:p>
-            <a:pPr lvl="0" indent="0" marL="0">
-              <a:buNone/>
-            </a:pPr>
-            <a:r>
-              <a:rPr/>
+            <a:pPr marL="0" lvl="0" indent="0">
+              <a:buNone/>
+            </a:pPr>
+            <a:r>
               <a:t>The next rating, 2, represent serious deterioration. No holes, thank gooodness, but some visible sagging, and/or missing shingles.</a:t>
             </a:r>
           </a:p>
@@ -926,6 +933,9 @@
       </p:sp>
     </p:spTree>
   </p:cSld>
+  <p:clrMapOvr>
+    <a:masterClrMapping/>
+  </p:clrMapOvr>
 </p:notes>
 </file>
 
@@ -973,11 +983,10 @@
           <a:bodyPr/>
           <a:lstStyle/>
           <a:p>
-            <a:pPr lvl="0" indent="0" marL="0">
-              <a:buNone/>
-            </a:pPr>
-            <a:r>
-              <a:rPr/>
+            <a:pPr marL="0" lvl="0" indent="0">
+              <a:buNone/>
+            </a:pPr>
+            <a:r>
               <a:t>A rating of 3 represents substandard conditions. This represents a small number of missing shingles or slight rot in soffits and fascia boards.</a:t>
             </a:r>
           </a:p>
@@ -1008,6 +1017,9 @@
       </p:sp>
     </p:spTree>
   </p:cSld>
+  <p:clrMapOvr>
+    <a:masterClrMapping/>
+  </p:clrMapOvr>
 </p:notes>
 </file>
 
@@ -1055,11 +1067,10 @@
           <a:bodyPr/>
           <a:lstStyle/>
           <a:p>
-            <a:pPr lvl="0" indent="0" marL="0">
-              <a:buNone/>
-            </a:pPr>
-            <a:r>
-              <a:rPr/>
+            <a:pPr marL="0" lvl="0" indent="0">
+              <a:buNone/>
+            </a:pPr>
+            <a:r>
               <a:t>A rating of 4 represents slight wear and discoloration.</a:t>
             </a:r>
           </a:p>
@@ -1090,6 +1101,9 @@
       </p:sp>
     </p:spTree>
   </p:cSld>
+  <p:clrMapOvr>
+    <a:masterClrMapping/>
+  </p:clrMapOvr>
 </p:notes>
 </file>
 
@@ -1137,11 +1151,10 @@
           <a:bodyPr/>
           <a:lstStyle/>
           <a:p>
-            <a:pPr lvl="0" indent="0" marL="0">
-              <a:buNone/>
-            </a:pPr>
-            <a:r>
-              <a:rPr/>
+            <a:pPr marL="0" lvl="0" indent="0">
+              <a:buNone/>
+            </a:pPr>
+            <a:r>
               <a:t>A rating of 5 is the best rating. No wear, no rot, no deterioriation.</a:t>
             </a:r>
           </a:p>
@@ -1172,6 +1185,9 @@
       </p:sp>
     </p:spTree>
   </p:cSld>
+  <p:clrMapOvr>
+    <a:masterClrMapping/>
+  </p:clrMapOvr>
 </p:notes>
 </file>
 
@@ -1219,11 +1235,10 @@
           <a:bodyPr/>
           <a:lstStyle/>
           <a:p>
-            <a:pPr lvl="0" indent="0" marL="0">
-              <a:buNone/>
-            </a:pPr>
-            <a:r>
-              <a:rPr/>
+            <a:pPr marL="0" lvl="0" indent="0">
+              <a:buNone/>
+            </a:pPr>
+            <a:r>
               <a:t>If there is no structure on the parcel, there is no roof to be rated. This is assigned a code of 6 and this is not used in the overall assessment of housing conditions.</a:t>
             </a:r>
           </a:p>
@@ -1254,6 +1269,9 @@
       </p:sp>
     </p:spTree>
   </p:cSld>
+  <p:clrMapOvr>
+    <a:masterClrMapping/>
+  </p:clrMapOvr>
 </p:notes>
 </file>
 
@@ -1301,11 +1319,10 @@
           <a:bodyPr/>
           <a:lstStyle/>
           <a:p>
-            <a:pPr lvl="0" indent="0" marL="0">
-              <a:buNone/>
-            </a:pPr>
-            <a:r>
-              <a:rPr/>
+            <a:pPr marL="0" lvl="0" indent="0">
+              <a:buNone/>
+            </a:pPr>
+            <a:r>
               <a:t>There’s one more case to consider. Sometimes, you cannot provide a rating because the roof is flat or obscured by trees. This is assigned a code of 7 and this is not used in the overall assessment of housing quality.</a:t>
             </a:r>
           </a:p>
@@ -1336,6 +1353,9 @@
       </p:sp>
     </p:spTree>
   </p:cSld>
+  <p:clrMapOvr>
+    <a:masterClrMapping/>
+  </p:clrMapOvr>
 </p:notes>
 </file>
 
@@ -1383,25 +1403,24 @@
           <a:bodyPr/>
           <a:lstStyle/>
           <a:p>
-            <a:pPr lvl="0" indent="0" marL="0">
-              <a:buNone/>
-            </a:pPr>
-            <a:r>
-              <a:rPr/>
+            <a:pPr marL="0" lvl="0" indent="0">
+              <a:buNone/>
+            </a:pPr>
+            <a:r>
               <a:t>The training starts with a classroom session with visual aids. Then the trainees are taken to a test block, chosen for its representativeness of various levels of deterioration. The trainees join in a group discussion with the instructor on the ratings for individual parcels on this test block.</a:t>
             </a:r>
           </a:p>
           <a:p>
-            <a:pPr lvl="0" indent="0" marL="0">
-              <a:buNone/>
-            </a:pPr>
-          </a:p>
-          <a:p>
-            <a:pPr lvl="0" indent="0" marL="0">
-              <a:buNone/>
-            </a:pPr>
-            <a:r>
-              <a:rPr/>
+            <a:pPr marL="0" lvl="0" indent="0">
+              <a:buNone/>
+            </a:pPr>
+            <a:endParaRPr/>
+          </a:p>
+          <a:p>
+            <a:pPr marL="0" lvl="0" indent="0">
+              <a:buNone/>
+            </a:pPr>
+            <a:r>
               <a:t>Then the trainees examine two more test blocks individually. Their ratings are compared to those of the instructor and if the average deviation in rating is within plus or minus one rating point, the trainees are certified and able to conduct surveys on their own.</a:t>
             </a:r>
           </a:p>
@@ -1432,6 +1451,9 @@
       </p:sp>
     </p:spTree>
   </p:cSld>
+  <p:clrMapOvr>
+    <a:masterClrMapping/>
+  </p:clrMapOvr>
 </p:notes>
 </file>
 
@@ -1479,11 +1501,10 @@
           <a:bodyPr/>
           <a:lstStyle/>
           <a:p>
-            <a:pPr lvl="0" indent="0" marL="0">
-              <a:buNone/>
-            </a:pPr>
-            <a:r>
-              <a:rPr/>
+            <a:pPr marL="0" lvl="0" indent="0">
+              <a:buNone/>
+            </a:pPr>
+            <a:r>
               <a:t>Research is a team sport, and I need to acknowledge my partners in this work at Children’s Mercy Hospital and the Kansas City, Missouri Department of Health.</a:t>
             </a:r>
           </a:p>
@@ -1514,6 +1535,9 @@
       </p:sp>
     </p:spTree>
   </p:cSld>
+  <p:clrMapOvr>
+    <a:masterClrMapping/>
+  </p:clrMapOvr>
 </p:notes>
 </file>
 
@@ -1561,11 +1585,10 @@
           <a:bodyPr/>
           <a:lstStyle/>
           <a:p>
-            <a:pPr lvl="0" indent="0" marL="0">
-              <a:buNone/>
-            </a:pPr>
-            <a:r>
-              <a:rPr/>
+            <a:pPr marL="0" lvl="0" indent="0">
+              <a:buNone/>
+            </a:pPr>
+            <a:r>
               <a:t>The NHCS has several quality checks built in. First, and most importantly, there are two independent ratings on every parcel. In addition, two blocks are randomly selected and inspected by an expert who compares their results on both the qualitative classification data and the quantitative condition data. The quantitative data must not deviation on average by more than one rating unit on average.</a:t>
             </a:r>
           </a:p>
@@ -1596,6 +1619,9 @@
       </p:sp>
     </p:spTree>
   </p:cSld>
+  <p:clrMapOvr>
+    <a:masterClrMapping/>
+  </p:clrMapOvr>
 </p:notes>
 </file>
 
@@ -1643,25 +1669,24 @@
           <a:bodyPr/>
           <a:lstStyle/>
           <a:p>
-            <a:pPr lvl="0" indent="0" marL="0">
-              <a:buNone/>
-            </a:pPr>
-            <a:r>
-              <a:rPr/>
+            <a:pPr marL="0" lvl="0" indent="0">
+              <a:buNone/>
+            </a:pPr>
+            <a:r>
               <a:t>There are a broad range of individuals and groups who are interested in the NHCS data.</a:t>
             </a:r>
           </a:p>
           <a:p>
-            <a:pPr lvl="0" indent="0" marL="0">
-              <a:buNone/>
-            </a:pPr>
-          </a:p>
-          <a:p>
-            <a:pPr lvl="0" indent="0" marL="0">
-              <a:buNone/>
-            </a:pPr>
-            <a:r>
-              <a:rPr/>
+            <a:pPr marL="0" lvl="0" indent="0">
+              <a:buNone/>
+            </a:pPr>
+            <a:endParaRPr/>
+          </a:p>
+          <a:p>
+            <a:pPr marL="0" lvl="0" indent="0">
+              <a:buNone/>
+            </a:pPr>
+            <a:r>
               <a:t>I want to focus, though, on the last bullet point, neighborhood and community associations. These groups are very eager to find and use data that will help them advocate on behalf of the places where they live.</a:t>
             </a:r>
           </a:p>
@@ -1692,6 +1717,9 @@
       </p:sp>
     </p:spTree>
   </p:cSld>
+  <p:clrMapOvr>
+    <a:masterClrMapping/>
+  </p:clrMapOvr>
 </p:notes>
 </file>
 
@@ -1739,67 +1767,66 @@
           <a:bodyPr/>
           <a:lstStyle/>
           <a:p>
-            <a:pPr lvl="0" indent="0" marL="0">
-              <a:buNone/>
-            </a:pPr>
-            <a:r>
-              <a:rPr/>
+            <a:pPr marL="0" lvl="0" indent="0">
+              <a:buNone/>
+            </a:pPr>
+            <a:r>
               <a:t>I would be remiss in my duties as a data geek if I did not point out the research applications of the NHCS.</a:t>
             </a:r>
           </a:p>
           <a:p>
-            <a:pPr lvl="0" indent="0" marL="0">
-              <a:buNone/>
-            </a:pPr>
-          </a:p>
-          <a:p>
-            <a:pPr lvl="0" indent="0" marL="0">
-              <a:buNone/>
-            </a:pPr>
-            <a:r>
-              <a:rPr/>
+            <a:pPr marL="0" lvl="0" indent="0">
+              <a:buNone/>
+            </a:pPr>
+            <a:endParaRPr/>
+          </a:p>
+          <a:p>
+            <a:pPr marL="0" lvl="0" indent="0">
+              <a:buNone/>
+            </a:pPr>
+            <a:r>
               <a:t>Too many studies of geographic features lump everyone into a large groups, like zip codes or counties. This mixes apples, oranges, and every type of fruit together in a one big batch and pretends that a single summary number can characterize such a diverse group.</a:t>
             </a:r>
           </a:p>
           <a:p>
-            <a:pPr lvl="0" indent="0" marL="0">
-              <a:buNone/>
-            </a:pPr>
-          </a:p>
-          <a:p>
-            <a:pPr lvl="0" indent="0" marL="0">
-              <a:buNone/>
-            </a:pPr>
-            <a:r>
-              <a:rPr/>
+            <a:pPr marL="0" lvl="0" indent="0">
+              <a:buNone/>
+            </a:pPr>
+            <a:endParaRPr/>
+          </a:p>
+          <a:p>
+            <a:pPr marL="0" lvl="0" indent="0">
+              <a:buNone/>
+            </a:pPr>
+            <a:r>
               <a:t>The NHCS, on the other hand, collects data at the finest possible level of social resolution, the household.</a:t>
             </a:r>
           </a:p>
           <a:p>
-            <a:pPr lvl="0" indent="0" marL="0">
-              <a:buNone/>
-            </a:pPr>
-          </a:p>
-          <a:p>
-            <a:pPr lvl="0" indent="0" marL="0">
-              <a:buNone/>
-            </a:pPr>
-            <a:r>
-              <a:rPr/>
+            <a:pPr marL="0" lvl="0" indent="0">
+              <a:buNone/>
+            </a:pPr>
+            <a:endParaRPr/>
+          </a:p>
+          <a:p>
+            <a:pPr marL="0" lvl="0" indent="0">
+              <a:buNone/>
+            </a:pPr>
+            <a:r>
               <a:t>You can still be easily incorporated with data at higher level geographies like the American Community Survey which collects data at the Census block group and tract level.</a:t>
             </a:r>
           </a:p>
           <a:p>
-            <a:pPr lvl="0" indent="0" marL="0">
-              <a:buNone/>
-            </a:pPr>
-          </a:p>
-          <a:p>
-            <a:pPr lvl="0" indent="0" marL="0">
-              <a:buNone/>
-            </a:pPr>
-            <a:r>
-              <a:rPr/>
+            <a:pPr marL="0" lvl="0" indent="0">
+              <a:buNone/>
+            </a:pPr>
+            <a:endParaRPr/>
+          </a:p>
+          <a:p>
+            <a:pPr marL="0" lvl="0" indent="0">
+              <a:buNone/>
+            </a:pPr>
+            <a:r>
               <a:t>You also have the option of linking this data with other records at the address level. Of particular interest to me is the linking of the NHCS data with data from the electronic health record. There are serious privacy concerns with such matching of course that require careful oversight by the Institutional Review Board. But I will cite two examples shortly that show how productive this linkage can be.</a:t>
             </a:r>
           </a:p>
@@ -1830,6 +1857,9 @@
       </p:sp>
     </p:spTree>
   </p:cSld>
+  <p:clrMapOvr>
+    <a:masterClrMapping/>
+  </p:clrMapOvr>
 </p:notes>
 </file>
 
@@ -1877,39 +1907,38 @@
           <a:bodyPr/>
           <a:lstStyle/>
           <a:p>
-            <a:pPr lvl="0" indent="0" marL="0">
-              <a:buNone/>
-            </a:pPr>
-            <a:r>
-              <a:rPr/>
+            <a:pPr marL="0" lvl="0" indent="0">
+              <a:buNone/>
+            </a:pPr>
+            <a:r>
               <a:t>The NCHS has been used for over 200,000 parcels over a fifteen year span.</a:t>
             </a:r>
           </a:p>
           <a:p>
-            <a:pPr lvl="0" indent="0" marL="0">
-              <a:buNone/>
-            </a:pPr>
-          </a:p>
-          <a:p>
-            <a:pPr lvl="0" indent="0" marL="0">
-              <a:buNone/>
-            </a:pPr>
-            <a:r>
-              <a:rPr/>
+            <a:pPr marL="0" lvl="0" indent="0">
+              <a:buNone/>
+            </a:pPr>
+            <a:endParaRPr/>
+          </a:p>
+          <a:p>
+            <a:pPr marL="0" lvl="0" indent="0">
+              <a:buNone/>
+            </a:pPr>
+            <a:r>
               <a:t>This map shows where the NHCS has been used. Those of you who know and love Kansas City will notice two important features of this map. First, we have done surveys on both sides of the state line. Second, we have done survey both north and south of the Missouri river.</a:t>
             </a:r>
           </a:p>
           <a:p>
-            <a:pPr lvl="0" indent="0" marL="0">
-              <a:buNone/>
-            </a:pPr>
-          </a:p>
-          <a:p>
-            <a:pPr lvl="0" indent="0" marL="0">
-              <a:buNone/>
-            </a:pPr>
-            <a:r>
-              <a:rPr/>
+            <a:pPr marL="0" lvl="0" indent="0">
+              <a:buNone/>
+            </a:pPr>
+            <a:endParaRPr/>
+          </a:p>
+          <a:p>
+            <a:pPr marL="0" lvl="0" indent="0">
+              <a:buNone/>
+            </a:pPr>
+            <a:r>
               <a:t>The survey has been largely inactive since 2014 due to budget problems, but we are using the survey again in the current grant we have received from HUD.</a:t>
             </a:r>
           </a:p>
@@ -1940,6 +1969,9 @@
       </p:sp>
     </p:spTree>
   </p:cSld>
+  <p:clrMapOvr>
+    <a:masterClrMapping/>
+  </p:clrMapOvr>
 </p:notes>
 </file>
 
@@ -1987,11 +2019,10 @@
           <a:bodyPr/>
           <a:lstStyle/>
           <a:p>
-            <a:pPr lvl="0" indent="0" marL="0">
-              <a:buNone/>
-            </a:pPr>
-            <a:r>
-              <a:rPr/>
+            <a:pPr marL="0" lvl="0" indent="0">
+              <a:buNone/>
+            </a:pPr>
+            <a:r>
               <a:t>The NHCS is fast and inexpensive. For our current grant, we estimated the total costs (including labor) for the NHCS to be $6.50 per parcel, though there is evidence that the costs would be even less for larger surveys. The NHCS scales very well.</a:t>
             </a:r>
           </a:p>
@@ -2022,6 +2053,9 @@
       </p:sp>
     </p:spTree>
   </p:cSld>
+  <p:clrMapOvr>
+    <a:masterClrMapping/>
+  </p:clrMapOvr>
 </p:notes>
 </file>
 
@@ -2069,25 +2103,24 @@
           <a:bodyPr/>
           <a:lstStyle/>
           <a:p>
-            <a:pPr lvl="0" indent="0" marL="0">
-              <a:buNone/>
-            </a:pPr>
-            <a:r>
-              <a:rPr/>
+            <a:pPr marL="0" lvl="0" indent="0">
+              <a:buNone/>
+            </a:pPr>
+            <a:r>
               <a:t>The revitalization of the NHCS should be credited to two graduate students, Natalie Kane and Neal Wilson.</a:t>
             </a:r>
           </a:p>
           <a:p>
-            <a:pPr lvl="0" indent="0" marL="0">
-              <a:buNone/>
-            </a:pPr>
-          </a:p>
-          <a:p>
-            <a:pPr lvl="0" indent="0" marL="0">
-              <a:buNone/>
-            </a:pPr>
-            <a:r>
-              <a:rPr/>
+            <a:pPr marL="0" lvl="0" indent="0">
+              <a:buNone/>
+            </a:pPr>
+            <a:endParaRPr/>
+          </a:p>
+          <a:p>
+            <a:pPr marL="0" lvl="0" indent="0">
+              <a:buNone/>
+            </a:pPr>
+            <a:r>
               <a:t>This is a picture of Natalie Kane. She currently works at Children’s Mercy, but I knew her from her work on a dissertation that she successfully defended in 2020. She linked the NCHS data with medical records of asthma visits at Children’s Mercy Hospital and additional geographic markers of pollution to establish a link between disparities in home environment and rates of acute pediatric asthma care encounters.</a:t>
             </a:r>
           </a:p>
@@ -2118,6 +2151,9 @@
       </p:sp>
     </p:spTree>
   </p:cSld>
+  <p:clrMapOvr>
+    <a:masterClrMapping/>
+  </p:clrMapOvr>
 </p:notes>
 </file>
 
@@ -2165,11 +2201,10 @@
           <a:bodyPr/>
           <a:lstStyle/>
           <a:p>
-            <a:pPr lvl="0" indent="0" marL="0">
-              <a:buNone/>
-            </a:pPr>
-            <a:r>
-              <a:rPr/>
+            <a:pPr marL="0" lvl="0" indent="0">
+              <a:buNone/>
+            </a:pPr>
+            <a:r>
               <a:t>Here’s a picture of Dr. Neal Wilson. Like Natalie Kane, he took NHCS data and linked it to medical records, this time with blood testing data from the Kansas City, Missouri Department of Health. He showed a strong association between housing conditions and elevated blood lead levels in children. He successfully defended his dissertation on this topic in 2021 and has continued his work in this area with the Impact Lead-Kansas City grant that I will describe on the next few slides.</a:t>
             </a:r>
           </a:p>
@@ -2200,6 +2235,9 @@
       </p:sp>
     </p:spTree>
   </p:cSld>
+  <p:clrMapOvr>
+    <a:masterClrMapping/>
+  </p:clrMapOvr>
 </p:notes>
 </file>
 
@@ -2247,25 +2285,24 @@
           <a:bodyPr/>
           <a:lstStyle/>
           <a:p>
-            <a:pPr lvl="0" indent="0" marL="0">
-              <a:buNone/>
-            </a:pPr>
-            <a:r>
-              <a:rPr/>
+            <a:pPr marL="0" lvl="0" indent="0">
+              <a:buNone/>
+            </a:pPr>
+            <a:r>
               <a:t>Here is a map of housing units in a Kansas City neighborhood. It is just west of the infamous Benton curve of I-70. The houses are color coded by era of construction. If you are interested in lead remediation efforts, the age of the house is your first criteria for where to focus your work.</a:t>
             </a:r>
           </a:p>
           <a:p>
-            <a:pPr lvl="0" indent="0" marL="0">
-              <a:buNone/>
-            </a:pPr>
-          </a:p>
-          <a:p>
-            <a:pPr lvl="0" indent="0" marL="0">
-              <a:buNone/>
-            </a:pPr>
-            <a:r>
-              <a:rPr/>
+            <a:pPr marL="0" lvl="0" indent="0">
+              <a:buNone/>
+            </a:pPr>
+            <a:endParaRPr/>
+          </a:p>
+          <a:p>
+            <a:pPr marL="0" lvl="0" indent="0">
+              <a:buNone/>
+            </a:pPr>
+            <a:r>
               <a:t>This is a map shows where the houses that you should skip: the white houses built after 1977. Earlier construction is worth looking at, but especially the homes in dark orange, built in 1952 or earlier. You can see on this map that there are quite a few orange rectangles.</a:t>
             </a:r>
           </a:p>
@@ -2296,6 +2333,9 @@
       </p:sp>
     </p:spTree>
   </p:cSld>
+  <p:clrMapOvr>
+    <a:masterClrMapping/>
+  </p:clrMapOvr>
 </p:notes>
 </file>
 
@@ -2343,11 +2383,10 @@
           <a:bodyPr/>
           <a:lstStyle/>
           <a:p>
-            <a:pPr lvl="0" indent="0" marL="0">
-              <a:buNone/>
-            </a:pPr>
-            <a:r>
-              <a:rPr/>
+            <a:pPr marL="0" lvl="0" indent="0">
+              <a:buNone/>
+            </a:pPr>
+            <a:r>
               <a:t>Work on this is not quite complete, but Neal Wilson is creating an index that accounts for both the construction era and the information from the NHCS. This map is drawn with color coding using this index. Note that there are substantially more distinctions among the housing units. There are seventeen different colors on this graph, compared to only three in the previous map. If these index proves to be more strongly associated with lead exposure than era of construction alone, and we think it will, then you have a lot fewer dark orange rectangles to focus on.</a:t>
             </a:r>
           </a:p>
@@ -2378,6 +2417,9 @@
       </p:sp>
     </p:spTree>
   </p:cSld>
+  <p:clrMapOvr>
+    <a:masterClrMapping/>
+  </p:clrMapOvr>
 </p:notes>
 </file>
 
@@ -2425,11 +2467,10 @@
           <a:bodyPr/>
           <a:lstStyle/>
           <a:p>
-            <a:pPr lvl="0" indent="0" marL="0">
-              <a:buNone/>
-            </a:pPr>
-            <a:r>
-              <a:rPr/>
+            <a:pPr marL="0" lvl="0" indent="0">
+              <a:buNone/>
+            </a:pPr>
+            <a:r>
               <a:t>We are currently surveying about 6,000 housing units in six neighborhoods in the Kansas City area. These houses are all on the Missouri side of the state line because of our partnership with the Kansas City, Missouri Department of Health. These neighborhoods have predominantly older construction. We plan to recruit 50 owners or renters in homes that score poorly on the NCHS and get permission to do detailed assessment of environmental lead exposure. These will be compared to a matched set of 50 control housing units. Our hypothesis is that poor exterior conditions as measured by the NHCS are predictive of increased risk of lead exposure in the interior of the home.</a:t>
             </a:r>
           </a:p>
@@ -2460,6 +2501,9 @@
       </p:sp>
     </p:spTree>
   </p:cSld>
+  <p:clrMapOvr>
+    <a:masterClrMapping/>
+  </p:clrMapOvr>
 </p:notes>
 </file>
 
@@ -2507,11 +2551,10 @@
           <a:bodyPr/>
           <a:lstStyle/>
           <a:p>
-            <a:pPr lvl="0" indent="0" marL="0">
-              <a:buNone/>
-            </a:pPr>
-            <a:r>
-              <a:rPr/>
+            <a:pPr marL="0" lvl="0" indent="0">
+              <a:buNone/>
+            </a:pPr>
+            <a:r>
               <a:t>I work at the University of Missouri-Kansas City, and we have many others where I work helping out with this research. I should pay special thanks to the army of graduate students who have done all the heavly lifting in the work I am about to describe.</a:t>
             </a:r>
           </a:p>
@@ -2542,6 +2585,9 @@
       </p:sp>
     </p:spTree>
   </p:cSld>
+  <p:clrMapOvr>
+    <a:masterClrMapping/>
+  </p:clrMapOvr>
 </p:notes>
 </file>
 
@@ -2589,67 +2635,66 @@
           <a:bodyPr/>
           <a:lstStyle/>
           <a:p>
-            <a:pPr lvl="0" indent="0" marL="0">
-              <a:buNone/>
-            </a:pPr>
-            <a:r>
-              <a:rPr/>
+            <a:pPr marL="0" lvl="0" indent="0">
+              <a:buNone/>
+            </a:pPr>
+            <a:r>
               <a:t>While this work is interesting in its own right, I want to explore possible future applications of the NHCS.</a:t>
             </a:r>
           </a:p>
           <a:p>
-            <a:pPr lvl="0" indent="0" marL="0">
-              <a:buNone/>
-            </a:pPr>
-          </a:p>
-          <a:p>
-            <a:pPr lvl="0" indent="0" marL="0">
-              <a:buNone/>
-            </a:pPr>
-            <a:r>
-              <a:rPr/>
+            <a:pPr marL="0" lvl="0" indent="0">
+              <a:buNone/>
+            </a:pPr>
+            <a:endParaRPr/>
+          </a:p>
+          <a:p>
+            <a:pPr marL="0" lvl="0" indent="0">
+              <a:buNone/>
+            </a:pPr>
+            <a:r>
               <a:t>Two graduate students have shown strong links between the NHCS data and health outcomes in acute asthma visits and elevated blood lead levels. Our current work intends to show a link to environmental lead inside the home. But there are other health outcomes that can be tied to housing quality. I am not a doctor, but even I can see a potential link with acute injuries like falls. There may be others worth examining.</a:t>
             </a:r>
           </a:p>
           <a:p>
-            <a:pPr lvl="0" indent="0" marL="0">
-              <a:buNone/>
-            </a:pPr>
-          </a:p>
-          <a:p>
-            <a:pPr lvl="0" indent="0" marL="0">
-              <a:buNone/>
-            </a:pPr>
-            <a:r>
-              <a:rPr/>
+            <a:pPr marL="0" lvl="0" indent="0">
+              <a:buNone/>
+            </a:pPr>
+            <a:endParaRPr/>
+          </a:p>
+          <a:p>
+            <a:pPr marL="0" lvl="0" indent="0">
+              <a:buNone/>
+            </a:pPr>
+            <a:r>
               <a:t>A second application is the use of the NHCS as training data for deep learning models. You are probably aware of the many successful uses of deep learning models to analyze image data, starting with the famous study of dogs versus cats. It is very easy to collect image data on houses through street cameras mounted on garbage trucks or on drones. These deep learning models are very powerful, but they require massive amounts of training data. The NHCS can provide that data cheaply, quickly, and on a large scale.</a:t>
             </a:r>
           </a:p>
           <a:p>
-            <a:pPr lvl="0" indent="0" marL="0">
-              <a:buNone/>
-            </a:pPr>
-          </a:p>
-          <a:p>
-            <a:pPr lvl="0" indent="0" marL="0">
-              <a:buNone/>
-            </a:pPr>
-            <a:r>
-              <a:rPr/>
+            <a:pPr marL="0" lvl="0" indent="0">
+              <a:buNone/>
+            </a:pPr>
+            <a:endParaRPr/>
+          </a:p>
+          <a:p>
+            <a:pPr marL="0" lvl="0" indent="0">
+              <a:buNone/>
+            </a:pPr>
+            <a:r>
               <a:t>A third application is even simpler, but just as important. We have had a lot of success applying the NHCS in the Kansas City metropolitan area, and the process is well defined and carefully tested. It should not be too difficult to take the NHCS on the road to other communities and see if you can replicate the successes that we have seen in Kansas City.</a:t>
             </a:r>
           </a:p>
           <a:p>
-            <a:pPr lvl="0" indent="0" marL="0">
-              <a:buNone/>
-            </a:pPr>
-          </a:p>
-          <a:p>
-            <a:pPr lvl="0" indent="0" marL="0">
-              <a:buNone/>
-            </a:pPr>
-            <a:r>
-              <a:rPr/>
+            <a:pPr marL="0" lvl="0" indent="0">
+              <a:buNone/>
+            </a:pPr>
+            <a:endParaRPr/>
+          </a:p>
+          <a:p>
+            <a:pPr marL="0" lvl="0" indent="0">
+              <a:buNone/>
+            </a:pPr>
+            <a:r>
               <a:t>These slides are available on my github site. If you have any questions, please contact me.</a:t>
             </a:r>
           </a:p>
@@ -2680,6 +2725,9 @@
       </p:sp>
     </p:spTree>
   </p:cSld>
+  <p:clrMapOvr>
+    <a:masterClrMapping/>
+  </p:clrMapOvr>
 </p:notes>
 </file>
 
@@ -2727,39 +2775,38 @@
           <a:bodyPr/>
           <a:lstStyle/>
           <a:p>
-            <a:pPr lvl="0" indent="0" marL="0">
-              <a:buNone/>
-            </a:pPr>
-            <a:r>
-              <a:rPr/>
+            <a:pPr marL="0" lvl="0" indent="0">
+              <a:buNone/>
+            </a:pPr>
+            <a:r>
               <a:t>I am the principal investigator on Impact Lead-Kansas City. This is a lead technical study funded by the Department of Housing and Urban Development. We’ve been funded for three years, 2021 through 2023. I appreciate this invitation to talk about the work on this grant.</a:t>
             </a:r>
           </a:p>
           <a:p>
-            <a:pPr lvl="0" indent="0" marL="0">
-              <a:buNone/>
-            </a:pPr>
-          </a:p>
-          <a:p>
-            <a:pPr lvl="0" indent="0" marL="0">
-              <a:buNone/>
-            </a:pPr>
-            <a:r>
-              <a:rPr/>
+            <a:pPr marL="0" lvl="0" indent="0">
+              <a:buNone/>
+            </a:pPr>
+            <a:endParaRPr/>
+          </a:p>
+          <a:p>
+            <a:pPr marL="0" lvl="0" indent="0">
+              <a:buNone/>
+            </a:pPr>
+            <a:r>
               <a:t>The grant has two aims, a retrospective review of lead remediation efforts funded by HUD through the Kansas City, Missouri Department of Health. and a prospective effort to more efficiently identify houses that might be targets for future remediation.</a:t>
             </a:r>
           </a:p>
           <a:p>
-            <a:pPr lvl="0" indent="0" marL="0">
-              <a:buNone/>
-            </a:pPr>
-          </a:p>
-          <a:p>
-            <a:pPr lvl="0" indent="0" marL="0">
-              <a:buNone/>
-            </a:pPr>
-            <a:r>
-              <a:rPr/>
+            <a:pPr marL="0" lvl="0" indent="0">
+              <a:buNone/>
+            </a:pPr>
+            <a:endParaRPr/>
+          </a:p>
+          <a:p>
+            <a:pPr marL="0" lvl="0" indent="0">
+              <a:buNone/>
+            </a:pPr>
+            <a:r>
               <a:t>I want to highlight a key component of the second aim, a survey that we hope will be useful in prospective identification of houses at risk for lead contamination, the Neighborhood Housing Conditions Survey. I am focussing on this survey because it has the potential for collaboration with other HUD grantees at this meeting.</a:t>
             </a:r>
           </a:p>
@@ -2790,6 +2837,9 @@
       </p:sp>
     </p:spTree>
   </p:cSld>
+  <p:clrMapOvr>
+    <a:masterClrMapping/>
+  </p:clrMapOvr>
 </p:notes>
 </file>
 
@@ -2837,53 +2887,52 @@
           <a:bodyPr/>
           <a:lstStyle/>
           <a:p>
-            <a:pPr lvl="0" indent="0" marL="0">
-              <a:buNone/>
-            </a:pPr>
-            <a:r>
-              <a:rPr/>
+            <a:pPr marL="0" lvl="0" indent="0">
+              <a:buNone/>
+            </a:pPr>
+            <a:r>
               <a:t>The CEI Neighborhood Housing Conditions Survey (NHCS) is a windshield survey of residential parcels. The parcel geography and other relevant information was provided by the City of Kansas City, Missouri.</a:t>
             </a:r>
           </a:p>
           <a:p>
-            <a:pPr lvl="0" indent="0" marL="0">
-              <a:buNone/>
-            </a:pPr>
-          </a:p>
-          <a:p>
-            <a:pPr lvl="0" indent="0" marL="0">
-              <a:buNone/>
-            </a:pPr>
-            <a:r>
-              <a:rPr/>
+            <a:pPr marL="0" lvl="0" indent="0">
+              <a:buNone/>
+            </a:pPr>
+            <a:endParaRPr/>
+          </a:p>
+          <a:p>
+            <a:pPr marL="0" lvl="0" indent="0">
+              <a:buNone/>
+            </a:pPr>
+            <a:r>
               <a:t>This is windshield survey, which means you collect the data by slowly driving down a street and observing housing conditions that are visible from the street level. You don’t have to go inside the house or even step inside the property boundaries.</a:t>
             </a:r>
           </a:p>
           <a:p>
-            <a:pPr lvl="0" indent="0" marL="0">
-              <a:buNone/>
-            </a:pPr>
-          </a:p>
-          <a:p>
-            <a:pPr lvl="0" indent="0" marL="0">
-              <a:buNone/>
-            </a:pPr>
-            <a:r>
-              <a:rPr/>
+            <a:pPr marL="0" lvl="0" indent="0">
+              <a:buNone/>
+            </a:pPr>
+            <a:endParaRPr/>
+          </a:p>
+          <a:p>
+            <a:pPr marL="0" lvl="0" indent="0">
+              <a:buNone/>
+            </a:pPr>
+            <a:r>
               <a:t>The primary intent of the survey is to collect conditions of residential structures. The survey will also note information on non-residential structures and vacant lots.</a:t>
             </a:r>
           </a:p>
           <a:p>
-            <a:pPr lvl="0" indent="0" marL="0">
-              <a:buNone/>
-            </a:pPr>
-          </a:p>
-          <a:p>
-            <a:pPr lvl="0" indent="0" marL="0">
-              <a:buNone/>
-            </a:pPr>
-            <a:r>
-              <a:rPr/>
+            <a:pPr marL="0" lvl="0" indent="0">
+              <a:buNone/>
+            </a:pPr>
+            <a:endParaRPr/>
+          </a:p>
+          <a:p>
+            <a:pPr marL="0" lvl="0" indent="0">
+              <a:buNone/>
+            </a:pPr>
+            <a:r>
               <a:t>The survey was developed in 1999 and has been applied continuously through 2014.</a:t>
             </a:r>
           </a:p>
@@ -2914,6 +2963,9 @@
       </p:sp>
     </p:spTree>
   </p:cSld>
+  <p:clrMapOvr>
+    <a:masterClrMapping/>
+  </p:clrMapOvr>
 </p:notes>
 </file>
 
@@ -2961,11 +3013,10 @@
           <a:bodyPr/>
           <a:lstStyle/>
           <a:p>
-            <a:pPr lvl="0" indent="0" marL="0">
-              <a:buNone/>
-            </a:pPr>
-            <a:r>
-              <a:rPr/>
+            <a:pPr marL="0" lvl="0" indent="0">
+              <a:buNone/>
+            </a:pPr>
+            <a:r>
               <a:t>The housing survey collects two types of data. It collects classification data, information that classifies the type of structure, its use, whether it is residential, the profile of the structure, and the visible address.</a:t>
             </a:r>
           </a:p>
@@ -2996,6 +3047,9 @@
       </p:sp>
     </p:spTree>
   </p:cSld>
+  <p:clrMapOvr>
+    <a:masterClrMapping/>
+  </p:clrMapOvr>
 </p:notes>
 </file>
 
@@ -3043,39 +3097,38 @@
           <a:bodyPr/>
           <a:lstStyle/>
           <a:p>
-            <a:pPr lvl="0" indent="0" marL="0">
-              <a:buNone/>
-            </a:pPr>
-            <a:r>
-              <a:rPr/>
+            <a:pPr marL="0" lvl="0" indent="0">
+              <a:buNone/>
+            </a:pPr>
+            <a:r>
               <a:t>The NHCS also collects data on housing conditions, grouped into conditions about the structure itself, the grounds, and the infrastructure.</a:t>
             </a:r>
           </a:p>
           <a:p>
-            <a:pPr lvl="0" indent="0" marL="0">
-              <a:buNone/>
-            </a:pPr>
-          </a:p>
-          <a:p>
-            <a:pPr lvl="0" indent="0" marL="0">
-              <a:buNone/>
-            </a:pPr>
-            <a:r>
-              <a:rPr/>
+            <a:pPr marL="0" lvl="0" indent="0">
+              <a:buNone/>
+            </a:pPr>
+            <a:endParaRPr/>
+          </a:p>
+          <a:p>
+            <a:pPr marL="0" lvl="0" indent="0">
+              <a:buNone/>
+            </a:pPr>
+            <a:r>
               <a:t>The condition of each of these elements is rated on a scale of 1 to 5, with 5 corresponding to the best condition and 1 corresponding to the worst condition.</a:t>
             </a:r>
           </a:p>
           <a:p>
-            <a:pPr lvl="0" indent="0" marL="0">
-              <a:buNone/>
-            </a:pPr>
-          </a:p>
-          <a:p>
-            <a:pPr lvl="0" indent="0" marL="0">
-              <a:buNone/>
-            </a:pPr>
-            <a:r>
-              <a:rPr/>
+            <a:pPr marL="0" lvl="0" indent="0">
+              <a:buNone/>
+            </a:pPr>
+            <a:endParaRPr/>
+          </a:p>
+          <a:p>
+            <a:pPr marL="0" lvl="0" indent="0">
+              <a:buNone/>
+            </a:pPr>
+            <a:r>
               <a:t>For parcels with no structure (vacant lots, parking lots, parks) there is only data for the Grounds and Infrastructure conditions.</a:t>
             </a:r>
           </a:p>
@@ -3106,6 +3159,9 @@
       </p:sp>
     </p:spTree>
   </p:cSld>
+  <p:clrMapOvr>
+    <a:masterClrMapping/>
+  </p:clrMapOvr>
 </p:notes>
 </file>
 
@@ -3153,11 +3209,10 @@
           <a:bodyPr/>
           <a:lstStyle/>
           <a:p>
-            <a:pPr lvl="0" indent="0" marL="0">
-              <a:buNone/>
-            </a:pPr>
-            <a:r>
-              <a:rPr/>
+            <a:pPr marL="0" lvl="0" indent="0">
+              <a:buNone/>
+            </a:pPr>
+            <a:r>
               <a:t>Ratings are done on five features of the structure itself: the roof, foundation and walls, windows and doolrs, the porch, and exterior paint.</a:t>
             </a:r>
           </a:p>
@@ -3188,6 +3243,9 @@
       </p:sp>
     </p:spTree>
   </p:cSld>
+  <p:clrMapOvr>
+    <a:masterClrMapping/>
+  </p:clrMapOvr>
 </p:notes>
 </file>
 
@@ -3235,11 +3293,10 @@
           <a:bodyPr/>
           <a:lstStyle/>
           <a:p>
-            <a:pPr lvl="0" indent="0" marL="0">
-              <a:buNone/>
-            </a:pPr>
-            <a:r>
-              <a:rPr/>
+            <a:pPr marL="0" lvl="0" indent="0">
+              <a:buNone/>
+            </a:pPr>
+            <a:r>
               <a:t>Ratings are also done on five features of the grounds: the private sidewalk, lawn, nuisance vehicles, litter, and open storage.</a:t>
             </a:r>
           </a:p>
@@ -3270,6 +3327,9 @@
       </p:sp>
     </p:spTree>
   </p:cSld>
+  <p:clrMapOvr>
+    <a:masterClrMapping/>
+  </p:clrMapOvr>
 </p:notes>
 </file>
 
@@ -3452,7 +3512,7 @@
           <a:p>
             <a:fld id="{241EB5C9-1307-BA42-ABA2-0BC069CD8E7F}" type="datetimeFigureOut">
               <a:rPr lang="en-US" smtClean="0"/>
-              <a:t>4/13/2023</a:t>
+              <a:t>4/17/2023</a:t>
             </a:fld>
             <a:endParaRPr lang="en-US"/>
           </a:p>
@@ -3620,7 +3680,7 @@
           <a:p>
             <a:fld id="{241EB5C9-1307-BA42-ABA2-0BC069CD8E7F}" type="datetimeFigureOut">
               <a:rPr lang="en-US" smtClean="0"/>
-              <a:t>4/13/2023</a:t>
+              <a:t>4/17/2023</a:t>
             </a:fld>
             <a:endParaRPr lang="en-US"/>
           </a:p>
@@ -3798,7 +3858,7 @@
           <a:p>
             <a:fld id="{241EB5C9-1307-BA42-ABA2-0BC069CD8E7F}" type="datetimeFigureOut">
               <a:rPr lang="en-US" smtClean="0"/>
-              <a:t>4/13/2023</a:t>
+              <a:t>4/17/2023</a:t>
             </a:fld>
             <a:endParaRPr lang="en-US"/>
           </a:p>
@@ -3966,7 +4026,7 @@
           <a:p>
             <a:fld id="{241EB5C9-1307-BA42-ABA2-0BC069CD8E7F}" type="datetimeFigureOut">
               <a:rPr lang="en-US" smtClean="0"/>
-              <a:t>4/13/2023</a:t>
+              <a:t>4/17/2023</a:t>
             </a:fld>
             <a:endParaRPr lang="en-US"/>
           </a:p>
@@ -4211,7 +4271,7 @@
           <a:p>
             <a:fld id="{241EB5C9-1307-BA42-ABA2-0BC069CD8E7F}" type="datetimeFigureOut">
               <a:rPr lang="en-US" smtClean="0"/>
-              <a:t>4/13/2023</a:t>
+              <a:t>4/17/2023</a:t>
             </a:fld>
             <a:endParaRPr lang="en-US"/>
           </a:p>
@@ -4496,7 +4556,7 @@
           <a:p>
             <a:fld id="{241EB5C9-1307-BA42-ABA2-0BC069CD8E7F}" type="datetimeFigureOut">
               <a:rPr lang="en-US" smtClean="0"/>
-              <a:t>4/13/2023</a:t>
+              <a:t>4/17/2023</a:t>
             </a:fld>
             <a:endParaRPr lang="en-US"/>
           </a:p>
@@ -4915,7 +4975,7 @@
           <a:p>
             <a:fld id="{241EB5C9-1307-BA42-ABA2-0BC069CD8E7F}" type="datetimeFigureOut">
               <a:rPr lang="en-US" smtClean="0"/>
-              <a:t>4/13/2023</a:t>
+              <a:t>4/17/2023</a:t>
             </a:fld>
             <a:endParaRPr lang="en-US"/>
           </a:p>
@@ -5032,7 +5092,7 @@
           <a:p>
             <a:fld id="{241EB5C9-1307-BA42-ABA2-0BC069CD8E7F}" type="datetimeFigureOut">
               <a:rPr lang="en-US" smtClean="0"/>
-              <a:t>4/13/2023</a:t>
+              <a:t>4/17/2023</a:t>
             </a:fld>
             <a:endParaRPr lang="en-US"/>
           </a:p>
@@ -5127,7 +5187,7 @@
           <a:p>
             <a:fld id="{241EB5C9-1307-BA42-ABA2-0BC069CD8E7F}" type="datetimeFigureOut">
               <a:rPr lang="en-US" smtClean="0"/>
-              <a:t>4/13/2023</a:t>
+              <a:t>4/17/2023</a:t>
             </a:fld>
             <a:endParaRPr lang="en-US"/>
           </a:p>
@@ -5402,7 +5462,7 @@
           <a:p>
             <a:fld id="{241EB5C9-1307-BA42-ABA2-0BC069CD8E7F}" type="datetimeFigureOut">
               <a:rPr lang="en-US" smtClean="0"/>
-              <a:t>4/13/2023</a:t>
+              <a:t>4/17/2023</a:t>
             </a:fld>
             <a:endParaRPr lang="en-US"/>
           </a:p>
@@ -5654,7 +5714,7 @@
           <a:p>
             <a:fld id="{241EB5C9-1307-BA42-ABA2-0BC069CD8E7F}" type="datetimeFigureOut">
               <a:rPr lang="en-US" smtClean="0"/>
-              <a:t>4/13/2023</a:t>
+              <a:t>4/17/2023</a:t>
             </a:fld>
             <a:endParaRPr lang="en-US"/>
           </a:p>
@@ -5716,7 +5776,7 @@
 </file>
 
 <file path=ppt/slideMasters/slideMaster1.xml><?xml version="1.0" encoding="utf-8"?>
-<p:sldMaster xmlns:a="http://schemas.openxmlformats.org/drawingml/2006/main" xmlns:p="http://schemas.openxmlformats.org/presentationml/2006/main" xmlns:r="http://schemas.openxmlformats.org/officeDocument/2006/relationships">
+<p:sldMaster xmlns:a="http://schemas.openxmlformats.org/drawingml/2006/main" xmlns:r="http://schemas.openxmlformats.org/officeDocument/2006/relationships" xmlns:p="http://schemas.openxmlformats.org/presentationml/2006/main">
   <p:cSld>
     <p:bg>
       <p:bgRef idx="1001">
@@ -5757,7 +5817,7 @@
           </a:prstGeom>
         </p:spPr>
         <p:txBody>
-          <a:bodyPr anchor="ctr" bIns="45720" lIns="91440" rIns="91440" rtlCol="0" tIns="45720" vert="horz">
+          <a:bodyPr vert="horz" lIns="91440" tIns="45720" rIns="91440" bIns="45720" rtlCol="0" anchor="ctr">
             <a:normAutofit/>
           </a:bodyPr>
           <a:lstStyle/>
@@ -5776,7 +5836,7 @@
             <a:spLocks noGrp="1"/>
           </p:cNvSpPr>
           <p:nvPr>
-            <p:ph idx="1" type="body"/>
+            <p:ph type="body" idx="1"/>
           </p:nvPr>
         </p:nvSpPr>
         <p:spPr>
@@ -5789,7 +5849,7 @@
           </a:prstGeom>
         </p:spPr>
         <p:txBody>
-          <a:bodyPr bIns="45720" lIns="91440" rIns="91440" rtlCol="0" tIns="45720" vert="horz">
+          <a:bodyPr vert="horz" lIns="91440" tIns="45720" rIns="91440" bIns="45720" rtlCol="0">
             <a:normAutofit/>
           </a:bodyPr>
           <a:lstStyle/>
@@ -5837,7 +5897,7 @@
             <a:spLocks noGrp="1"/>
           </p:cNvSpPr>
           <p:nvPr>
-            <p:ph idx="2" sz="half" type="dt"/>
+            <p:ph type="dt" sz="half" idx="2"/>
           </p:nvPr>
         </p:nvSpPr>
         <p:spPr>
@@ -5850,7 +5910,7 @@
           </a:prstGeom>
         </p:spPr>
         <p:txBody>
-          <a:bodyPr anchor="ctr" bIns="45720" lIns="91440" rIns="91440" rtlCol="0" tIns="45720" vert="horz"/>
+          <a:bodyPr vert="horz" lIns="91440" tIns="45720" rIns="91440" bIns="45720" rtlCol="0" anchor="ctr"/>
           <a:lstStyle>
             <a:lvl1pPr algn="l">
               <a:defRPr sz="1200">
@@ -5865,7 +5925,7 @@
           <a:p>
             <a:fld id="{241EB5C9-1307-BA42-ABA2-0BC069CD8E7F}" type="datetimeFigureOut">
               <a:rPr lang="en-US" smtClean="0"/>
-              <a:t>4/13/2023</a:t>
+              <a:t>4/17/2023</a:t>
             </a:fld>
             <a:endParaRPr lang="en-US"/>
           </a:p>
@@ -5878,7 +5938,7 @@
             <a:spLocks noGrp="1"/>
           </p:cNvSpPr>
           <p:nvPr>
-            <p:ph idx="3" sz="quarter" type="ftr"/>
+            <p:ph type="ftr" sz="quarter" idx="3"/>
           </p:nvPr>
         </p:nvSpPr>
         <p:spPr>
@@ -5891,7 +5951,7 @@
           </a:prstGeom>
         </p:spPr>
         <p:txBody>
-          <a:bodyPr anchor="ctr" bIns="45720" lIns="91440" rIns="91440" rtlCol="0" tIns="45720" vert="horz"/>
+          <a:bodyPr vert="horz" lIns="91440" tIns="45720" rIns="91440" bIns="45720" rtlCol="0" anchor="ctr"/>
           <a:lstStyle>
             <a:lvl1pPr algn="ctr">
               <a:defRPr sz="1200">
@@ -5915,7 +5975,7 @@
             <a:spLocks noGrp="1"/>
           </p:cNvSpPr>
           <p:nvPr>
-            <p:ph idx="4" sz="quarter" type="sldNum"/>
+            <p:ph type="sldNum" sz="quarter" idx="4"/>
           </p:nvPr>
         </p:nvSpPr>
         <p:spPr>
@@ -5928,7 +5988,7 @@
           </a:prstGeom>
         </p:spPr>
         <p:txBody>
-          <a:bodyPr anchor="ctr" bIns="45720" lIns="91440" rIns="91440" rtlCol="0" tIns="45720" vert="horz"/>
+          <a:bodyPr vert="horz" lIns="91440" tIns="45720" rIns="91440" bIns="45720" rtlCol="0" anchor="ctr"/>
           <a:lstStyle>
             <a:lvl1pPr algn="r">
               <a:defRPr sz="1200">
@@ -5956,7 +6016,7 @@
       </p:ext>
     </p:extLst>
   </p:cSld>
-  <p:clrMap accent1="accent1" accent2="accent2" accent3="accent3" accent4="accent4" accent5="accent5" accent6="accent6" bg1="lt1" bg2="lt2" folHlink="folHlink" hlink="hlink" tx1="dk1" tx2="dk2"/>
+  <p:clrMap bg1="lt1" tx1="dk1" bg2="lt2" tx2="dk2" accent1="accent1" accent2="accent2" accent3="accent3" accent4="accent4" accent5="accent5" accent6="accent6" hlink="hlink" folHlink="folHlink"/>
   <p:sldLayoutIdLst>
     <p:sldLayoutId id="2147483649" r:id="rId1"/>
     <p:sldLayoutId id="2147483650" r:id="rId2"/>
@@ -5972,12 +6032,12 @@
   </p:sldLayoutIdLst>
   <p:txStyles>
     <p:titleStyle>
-      <a:lvl1pPr algn="ctr" defTabSz="457200" eaLnBrk="1" hangingPunct="1" latinLnBrk="0" rtl="0">
+      <a:lvl1pPr algn="ctr" defTabSz="457200" rtl="0" eaLnBrk="1" latinLnBrk="0" hangingPunct="1">
         <a:spcBef>
           <a:spcPct val="0"/>
         </a:spcBef>
         <a:buNone/>
-        <a:defRPr kern="1200" sz="4400">
+        <a:defRPr sz="4400" kern="1200">
           <a:solidFill>
             <a:schemeClr val="tx1"/>
           </a:solidFill>
@@ -5988,13 +6048,13 @@
       </a:lvl1pPr>
     </p:titleStyle>
     <p:bodyStyle>
-      <a:lvl1pPr algn="l" defTabSz="457200" eaLnBrk="1" hangingPunct="1" indent="-342900" latinLnBrk="0" marL="342900" rtl="0">
+      <a:lvl1pPr marL="342900" indent="-342900" algn="l" defTabSz="457200" rtl="0" eaLnBrk="1" latinLnBrk="0" hangingPunct="1">
         <a:spcBef>
           <a:spcPct val="20000"/>
         </a:spcBef>
         <a:buFont typeface="Arial"/>
         <a:buChar char="•"/>
-        <a:defRPr kern="1200" sz="3200">
+        <a:defRPr sz="3200" kern="1200">
           <a:solidFill>
             <a:schemeClr val="tx1"/>
           </a:solidFill>
@@ -6003,13 +6063,13 @@
           <a:cs typeface="+mn-cs"/>
         </a:defRPr>
       </a:lvl1pPr>
-      <a:lvl2pPr algn="l" defTabSz="457200" eaLnBrk="1" hangingPunct="1" indent="-285750" latinLnBrk="0" marL="742950" rtl="0">
+      <a:lvl2pPr marL="742950" indent="-285750" algn="l" defTabSz="457200" rtl="0" eaLnBrk="1" latinLnBrk="0" hangingPunct="1">
         <a:spcBef>
           <a:spcPct val="20000"/>
         </a:spcBef>
         <a:buFont typeface="Arial"/>
         <a:buChar char="–"/>
-        <a:defRPr kern="1200" sz="2800">
+        <a:defRPr sz="2800" kern="1200">
           <a:solidFill>
             <a:schemeClr val="tx1"/>
           </a:solidFill>
@@ -6018,13 +6078,13 @@
           <a:cs typeface="+mn-cs"/>
         </a:defRPr>
       </a:lvl2pPr>
-      <a:lvl3pPr algn="l" defTabSz="457200" eaLnBrk="1" hangingPunct="1" indent="-228600" latinLnBrk="0" marL="1143000" rtl="0">
+      <a:lvl3pPr marL="1143000" indent="-228600" algn="l" defTabSz="457200" rtl="0" eaLnBrk="1" latinLnBrk="0" hangingPunct="1">
         <a:spcBef>
           <a:spcPct val="20000"/>
         </a:spcBef>
         <a:buFont typeface="Arial"/>
         <a:buChar char="•"/>
-        <a:defRPr kern="1200" sz="2400">
+        <a:defRPr sz="2400" kern="1200">
           <a:solidFill>
             <a:schemeClr val="tx1"/>
           </a:solidFill>
@@ -6033,13 +6093,13 @@
           <a:cs typeface="+mn-cs"/>
         </a:defRPr>
       </a:lvl3pPr>
-      <a:lvl4pPr algn="l" defTabSz="457200" eaLnBrk="1" hangingPunct="1" indent="-228600" latinLnBrk="0" marL="1600200" rtl="0">
+      <a:lvl4pPr marL="1600200" indent="-228600" algn="l" defTabSz="457200" rtl="0" eaLnBrk="1" latinLnBrk="0" hangingPunct="1">
         <a:spcBef>
           <a:spcPct val="20000"/>
         </a:spcBef>
         <a:buFont typeface="Arial"/>
         <a:buChar char="–"/>
-        <a:defRPr kern="1200" sz="2000">
+        <a:defRPr sz="2000" kern="1200">
           <a:solidFill>
             <a:schemeClr val="tx1"/>
           </a:solidFill>
@@ -6048,13 +6108,13 @@
           <a:cs typeface="+mn-cs"/>
         </a:defRPr>
       </a:lvl4pPr>
-      <a:lvl5pPr algn="l" defTabSz="457200" eaLnBrk="1" hangingPunct="1" indent="-228600" latinLnBrk="0" marL="2057400" rtl="0">
+      <a:lvl5pPr marL="2057400" indent="-228600" algn="l" defTabSz="457200" rtl="0" eaLnBrk="1" latinLnBrk="0" hangingPunct="1">
         <a:spcBef>
           <a:spcPct val="20000"/>
         </a:spcBef>
         <a:buFont typeface="Arial"/>
         <a:buChar char="»"/>
-        <a:defRPr kern="1200" sz="2000">
+        <a:defRPr sz="2000" kern="1200">
           <a:solidFill>
             <a:schemeClr val="tx1"/>
           </a:solidFill>
@@ -6063,13 +6123,13 @@
           <a:cs typeface="+mn-cs"/>
         </a:defRPr>
       </a:lvl5pPr>
-      <a:lvl6pPr algn="l" defTabSz="457200" eaLnBrk="1" hangingPunct="1" indent="-228600" latinLnBrk="0" marL="2514600" rtl="0">
+      <a:lvl6pPr marL="2514600" indent="-228600" algn="l" defTabSz="457200" rtl="0" eaLnBrk="1" latinLnBrk="0" hangingPunct="1">
         <a:spcBef>
           <a:spcPct val="20000"/>
         </a:spcBef>
         <a:buFont typeface="Arial"/>
         <a:buChar char="•"/>
-        <a:defRPr kern="1200" sz="2000">
+        <a:defRPr sz="2000" kern="1200">
           <a:solidFill>
             <a:schemeClr val="tx1"/>
           </a:solidFill>
@@ -6078,13 +6138,13 @@
           <a:cs typeface="+mn-cs"/>
         </a:defRPr>
       </a:lvl6pPr>
-      <a:lvl7pPr algn="l" defTabSz="457200" eaLnBrk="1" hangingPunct="1" indent="-228600" latinLnBrk="0" marL="2971800" rtl="0">
+      <a:lvl7pPr marL="2971800" indent="-228600" algn="l" defTabSz="457200" rtl="0" eaLnBrk="1" latinLnBrk="0" hangingPunct="1">
         <a:spcBef>
           <a:spcPct val="20000"/>
         </a:spcBef>
         <a:buFont typeface="Arial"/>
         <a:buChar char="•"/>
-        <a:defRPr kern="1200" sz="2000">
+        <a:defRPr sz="2000" kern="1200">
           <a:solidFill>
             <a:schemeClr val="tx1"/>
           </a:solidFill>
@@ -6093,13 +6153,13 @@
           <a:cs typeface="+mn-cs"/>
         </a:defRPr>
       </a:lvl7pPr>
-      <a:lvl8pPr algn="l" defTabSz="457200" eaLnBrk="1" hangingPunct="1" indent="-228600" latinLnBrk="0" marL="3429000" rtl="0">
+      <a:lvl8pPr marL="3429000" indent="-228600" algn="l" defTabSz="457200" rtl="0" eaLnBrk="1" latinLnBrk="0" hangingPunct="1">
         <a:spcBef>
           <a:spcPct val="20000"/>
         </a:spcBef>
         <a:buFont typeface="Arial"/>
         <a:buChar char="•"/>
-        <a:defRPr kern="1200" sz="2000">
+        <a:defRPr sz="2000" kern="1200">
           <a:solidFill>
             <a:schemeClr val="tx1"/>
           </a:solidFill>
@@ -6108,13 +6168,13 @@
           <a:cs typeface="+mn-cs"/>
         </a:defRPr>
       </a:lvl8pPr>
-      <a:lvl9pPr algn="l" defTabSz="457200" eaLnBrk="1" hangingPunct="1" indent="-228600" latinLnBrk="0" marL="3886200" rtl="0">
+      <a:lvl9pPr marL="3886200" indent="-228600" algn="l" defTabSz="457200" rtl="0" eaLnBrk="1" latinLnBrk="0" hangingPunct="1">
         <a:spcBef>
           <a:spcPct val="20000"/>
         </a:spcBef>
         <a:buFont typeface="Arial"/>
         <a:buChar char="•"/>
-        <a:defRPr kern="1200" sz="2000">
+        <a:defRPr sz="2000" kern="1200">
           <a:solidFill>
             <a:schemeClr val="tx1"/>
           </a:solidFill>
@@ -6128,8 +6188,8 @@
       <a:defPPr>
         <a:defRPr lang="en-US"/>
       </a:defPPr>
-      <a:lvl1pPr algn="l" defTabSz="457200" eaLnBrk="1" hangingPunct="1" latinLnBrk="0" marL="0" rtl="0">
-        <a:defRPr kern="1200" sz="1800">
+      <a:lvl1pPr marL="0" algn="l" defTabSz="457200" rtl="0" eaLnBrk="1" latinLnBrk="0" hangingPunct="1">
+        <a:defRPr sz="1800" kern="1200">
           <a:solidFill>
             <a:schemeClr val="tx1"/>
           </a:solidFill>
@@ -6138,8 +6198,8 @@
           <a:cs typeface="+mn-cs"/>
         </a:defRPr>
       </a:lvl1pPr>
-      <a:lvl2pPr algn="l" defTabSz="457200" eaLnBrk="1" hangingPunct="1" latinLnBrk="0" marL="457200" rtl="0">
-        <a:defRPr kern="1200" sz="1800">
+      <a:lvl2pPr marL="457200" algn="l" defTabSz="457200" rtl="0" eaLnBrk="1" latinLnBrk="0" hangingPunct="1">
+        <a:defRPr sz="1800" kern="1200">
           <a:solidFill>
             <a:schemeClr val="tx1"/>
           </a:solidFill>
@@ -6148,8 +6208,8 @@
           <a:cs typeface="+mn-cs"/>
         </a:defRPr>
       </a:lvl2pPr>
-      <a:lvl3pPr algn="l" defTabSz="457200" eaLnBrk="1" hangingPunct="1" latinLnBrk="0" marL="914400" rtl="0">
-        <a:defRPr kern="1200" sz="1800">
+      <a:lvl3pPr marL="914400" algn="l" defTabSz="457200" rtl="0" eaLnBrk="1" latinLnBrk="0" hangingPunct="1">
+        <a:defRPr sz="1800" kern="1200">
           <a:solidFill>
             <a:schemeClr val="tx1"/>
           </a:solidFill>
@@ -6158,8 +6218,8 @@
           <a:cs typeface="+mn-cs"/>
         </a:defRPr>
       </a:lvl3pPr>
-      <a:lvl4pPr algn="l" defTabSz="457200" eaLnBrk="1" hangingPunct="1" latinLnBrk="0" marL="1371600" rtl="0">
-        <a:defRPr kern="1200" sz="1800">
+      <a:lvl4pPr marL="1371600" algn="l" defTabSz="457200" rtl="0" eaLnBrk="1" latinLnBrk="0" hangingPunct="1">
+        <a:defRPr sz="1800" kern="1200">
           <a:solidFill>
             <a:schemeClr val="tx1"/>
           </a:solidFill>
@@ -6168,8 +6228,8 @@
           <a:cs typeface="+mn-cs"/>
         </a:defRPr>
       </a:lvl4pPr>
-      <a:lvl5pPr algn="l" defTabSz="457200" eaLnBrk="1" hangingPunct="1" latinLnBrk="0" marL="1828800" rtl="0">
-        <a:defRPr kern="1200" sz="1800">
+      <a:lvl5pPr marL="1828800" algn="l" defTabSz="457200" rtl="0" eaLnBrk="1" latinLnBrk="0" hangingPunct="1">
+        <a:defRPr sz="1800" kern="1200">
           <a:solidFill>
             <a:schemeClr val="tx1"/>
           </a:solidFill>
@@ -6178,8 +6238,8 @@
           <a:cs typeface="+mn-cs"/>
         </a:defRPr>
       </a:lvl5pPr>
-      <a:lvl6pPr algn="l" defTabSz="457200" eaLnBrk="1" hangingPunct="1" latinLnBrk="0" marL="2286000" rtl="0">
-        <a:defRPr kern="1200" sz="1800">
+      <a:lvl6pPr marL="2286000" algn="l" defTabSz="457200" rtl="0" eaLnBrk="1" latinLnBrk="0" hangingPunct="1">
+        <a:defRPr sz="1800" kern="1200">
           <a:solidFill>
             <a:schemeClr val="tx1"/>
           </a:solidFill>
@@ -6188,8 +6248,8 @@
           <a:cs typeface="+mn-cs"/>
         </a:defRPr>
       </a:lvl6pPr>
-      <a:lvl7pPr algn="l" defTabSz="457200" eaLnBrk="1" hangingPunct="1" latinLnBrk="0" marL="2743200" rtl="0">
-        <a:defRPr kern="1200" sz="1800">
+      <a:lvl7pPr marL="2743200" algn="l" defTabSz="457200" rtl="0" eaLnBrk="1" latinLnBrk="0" hangingPunct="1">
+        <a:defRPr sz="1800" kern="1200">
           <a:solidFill>
             <a:schemeClr val="tx1"/>
           </a:solidFill>
@@ -6198,8 +6258,8 @@
           <a:cs typeface="+mn-cs"/>
         </a:defRPr>
       </a:lvl7pPr>
-      <a:lvl8pPr algn="l" defTabSz="457200" eaLnBrk="1" hangingPunct="1" latinLnBrk="0" marL="3200400" rtl="0">
-        <a:defRPr kern="1200" sz="1800">
+      <a:lvl8pPr marL="3200400" algn="l" defTabSz="457200" rtl="0" eaLnBrk="1" latinLnBrk="0" hangingPunct="1">
+        <a:defRPr sz="1800" kern="1200">
           <a:solidFill>
             <a:schemeClr val="tx1"/>
           </a:solidFill>
@@ -6208,8 +6268,8 @@
           <a:cs typeface="+mn-cs"/>
         </a:defRPr>
       </a:lvl8pPr>
-      <a:lvl9pPr algn="l" defTabSz="457200" eaLnBrk="1" hangingPunct="1" latinLnBrk="0" marL="3657600" rtl="0">
-        <a:defRPr kern="1200" sz="1800">
+      <a:lvl9pPr marL="3657600" algn="l" defTabSz="457200" rtl="0" eaLnBrk="1" latinLnBrk="0" hangingPunct="1">
+        <a:defRPr sz="1800" kern="1200">
           <a:solidFill>
             <a:schemeClr val="tx1"/>
           </a:solidFill>
@@ -6260,18 +6320,11 @@
           <a:bodyPr/>
           <a:lstStyle/>
           <a:p>
-            <a:pPr lvl="0" indent="0" marL="0">
-              <a:buNone/>
-            </a:pPr>
-            <a:r>
-              <a:rPr/>
-              <a:t>The Neighborhood Housing Conditions Survey, </a:t>
-            </a:r>
-            <a:r>
-              <a:rPr>
-                <a:hlinkClick r:id="rId2"/>
-              </a:rPr>
-              <a:t>https://github.com/pmean/talks/nhcs</a:t>
+            <a:pPr marL="0" lvl="0" indent="0">
+              <a:buNone/>
+            </a:pPr>
+            <a:r>
+              <a:t>The Neighborhood Housing Conditions Survey</a:t>
             </a:r>
           </a:p>
         </p:txBody>
@@ -6283,7 +6336,7 @@
             <a:spLocks noGrp="1"/>
           </p:cNvSpPr>
           <p:nvPr>
-            <p:ph idx="1" type="subTitle"/>
+            <p:ph type="subTitle" idx="1"/>
           </p:nvPr>
         </p:nvSpPr>
         <p:spPr>
@@ -6293,23 +6346,41 @@
           </a:xfrm>
         </p:spPr>
         <p:txBody>
-          <a:bodyPr/>
-          <a:lstStyle/>
-          <a:p>
-            <a:pPr lvl="0" indent="0" marL="0">
-              <a:buNone/>
-            </a:pPr>
-            <a:br/>
-            <a:br/>
-            <a:r>
-              <a:rPr/>
-              <a:t>Steve Simon</a:t>
-            </a:r>
+          <a:bodyPr>
+            <a:normAutofit fontScale="92500" lnSpcReduction="10000"/>
+          </a:bodyPr>
+          <a:lstStyle/>
+          <a:p>
+            <a:pPr marL="0" lvl="0" indent="0">
+              <a:buNone/>
+            </a:pPr>
+            <a:br>
+              <a:rPr dirty="0"/>
+            </a:br>
+            <a:br>
+              <a:rPr dirty="0"/>
+            </a:br>
+            <a:r>
+              <a:rPr dirty="0"/>
+              <a:t>Steve Simon, </a:t>
+            </a:r>
+            <a:r>
+              <a:rPr sz="2800" dirty="0">
+                <a:hlinkClick r:id="rId2"/>
+              </a:rPr>
+              <a:t>https://github.com/pmean/talks/tree/master/nhcs</a:t>
+            </a:r>
+            <a:endParaRPr dirty="0">
+              <a:hlinkClick r:id="rId2"/>
+            </a:endParaRPr>
           </a:p>
         </p:txBody>
       </p:sp>
     </p:spTree>
   </p:cSld>
+  <p:clrMapOvr>
+    <a:masterClrMapping/>
+  </p:clrMapOvr>
 </p:sld>
 </file>
 
@@ -6345,11 +6416,10 @@
           <a:bodyPr/>
           <a:lstStyle/>
           <a:p>
-            <a:pPr lvl="0" indent="0" marL="0">
-              <a:buNone/>
-            </a:pPr>
-            <a:r>
-              <a:rPr/>
+            <a:pPr marL="0" lvl="0" indent="0">
+              <a:buNone/>
+            </a:pPr>
+            <a:r>
               <a:t>NHCS conditions data on grounds</a:t>
             </a:r>
           </a:p>
@@ -6372,35 +6442,30 @@
           <a:p>
             <a:pPr lvl="0"/>
             <a:r>
-              <a:rPr/>
               <a:t>Private sidewalk/drive</a:t>
             </a:r>
           </a:p>
           <a:p>
             <a:pPr lvl="0"/>
             <a:r>
-              <a:rPr/>
               <a:t>Lawn/shrubs</a:t>
             </a:r>
           </a:p>
           <a:p>
             <a:pPr lvl="0"/>
             <a:r>
-              <a:rPr/>
               <a:t>Nuisance vehicles</a:t>
             </a:r>
           </a:p>
           <a:p>
             <a:pPr lvl="0"/>
             <a:r>
-              <a:rPr/>
               <a:t>Litter</a:t>
             </a:r>
           </a:p>
           <a:p>
             <a:pPr lvl="0"/>
             <a:r>
-              <a:rPr/>
               <a:t>Open storage</a:t>
             </a:r>
           </a:p>
@@ -6408,6 +6473,9 @@
       </p:sp>
     </p:spTree>
   </p:cSld>
+  <p:clrMapOvr>
+    <a:masterClrMapping/>
+  </p:clrMapOvr>
 </p:sld>
 </file>
 
@@ -6443,11 +6511,10 @@
           <a:bodyPr/>
           <a:lstStyle/>
           <a:p>
-            <a:pPr lvl="0" indent="0" marL="0">
-              <a:buNone/>
-            </a:pPr>
-            <a:r>
-              <a:rPr/>
+            <a:pPr marL="0" lvl="0" indent="0">
+              <a:buNone/>
+            </a:pPr>
+            <a:r>
               <a:t>NHCS Infrastructure</a:t>
             </a:r>
           </a:p>
@@ -6470,35 +6537,30 @@
           <a:p>
             <a:pPr lvl="0"/>
             <a:r>
-              <a:rPr/>
               <a:t>Public sidewalk</a:t>
             </a:r>
           </a:p>
           <a:p>
             <a:pPr lvl="0"/>
             <a:r>
-              <a:rPr/>
               <a:t>Curb</a:t>
             </a:r>
           </a:p>
           <a:p>
             <a:pPr lvl="0"/>
             <a:r>
-              <a:rPr/>
               <a:t>Street lighting</a:t>
             </a:r>
           </a:p>
           <a:p>
             <a:pPr lvl="0"/>
             <a:r>
-              <a:rPr/>
               <a:t>Catch basin</a:t>
             </a:r>
           </a:p>
           <a:p>
             <a:pPr lvl="0"/>
             <a:r>
-              <a:rPr/>
               <a:t>Street</a:t>
             </a:r>
           </a:p>
@@ -6506,6 +6568,9 @@
       </p:sp>
     </p:spTree>
   </p:cSld>
+  <p:clrMapOvr>
+    <a:masterClrMapping/>
+  </p:clrMapOvr>
 </p:sld>
 </file>
 
@@ -6541,11 +6606,10 @@
           <a:bodyPr/>
           <a:lstStyle/>
           <a:p>
-            <a:pPr lvl="0" indent="0" marL="0">
-              <a:buNone/>
-            </a:pPr>
-            <a:r>
-              <a:rPr/>
+            <a:pPr marL="0" lvl="0" indent="0">
+              <a:buNone/>
+            </a:pPr>
+            <a:r>
               <a:t>Condition ratings</a:t>
             </a:r>
           </a:p>
@@ -6568,63 +6632,54 @@
           <a:p>
             <a:pPr lvl="0"/>
             <a:r>
-              <a:rPr/>
               <a:t>Likert scale (1-5)</a:t>
             </a:r>
           </a:p>
           <a:p>
             <a:pPr lvl="1"/>
             <a:r>
-              <a:rPr/>
               <a:t>1, Severely deteriorated</a:t>
             </a:r>
           </a:p>
           <a:p>
             <a:pPr lvl="1"/>
             <a:r>
-              <a:rPr/>
               <a:t>2, Seriously deteriorated</a:t>
             </a:r>
           </a:p>
           <a:p>
             <a:pPr lvl="1"/>
             <a:r>
-              <a:rPr/>
               <a:t>3, Substandard</a:t>
             </a:r>
           </a:p>
           <a:p>
             <a:pPr lvl="1"/>
             <a:r>
-              <a:rPr/>
               <a:t>4, Good</a:t>
             </a:r>
           </a:p>
           <a:p>
             <a:pPr lvl="1"/>
             <a:r>
-              <a:rPr/>
               <a:t>5, Excellent</a:t>
             </a:r>
           </a:p>
           <a:p>
             <a:pPr lvl="0"/>
             <a:r>
-              <a:rPr/>
               <a:t>Missing value codes</a:t>
             </a:r>
           </a:p>
           <a:p>
             <a:pPr lvl="1"/>
             <a:r>
-              <a:rPr/>
               <a:t>6, not applicable</a:t>
             </a:r>
           </a:p>
           <a:p>
             <a:pPr lvl="1"/>
             <a:r>
-              <a:rPr/>
               <a:t>7, unable to rate</a:t>
             </a:r>
           </a:p>
@@ -6632,6 +6687,9 @@
       </p:sp>
     </p:spTree>
   </p:cSld>
+  <p:clrMapOvr>
+    <a:masterClrMapping/>
+  </p:clrMapOvr>
 </p:sld>
 </file>
 
@@ -6667,11 +6725,10 @@
           <a:bodyPr/>
           <a:lstStyle/>
           <a:p>
-            <a:pPr lvl="0" indent="0" marL="0">
-              <a:buNone/>
-            </a:pPr>
-            <a:r>
-              <a:rPr/>
+            <a:pPr marL="0" lvl="0" indent="0">
+              <a:buNone/>
+            </a:pPr>
+            <a:r>
               <a:t>Example Structure/roof</a:t>
             </a:r>
           </a:p>
@@ -6692,11 +6749,10 @@
           <a:bodyPr/>
           <a:lstStyle/>
           <a:p>
-            <a:pPr lvl="0" indent="-457200" marL="457200">
+            <a:pPr marL="457200" lvl="0" indent="-457200">
               <a:buAutoNum type="arabicPeriod"/>
             </a:pPr>
             <a:r>
-              <a:rPr/>
               <a:t>Severely Deteriorated. There are holes visible through roof sheathing. Rafters are sagging or collapsed. Soffits and fascia boards are missing or display severe rot and deterioration.</a:t>
             </a:r>
           </a:p>
@@ -6704,6 +6760,9 @@
       </p:sp>
     </p:spTree>
   </p:cSld>
+  <p:clrMapOvr>
+    <a:masterClrMapping/>
+  </p:clrMapOvr>
 </p:sld>
 </file>
 
@@ -6739,11 +6798,10 @@
           <a:bodyPr/>
           <a:lstStyle/>
           <a:p>
-            <a:pPr lvl="0" indent="0" marL="0">
-              <a:buNone/>
-            </a:pPr>
-            <a:r>
-              <a:rPr/>
+            <a:pPr marL="0" lvl="0" indent="0">
+              <a:buNone/>
+            </a:pPr>
+            <a:r>
               <a:t>Example Structure/roof</a:t>
             </a:r>
           </a:p>
@@ -6764,11 +6822,10 @@
           <a:bodyPr/>
           <a:lstStyle/>
           <a:p>
-            <a:pPr lvl="0" indent="-457200" marL="457200">
-              <a:buAutoNum startAt="2" type="arabicPeriod"/>
-            </a:pPr>
-            <a:r>
-              <a:rPr/>
+            <a:pPr marL="457200" lvl="0" indent="-457200">
+              <a:buAutoNum type="arabicPeriod" startAt="2"/>
+            </a:pPr>
+            <a:r>
               <a:t>Seriously Deteriorated. There are no holes present. The roof has sagging rafters, but sagging is not severe. Roofing shingles are extremely deteriorated. More than five shingles are currently missing on the front exposure of the roof. It appears some sheathing needs to be replaced. Soffits and fascia boards display moderate rot and deterioration.</a:t>
             </a:r>
           </a:p>
@@ -6776,6 +6833,9 @@
       </p:sp>
     </p:spTree>
   </p:cSld>
+  <p:clrMapOvr>
+    <a:masterClrMapping/>
+  </p:clrMapOvr>
 </p:sld>
 </file>
 
@@ -6811,11 +6871,10 @@
           <a:bodyPr/>
           <a:lstStyle/>
           <a:p>
-            <a:pPr lvl="0" indent="0" marL="0">
-              <a:buNone/>
-            </a:pPr>
-            <a:r>
-              <a:rPr/>
+            <a:pPr marL="0" lvl="0" indent="0">
+              <a:buNone/>
+            </a:pPr>
+            <a:r>
               <a:t>Example Structure/roof</a:t>
             </a:r>
           </a:p>
@@ -6836,11 +6895,10 @@
           <a:bodyPr/>
           <a:lstStyle/>
           <a:p>
-            <a:pPr lvl="0" indent="-457200" marL="457200">
-              <a:buAutoNum startAt="3" type="arabicPeriod"/>
-            </a:pPr>
-            <a:r>
-              <a:rPr/>
+            <a:pPr marL="457200" lvl="0" indent="-457200">
+              <a:buAutoNum type="arabicPeriod" startAt="3"/>
+            </a:pPr>
+            <a:r>
               <a:t>Substandard. There are no holes or sagging. Roofing shingles are deteriorated and should be removed before new shingles are installed. Less than five shingles are missing on the entire roof. Soffits and fascia boards display slight rot deterioration.</a:t>
             </a:r>
           </a:p>
@@ -6848,6 +6906,9 @@
       </p:sp>
     </p:spTree>
   </p:cSld>
+  <p:clrMapOvr>
+    <a:masterClrMapping/>
+  </p:clrMapOvr>
 </p:sld>
 </file>
 
@@ -6883,11 +6944,10 @@
           <a:bodyPr/>
           <a:lstStyle/>
           <a:p>
-            <a:pPr lvl="0" indent="0" marL="0">
-              <a:buNone/>
-            </a:pPr>
-            <a:r>
-              <a:rPr/>
+            <a:pPr marL="0" lvl="0" indent="0">
+              <a:buNone/>
+            </a:pPr>
+            <a:r>
               <a:t>Example Structure/roof</a:t>
             </a:r>
           </a:p>
@@ -6908,11 +6968,10 @@
           <a:bodyPr/>
           <a:lstStyle/>
           <a:p>
-            <a:pPr lvl="0" indent="-457200" marL="457200">
-              <a:buAutoNum startAt="4" type="arabicPeriod"/>
-            </a:pPr>
-            <a:r>
-              <a:rPr/>
+            <a:pPr marL="457200" lvl="0" indent="-457200">
+              <a:buAutoNum type="arabicPeriod" startAt="4"/>
+            </a:pPr>
+            <a:r>
               <a:t>Good. This represents slight discoloration or the need to repaint soffits and fascia boards.</a:t>
             </a:r>
           </a:p>
@@ -6920,6 +6979,9 @@
       </p:sp>
     </p:spTree>
   </p:cSld>
+  <p:clrMapOvr>
+    <a:masterClrMapping/>
+  </p:clrMapOvr>
 </p:sld>
 </file>
 
@@ -6955,11 +7017,10 @@
           <a:bodyPr/>
           <a:lstStyle/>
           <a:p>
-            <a:pPr lvl="0" indent="0" marL="0">
-              <a:buNone/>
-            </a:pPr>
-            <a:r>
-              <a:rPr/>
+            <a:pPr marL="0" lvl="0" indent="0">
+              <a:buNone/>
+            </a:pPr>
+            <a:r>
               <a:t>Example Structure/roof</a:t>
             </a:r>
           </a:p>
@@ -6980,11 +7041,10 @@
           <a:bodyPr/>
           <a:lstStyle/>
           <a:p>
-            <a:pPr lvl="0" indent="-457200" marL="457200">
-              <a:buAutoNum startAt="5" type="arabicPeriod"/>
-            </a:pPr>
-            <a:r>
-              <a:rPr/>
+            <a:pPr marL="457200" lvl="0" indent="-457200">
+              <a:buAutoNum type="arabicPeriod" startAt="5"/>
+            </a:pPr>
+            <a:r>
               <a:t>Excellent. Roofing shingles show no wear. Soffits and fascia boards display no rot nor deterioration and are adequately installed.</a:t>
             </a:r>
           </a:p>
@@ -6992,6 +7052,9 @@
       </p:sp>
     </p:spTree>
   </p:cSld>
+  <p:clrMapOvr>
+    <a:masterClrMapping/>
+  </p:clrMapOvr>
 </p:sld>
 </file>
 
@@ -7027,11 +7090,10 @@
           <a:bodyPr/>
           <a:lstStyle/>
           <a:p>
-            <a:pPr lvl="0" indent="0" marL="0">
-              <a:buNone/>
-            </a:pPr>
-            <a:r>
-              <a:rPr/>
+            <a:pPr marL="0" lvl="0" indent="0">
+              <a:buNone/>
+            </a:pPr>
+            <a:r>
               <a:t>Example Structure/roof</a:t>
             </a:r>
           </a:p>
@@ -7052,11 +7114,10 @@
           <a:bodyPr/>
           <a:lstStyle/>
           <a:p>
-            <a:pPr lvl="0" indent="-457200" marL="457200">
-              <a:buAutoNum startAt="6" type="arabicPeriod"/>
-            </a:pPr>
-            <a:r>
-              <a:rPr/>
+            <a:pPr marL="457200" lvl="0" indent="-457200">
+              <a:buAutoNum type="arabicPeriod" startAt="6"/>
+            </a:pPr>
+            <a:r>
               <a:t>Not applicable. Characteristic does not apply to rated parcel (e.g., roof rating for parcels with no structure).</a:t>
             </a:r>
           </a:p>
@@ -7064,6 +7125,9 @@
       </p:sp>
     </p:spTree>
   </p:cSld>
+  <p:clrMapOvr>
+    <a:masterClrMapping/>
+  </p:clrMapOvr>
 </p:sld>
 </file>
 
@@ -7099,11 +7163,10 @@
           <a:bodyPr/>
           <a:lstStyle/>
           <a:p>
-            <a:pPr lvl="0" indent="0" marL="0">
-              <a:buNone/>
-            </a:pPr>
-            <a:r>
-              <a:rPr/>
+            <a:pPr marL="0" lvl="0" indent="0">
+              <a:buNone/>
+            </a:pPr>
+            <a:r>
               <a:t>Example Structure/roof</a:t>
             </a:r>
           </a:p>
@@ -7124,11 +7187,10 @@
           <a:bodyPr/>
           <a:lstStyle/>
           <a:p>
-            <a:pPr lvl="0" indent="-457200" marL="457200">
-              <a:buAutoNum startAt="7" type="arabicPeriod"/>
-            </a:pPr>
-            <a:r>
-              <a:rPr/>
+            <a:pPr marL="457200" lvl="0" indent="-457200">
+              <a:buAutoNum type="arabicPeriod" startAt="7"/>
+            </a:pPr>
+            <a:r>
               <a:t>Un-ratable. Characteristic applies to rated parcel, but rating could not be determined (e.g., structures with flat roofs, or where line of sight to roof is obscured by trees).</a:t>
             </a:r>
           </a:p>
@@ -7136,6 +7198,9 @@
       </p:sp>
     </p:spTree>
   </p:cSld>
+  <p:clrMapOvr>
+    <a:masterClrMapping/>
+  </p:clrMapOvr>
 </p:sld>
 </file>
 
@@ -7171,11 +7236,10 @@
           <a:bodyPr/>
           <a:lstStyle/>
           <a:p>
-            <a:pPr lvl="0" indent="0" marL="0">
-              <a:buNone/>
-            </a:pPr>
-            <a:r>
-              <a:rPr/>
+            <a:pPr marL="0" lvl="0" indent="0">
+              <a:buNone/>
+            </a:pPr>
+            <a:r>
               <a:t>My background</a:t>
             </a:r>
           </a:p>
@@ -7198,28 +7262,30 @@
           <a:p>
             <a:pPr lvl="0"/>
             <a:r>
-              <a:rPr/>
               <a:t>PhD in Statistics</a:t>
             </a:r>
           </a:p>
           <a:p>
             <a:pPr lvl="0"/>
             <a:r>
-              <a:rPr/>
               <a:t>Faculty member</a:t>
             </a:r>
           </a:p>
           <a:p>
             <a:pPr lvl="1"/>
             <a:r>
-              <a:rPr/>
               <a:t>Department of Biomedical and Health Informatics</a:t>
             </a:r>
           </a:p>
           <a:p>
             <a:pPr lvl="1"/>
             <a:r>
-              <a:rPr/>
+              <a:t>University of Missouri-Kansas City (UMKC)</a:t>
+            </a:r>
+          </a:p>
+          <a:p>
+            <a:pPr lvl="1"/>
+            <a:r>
               <a:t>Informal consultant with Center for Economic Information (CEI)</a:t>
             </a:r>
           </a:p>
@@ -7227,6 +7293,9 @@
       </p:sp>
     </p:spTree>
   </p:cSld>
+  <p:clrMapOvr>
+    <a:masterClrMapping/>
+  </p:clrMapOvr>
 </p:sld>
 </file>
 
@@ -7262,11 +7331,10 @@
           <a:bodyPr/>
           <a:lstStyle/>
           <a:p>
-            <a:pPr lvl="0" indent="0" marL="0">
-              <a:buNone/>
-            </a:pPr>
-            <a:r>
-              <a:rPr/>
+            <a:pPr marL="0" lvl="0" indent="0">
+              <a:buNone/>
+            </a:pPr>
+            <a:r>
               <a:t>Training</a:t>
             </a:r>
           </a:p>
@@ -7289,28 +7357,24 @@
           <a:p>
             <a:pPr lvl="0"/>
             <a:r>
-              <a:rPr/>
               <a:t>Classroom session with visual aids</a:t>
             </a:r>
           </a:p>
           <a:p>
             <a:pPr lvl="0"/>
             <a:r>
-              <a:rPr/>
               <a:t>Group discussion of a test block</a:t>
             </a:r>
           </a:p>
           <a:p>
             <a:pPr lvl="0"/>
             <a:r>
-              <a:rPr/>
               <a:t>Individual survey of two test blocks</a:t>
             </a:r>
           </a:p>
           <a:p>
             <a:pPr lvl="1"/>
             <a:r>
-              <a:rPr/>
               <a:t>Trainee ratings compared with expert</a:t>
             </a:r>
           </a:p>
@@ -7318,6 +7382,9 @@
       </p:sp>
     </p:spTree>
   </p:cSld>
+  <p:clrMapOvr>
+    <a:masterClrMapping/>
+  </p:clrMapOvr>
 </p:sld>
 </file>
 
@@ -7353,11 +7420,10 @@
           <a:bodyPr/>
           <a:lstStyle/>
           <a:p>
-            <a:pPr lvl="0" indent="0" marL="0">
-              <a:buNone/>
-            </a:pPr>
-            <a:r>
-              <a:rPr/>
+            <a:pPr marL="0" lvl="0" indent="0">
+              <a:buNone/>
+            </a:pPr>
+            <a:r>
               <a:t>Quality Control</a:t>
             </a:r>
           </a:p>
@@ -7380,28 +7446,24 @@
           <a:p>
             <a:pPr lvl="0"/>
             <a:r>
-              <a:rPr/>
               <a:t>Tow raters for every parcel</a:t>
             </a:r>
           </a:p>
           <a:p>
             <a:pPr lvl="0"/>
             <a:r>
-              <a:rPr/>
               <a:t>Two blocks randomly select from survey data</a:t>
             </a:r>
           </a:p>
           <a:p>
             <a:pPr lvl="1"/>
             <a:r>
-              <a:rPr/>
               <a:t>Qualitative agreement on classification data</a:t>
             </a:r>
           </a:p>
           <a:p>
             <a:pPr lvl="1"/>
             <a:r>
-              <a:rPr/>
               <a:t>Quantitative agreement on condition data</a:t>
             </a:r>
           </a:p>
@@ -7409,6 +7471,9 @@
       </p:sp>
     </p:spTree>
   </p:cSld>
+  <p:clrMapOvr>
+    <a:masterClrMapping/>
+  </p:clrMapOvr>
 </p:sld>
 </file>
 
@@ -7444,11 +7509,10 @@
           <a:bodyPr/>
           <a:lstStyle/>
           <a:p>
-            <a:pPr lvl="0" indent="0" marL="0">
-              <a:buNone/>
-            </a:pPr>
-            <a:r>
-              <a:rPr/>
+            <a:pPr marL="0" lvl="0" indent="0">
+              <a:buNone/>
+            </a:pPr>
+            <a:r>
               <a:t>Who uses the NHCS</a:t>
             </a:r>
           </a:p>
@@ -7471,49 +7535,42 @@
           <a:p>
             <a:pPr lvl="0"/>
             <a:r>
-              <a:rPr/>
               <a:t>Community development corporations</a:t>
             </a:r>
           </a:p>
           <a:p>
             <a:pPr lvl="0"/>
             <a:r>
-              <a:rPr/>
               <a:t>City urban planners</a:t>
             </a:r>
           </a:p>
           <a:p>
             <a:pPr lvl="0"/>
             <a:r>
-              <a:rPr/>
               <a:t>Real estate agencies</a:t>
             </a:r>
           </a:p>
           <a:p>
             <a:pPr lvl="0"/>
             <a:r>
-              <a:rPr/>
               <a:t>Mortgage bankers</a:t>
             </a:r>
           </a:p>
           <a:p>
             <a:pPr lvl="0"/>
             <a:r>
-              <a:rPr/>
               <a:t>Construction contractors</a:t>
             </a:r>
           </a:p>
           <a:p>
             <a:pPr lvl="0"/>
             <a:r>
-              <a:rPr/>
               <a:t>Insurance companies</a:t>
             </a:r>
           </a:p>
           <a:p>
             <a:pPr lvl="0"/>
             <a:r>
-              <a:rPr/>
               <a:t>Neighborhood and community associations</a:t>
             </a:r>
           </a:p>
@@ -7521,6 +7578,9 @@
       </p:sp>
     </p:spTree>
   </p:cSld>
+  <p:clrMapOvr>
+    <a:masterClrMapping/>
+  </p:clrMapOvr>
 </p:sld>
 </file>
 
@@ -7556,11 +7616,10 @@
           <a:bodyPr/>
           <a:lstStyle/>
           <a:p>
-            <a:pPr lvl="0" indent="0" marL="0">
-              <a:buNone/>
-            </a:pPr>
-            <a:r>
-              <a:rPr/>
+            <a:pPr marL="0" lvl="0" indent="0">
+              <a:buNone/>
+            </a:pPr>
+            <a:r>
               <a:t>Research applications of the NHCS</a:t>
             </a:r>
           </a:p>
@@ -7583,28 +7642,24 @@
           <a:p>
             <a:pPr lvl="0"/>
             <a:r>
-              <a:rPr/>
               <a:t>Data at the finest level of detail</a:t>
             </a:r>
           </a:p>
           <a:p>
             <a:pPr lvl="0"/>
             <a:r>
-              <a:rPr/>
               <a:t>Easy to incorporate with higher level geographies</a:t>
             </a:r>
           </a:p>
           <a:p>
             <a:pPr lvl="0"/>
             <a:r>
-              <a:rPr/>
               <a:t>Easy to link with other records</a:t>
             </a:r>
           </a:p>
           <a:p>
             <a:pPr lvl="1"/>
             <a:r>
-              <a:rPr/>
               <a:t>Electronic health records</a:t>
             </a:r>
           </a:p>
@@ -7612,6 +7667,9 @@
       </p:sp>
     </p:spTree>
   </p:cSld>
+  <p:clrMapOvr>
+    <a:masterClrMapping/>
+  </p:clrMapOvr>
 </p:sld>
 </file>
 
@@ -7647,11 +7705,10 @@
           <a:bodyPr/>
           <a:lstStyle/>
           <a:p>
-            <a:pPr lvl="0" indent="0" marL="0">
-              <a:buNone/>
-            </a:pPr>
-            <a:r>
-              <a:rPr/>
+            <a:pPr marL="0" lvl="0" indent="0">
+              <a:buNone/>
+            </a:pPr>
+            <a:r>
               <a:t>Areas covered by the NHCS</a:t>
             </a:r>
           </a:p>
@@ -7659,7 +7716,7 @@
       </p:sp>
       <p:pic>
         <p:nvPicPr>
-          <p:cNvPr descr="fig:  NHCS_FullExtent.jpg" id="0" name="Picture 1"/>
+          <p:cNvPr id="3" name="Picture 1" descr="fig:  NHCS_FullExtent.jpg"/>
           <p:cNvPicPr>
             <a:picLocks noGrp="1" noChangeAspect="1"/>
           </p:cNvPicPr>
@@ -7689,7 +7746,7 @@
       </p:pic>
       <p:sp>
         <p:nvSpPr>
-          <p:cNvPr id="1" name="TextBox 3"/>
+          <p:cNvPr id="4" name="TextBox 3"/>
           <p:cNvSpPr txBox="1"/>
           <p:nvPr/>
         </p:nvSpPr>
@@ -7707,11 +7764,10 @@
           <a:bodyPr/>
           <a:lstStyle/>
           <a:p>
-            <a:pPr lvl="0" indent="0" marL="0" algn="ctr">
-              <a:buNone/>
-            </a:pPr>
-            <a:r>
-              <a:rPr/>
+            <a:pPr marL="0" lvl="0" indent="0" algn="ctr">
+              <a:buNone/>
+            </a:pPr>
+            <a:r>
               <a:t>Figure 1. Map of NHCS locations</a:t>
             </a:r>
           </a:p>
@@ -7719,6 +7775,9 @@
       </p:sp>
     </p:spTree>
   </p:cSld>
+  <p:clrMapOvr>
+    <a:masterClrMapping/>
+  </p:clrMapOvr>
 </p:sld>
 </file>
 
@@ -7754,11 +7813,10 @@
           <a:bodyPr/>
           <a:lstStyle/>
           <a:p>
-            <a:pPr lvl="0" indent="0" marL="0">
-              <a:buNone/>
-            </a:pPr>
-            <a:r>
-              <a:rPr/>
+            <a:pPr marL="0" lvl="0" indent="0">
+              <a:buNone/>
+            </a:pPr>
+            <a:r>
               <a:t>Advantages of using NHCS</a:t>
             </a:r>
           </a:p>
@@ -7781,35 +7839,30 @@
           <a:p>
             <a:pPr lvl="0"/>
             <a:r>
-              <a:rPr/>
               <a:t>Fast and inexpensive</a:t>
             </a:r>
           </a:p>
           <a:p>
             <a:pPr lvl="1"/>
             <a:r>
-              <a:rPr/>
               <a:t>Estimated total costs $6.50 per parcel</a:t>
             </a:r>
           </a:p>
           <a:p>
             <a:pPr lvl="0"/>
             <a:r>
-              <a:rPr/>
               <a:t>Simple ethical review</a:t>
             </a:r>
           </a:p>
           <a:p>
             <a:pPr lvl="1"/>
             <a:r>
-              <a:rPr/>
               <a:t>Observation in a public setting</a:t>
             </a:r>
           </a:p>
           <a:p>
             <a:pPr lvl="0"/>
             <a:r>
-              <a:rPr/>
               <a:t>Detailed training and quality control</a:t>
             </a:r>
           </a:p>
@@ -7824,6 +7877,9 @@
       </p:sp>
     </p:spTree>
   </p:cSld>
+  <p:clrMapOvr>
+    <a:masterClrMapping/>
+  </p:clrMapOvr>
 </p:sld>
 </file>
 
@@ -7859,11 +7915,10 @@
           <a:bodyPr/>
           <a:lstStyle/>
           <a:p>
-            <a:pPr lvl="0" indent="0" marL="0">
-              <a:buNone/>
-            </a:pPr>
-            <a:r>
-              <a:rPr/>
+            <a:pPr marL="0" lvl="0" indent="0">
+              <a:buNone/>
+            </a:pPr>
+            <a:r>
               <a:t>Linking NHCS data with acute asthma visits</a:t>
             </a:r>
           </a:p>
@@ -7871,7 +7926,7 @@
       </p:sp>
       <p:pic>
         <p:nvPicPr>
-          <p:cNvPr descr="fig:  natalie-kane-square.png" id="0" name="Picture 1"/>
+          <p:cNvPr id="3" name="Picture 1" descr="fig:  natalie-kane-square.png"/>
           <p:cNvPicPr>
             <a:picLocks noGrp="1" noChangeAspect="1"/>
           </p:cNvPicPr>
@@ -7901,7 +7956,7 @@
       </p:pic>
       <p:sp>
         <p:nvSpPr>
-          <p:cNvPr id="1" name="TextBox 3"/>
+          <p:cNvPr id="4" name="TextBox 3"/>
           <p:cNvSpPr txBox="1"/>
           <p:nvPr/>
         </p:nvSpPr>
@@ -7919,11 +7974,10 @@
           <a:bodyPr/>
           <a:lstStyle/>
           <a:p>
-            <a:pPr lvl="0" indent="0" marL="0" algn="ctr">
-              <a:buNone/>
-            </a:pPr>
-            <a:r>
-              <a:rPr/>
+            <a:pPr marL="0" lvl="0" indent="0" algn="ctr">
+              <a:buNone/>
+            </a:pPr>
+            <a:r>
               <a:t>Figure 2. Dr. Natalie Kane</a:t>
             </a:r>
           </a:p>
@@ -7931,6 +7985,9 @@
       </p:sp>
     </p:spTree>
   </p:cSld>
+  <p:clrMapOvr>
+    <a:masterClrMapping/>
+  </p:clrMapOvr>
 </p:sld>
 </file>
 
@@ -7966,11 +8023,10 @@
           <a:bodyPr/>
           <a:lstStyle/>
           <a:p>
-            <a:pPr lvl="0" indent="0" marL="0">
-              <a:buNone/>
-            </a:pPr>
-            <a:r>
-              <a:rPr/>
+            <a:pPr marL="0" lvl="0" indent="0">
+              <a:buNone/>
+            </a:pPr>
+            <a:r>
               <a:t>Linking NHCS data with elevated blood lead levels</a:t>
             </a:r>
           </a:p>
@@ -7978,7 +8034,7 @@
       </p:sp>
       <p:pic>
         <p:nvPicPr>
-          <p:cNvPr descr="fig:  neal-wilson-square.png" id="0" name="Picture 1"/>
+          <p:cNvPr id="3" name="Picture 1" descr="fig:  neal-wilson-square.png"/>
           <p:cNvPicPr>
             <a:picLocks noGrp="1" noChangeAspect="1"/>
           </p:cNvPicPr>
@@ -8008,7 +8064,7 @@
       </p:pic>
       <p:sp>
         <p:nvSpPr>
-          <p:cNvPr id="1" name="TextBox 3"/>
+          <p:cNvPr id="4" name="TextBox 3"/>
           <p:cNvSpPr txBox="1"/>
           <p:nvPr/>
         </p:nvSpPr>
@@ -8026,11 +8082,10 @@
           <a:bodyPr/>
           <a:lstStyle/>
           <a:p>
-            <a:pPr lvl="0" indent="0" marL="0" algn="ctr">
-              <a:buNone/>
-            </a:pPr>
-            <a:r>
-              <a:rPr/>
+            <a:pPr marL="0" lvl="0" indent="0" algn="ctr">
+              <a:buNone/>
+            </a:pPr>
+            <a:r>
               <a:t>Figure 3. Dr. Neal Wilson</a:t>
             </a:r>
           </a:p>
@@ -8038,6 +8093,9 @@
       </p:sp>
     </p:spTree>
   </p:cSld>
+  <p:clrMapOvr>
+    <a:masterClrMapping/>
+  </p:clrMapOvr>
 </p:sld>
 </file>
 
@@ -8073,11 +8131,10 @@
           <a:bodyPr/>
           <a:lstStyle/>
           <a:p>
-            <a:pPr lvl="0" indent="0" marL="0">
-              <a:buNone/>
-            </a:pPr>
-            <a:r>
-              <a:rPr/>
+            <a:pPr marL="0" lvl="0" indent="0">
+              <a:buNone/>
+            </a:pPr>
+            <a:r>
               <a:t>Housing data using just era of construction</a:t>
             </a:r>
           </a:p>
@@ -8085,7 +8142,7 @@
       </p:sp>
       <p:pic>
         <p:nvPicPr>
-          <p:cNvPr descr="fig:  housing-map-1.png" id="0" name="Picture 1"/>
+          <p:cNvPr id="3" name="Picture 1" descr="fig:  housing-map-1.png"/>
           <p:cNvPicPr>
             <a:picLocks noGrp="1" noChangeAspect="1"/>
           </p:cNvPicPr>
@@ -8115,7 +8172,7 @@
       </p:pic>
       <p:sp>
         <p:nvSpPr>
-          <p:cNvPr id="1" name="TextBox 3"/>
+          <p:cNvPr id="4" name="TextBox 3"/>
           <p:cNvSpPr txBox="1"/>
           <p:nvPr/>
         </p:nvSpPr>
@@ -8133,11 +8190,10 @@
           <a:bodyPr/>
           <a:lstStyle/>
           <a:p>
-            <a:pPr lvl="0" indent="0" marL="0" algn="ctr">
-              <a:buNone/>
-            </a:pPr>
-            <a:r>
-              <a:rPr/>
+            <a:pPr marL="0" lvl="0" indent="0" algn="ctr">
+              <a:buNone/>
+            </a:pPr>
+            <a:r>
               <a:t>Figure 4. Housing data coded by era of construction</a:t>
             </a:r>
           </a:p>
@@ -8145,6 +8201,9 @@
       </p:sp>
     </p:spTree>
   </p:cSld>
+  <p:clrMapOvr>
+    <a:masterClrMapping/>
+  </p:clrMapOvr>
 </p:sld>
 </file>
 
@@ -8180,11 +8239,10 @@
           <a:bodyPr/>
           <a:lstStyle/>
           <a:p>
-            <a:pPr lvl="0" indent="0" marL="0">
-              <a:buNone/>
-            </a:pPr>
-            <a:r>
-              <a:rPr/>
+            <a:pPr marL="0" lvl="0" indent="0">
+              <a:buNone/>
+            </a:pPr>
+            <a:r>
               <a:t>Housing data incorporating NHCS data</a:t>
             </a:r>
           </a:p>
@@ -8192,7 +8250,7 @@
       </p:sp>
       <p:pic>
         <p:nvPicPr>
-          <p:cNvPr descr="fig:  housing-map-2.png" id="0" name="Picture 1"/>
+          <p:cNvPr id="3" name="Picture 1" descr="fig:  housing-map-2.png"/>
           <p:cNvPicPr>
             <a:picLocks noGrp="1" noChangeAspect="1"/>
           </p:cNvPicPr>
@@ -8222,7 +8280,7 @@
       </p:pic>
       <p:sp>
         <p:nvSpPr>
-          <p:cNvPr id="1" name="TextBox 3"/>
+          <p:cNvPr id="4" name="TextBox 3"/>
           <p:cNvSpPr txBox="1"/>
           <p:nvPr/>
         </p:nvSpPr>
@@ -8240,11 +8298,10 @@
           <a:bodyPr/>
           <a:lstStyle/>
           <a:p>
-            <a:pPr lvl="0" indent="0" marL="0" algn="ctr">
-              <a:buNone/>
-            </a:pPr>
-            <a:r>
-              <a:rPr/>
+            <a:pPr marL="0" lvl="0" indent="0" algn="ctr">
+              <a:buNone/>
+            </a:pPr>
+            <a:r>
               <a:t>Figure 5. Housing data coded using NHCS data</a:t>
             </a:r>
           </a:p>
@@ -8252,6 +8309,9 @@
       </p:sp>
     </p:spTree>
   </p:cSld>
+  <p:clrMapOvr>
+    <a:masterClrMapping/>
+  </p:clrMapOvr>
 </p:sld>
 </file>
 
@@ -8287,11 +8347,10 @@
           <a:bodyPr/>
           <a:lstStyle/>
           <a:p>
-            <a:pPr lvl="0" indent="0" marL="0">
-              <a:buNone/>
-            </a:pPr>
-            <a:r>
-              <a:rPr/>
+            <a:pPr marL="0" lvl="0" indent="0">
+              <a:buNone/>
+            </a:pPr>
+            <a:r>
               <a:t>Acknowledgements</a:t>
             </a:r>
           </a:p>
@@ -8314,42 +8373,36 @@
           <a:p>
             <a:pPr lvl="0"/>
             <a:r>
-              <a:rPr/>
               <a:t>Children’s Mercy Hospital</a:t>
             </a:r>
           </a:p>
           <a:p>
             <a:pPr lvl="1"/>
             <a:r>
-              <a:rPr/>
               <a:t>Ryan Allenbrand, Healthy Home Program Manager</a:t>
             </a:r>
           </a:p>
           <a:p>
             <a:pPr lvl="1"/>
             <a:r>
-              <a:rPr/>
               <a:t>Elizabeth Friedman, Medical Director of Environmental Health</a:t>
             </a:r>
           </a:p>
           <a:p>
             <a:pPr lvl="1"/>
             <a:r>
-              <a:rPr/>
               <a:t>Kevin Kennedy, Environmental Health Program Director</a:t>
             </a:r>
           </a:p>
           <a:p>
             <a:pPr lvl="0"/>
             <a:r>
-              <a:rPr/>
               <a:t>Kansas City, Missouri Department of Health</a:t>
             </a:r>
           </a:p>
           <a:p>
             <a:pPr lvl="1"/>
             <a:r>
-              <a:rPr/>
               <a:t>Amy Roberts, Director, Childhood Lead Poisoning Prevention Program</a:t>
             </a:r>
           </a:p>
@@ -8357,6 +8410,9 @@
       </p:sp>
     </p:spTree>
   </p:cSld>
+  <p:clrMapOvr>
+    <a:masterClrMapping/>
+  </p:clrMapOvr>
 </p:sld>
 </file>
 
@@ -8392,11 +8448,10 @@
           <a:bodyPr/>
           <a:lstStyle/>
           <a:p>
-            <a:pPr lvl="0" indent="0" marL="0">
-              <a:buNone/>
-            </a:pPr>
-            <a:r>
-              <a:rPr/>
+            <a:pPr marL="0" lvl="0" indent="0">
+              <a:buNone/>
+            </a:pPr>
+            <a:r>
               <a:t>Location of current NHCS surveys</a:t>
             </a:r>
           </a:p>
@@ -8404,7 +8459,7 @@
       </p:sp>
       <p:pic>
         <p:nvPicPr>
-          <p:cNvPr descr="fig:  new-nhcs-surveys.png" id="0" name="Picture 1"/>
+          <p:cNvPr id="3" name="Picture 1" descr="fig:  new-nhcs-surveys.png"/>
           <p:cNvPicPr>
             <a:picLocks noGrp="1" noChangeAspect="1"/>
           </p:cNvPicPr>
@@ -8434,7 +8489,7 @@
       </p:pic>
       <p:sp>
         <p:nvSpPr>
-          <p:cNvPr id="1" name="TextBox 3"/>
+          <p:cNvPr id="4" name="TextBox 3"/>
           <p:cNvSpPr txBox="1"/>
           <p:nvPr/>
         </p:nvSpPr>
@@ -8452,11 +8507,10 @@
           <a:bodyPr/>
           <a:lstStyle/>
           <a:p>
-            <a:pPr lvl="0" indent="0" marL="0" algn="ctr">
-              <a:buNone/>
-            </a:pPr>
-            <a:r>
-              <a:rPr/>
+            <a:pPr marL="0" lvl="0" indent="0" algn="ctr">
+              <a:buNone/>
+            </a:pPr>
+            <a:r>
               <a:t>Figure 6. Map of current NHCS surveys</a:t>
             </a:r>
           </a:p>
@@ -8464,6 +8518,9 @@
       </p:sp>
     </p:spTree>
   </p:cSld>
+  <p:clrMapOvr>
+    <a:masterClrMapping/>
+  </p:clrMapOvr>
 </p:sld>
 </file>
 
@@ -8499,11 +8556,10 @@
           <a:bodyPr/>
           <a:lstStyle/>
           <a:p>
-            <a:pPr lvl="0" indent="0" marL="0">
-              <a:buNone/>
-            </a:pPr>
-            <a:r>
-              <a:rPr/>
+            <a:pPr marL="0" lvl="0" indent="0">
+              <a:buNone/>
+            </a:pPr>
+            <a:r>
               <a:t>Possible future applications of the NHCS</a:t>
             </a:r>
           </a:p>
@@ -8526,35 +8582,30 @@
           <a:p>
             <a:pPr lvl="0"/>
             <a:r>
-              <a:rPr/>
               <a:t>Just a few of many possibilities</a:t>
             </a:r>
           </a:p>
           <a:p>
             <a:pPr lvl="1"/>
             <a:r>
-              <a:rPr/>
               <a:t>Other health outcomes affected by housing quality</a:t>
             </a:r>
           </a:p>
           <a:p>
             <a:pPr lvl="1"/>
             <a:r>
-              <a:rPr/>
               <a:t>Training data for deep learning models</a:t>
             </a:r>
           </a:p>
           <a:p>
             <a:pPr lvl="1"/>
             <a:r>
-              <a:rPr/>
               <a:t>Replication in other communities</a:t>
             </a:r>
           </a:p>
           <a:p>
             <a:pPr lvl="0"/>
             <a:r>
-              <a:rPr/>
               <a:t>Want to learn more?</a:t>
             </a:r>
           </a:p>
@@ -8564,7 +8615,7 @@
               <a:rPr>
                 <a:hlinkClick r:id="rId3"/>
               </a:rPr>
-              <a:t>https://github.com/pmean/talks/nhcs</a:t>
+              <a:t>https://github.com/pmean/talks/tree/master/nhcs</a:t>
             </a:r>
           </a:p>
           <a:p>
@@ -8580,6 +8631,9 @@
       </p:sp>
     </p:spTree>
   </p:cSld>
+  <p:clrMapOvr>
+    <a:masterClrMapping/>
+  </p:clrMapOvr>
 </p:sld>
 </file>
 
@@ -8615,11 +8669,10 @@
           <a:bodyPr/>
           <a:lstStyle/>
           <a:p>
-            <a:pPr lvl="0" indent="0" marL="0">
-              <a:buNone/>
-            </a:pPr>
-            <a:r>
-              <a:rPr/>
+            <a:pPr marL="0" lvl="0" indent="0">
+              <a:buNone/>
+            </a:pPr>
+            <a:r>
               <a:t>Acknowledgements</a:t>
             </a:r>
           </a:p>
@@ -8642,42 +8695,36 @@
           <a:p>
             <a:pPr lvl="0"/>
             <a:r>
-              <a:rPr/>
               <a:t>University of Missouri-Kansas City</a:t>
             </a:r>
           </a:p>
           <a:p>
             <a:pPr lvl="1"/>
             <a:r>
-              <a:rPr/>
               <a:t>Matthew Applebury, Satya Golla, Chinedu Isoh, Mounika Reddy Jakkidi, Brian Matlock, Nomuunzul Munkhjargal, Lori Reierson, Matthew Robinson, Vishal Vejendla, graduate students</a:t>
             </a:r>
           </a:p>
           <a:p>
             <a:pPr lvl="1"/>
             <a:r>
-              <a:rPr/>
               <a:t>Doug Bowles, Past Director, Center for Economic Information (retired)</a:t>
             </a:r>
           </a:p>
           <a:p>
             <a:pPr lvl="1"/>
             <a:r>
-              <a:rPr/>
               <a:t>Taki Manolakos, Past Director, Center for Economic Information</a:t>
             </a:r>
           </a:p>
           <a:p>
             <a:pPr lvl="1"/>
             <a:r>
-              <a:rPr/>
               <a:t>Ricardo Moniz, Education Program Coordinator for Biomedical and Health Informatics</a:t>
             </a:r>
           </a:p>
           <a:p>
             <a:pPr lvl="1"/>
             <a:r>
-              <a:rPr/>
               <a:t>Neal Wilson, Deputy Director, Center for Economic Information</a:t>
             </a:r>
           </a:p>
@@ -8685,6 +8732,9 @@
       </p:sp>
     </p:spTree>
   </p:cSld>
+  <p:clrMapOvr>
+    <a:masterClrMapping/>
+  </p:clrMapOvr>
 </p:sld>
 </file>
 
@@ -8720,11 +8770,10 @@
           <a:bodyPr/>
           <a:lstStyle/>
           <a:p>
-            <a:pPr lvl="0" indent="0" marL="0">
-              <a:buNone/>
-            </a:pPr>
-            <a:r>
-              <a:rPr/>
+            <a:pPr marL="0" lvl="0" indent="0">
+              <a:buNone/>
+            </a:pPr>
+            <a:r>
               <a:t>Impact Lead-Kansas City grant</a:t>
             </a:r>
           </a:p>
@@ -8747,35 +8796,30 @@
           <a:p>
             <a:pPr lvl="0"/>
             <a:r>
-              <a:rPr/>
               <a:t>Lead Technical Study funded by HUD</a:t>
             </a:r>
           </a:p>
           <a:p>
             <a:pPr lvl="0"/>
             <a:r>
-              <a:rPr/>
               <a:t>Three years, $700,000</a:t>
             </a:r>
           </a:p>
           <a:p>
             <a:pPr lvl="0"/>
             <a:r>
-              <a:rPr/>
               <a:t>Aim 1, retrospective review of lead remediation efforts</a:t>
             </a:r>
           </a:p>
           <a:p>
             <a:pPr lvl="0"/>
             <a:r>
-              <a:rPr/>
               <a:t>Aim 2, prospective identification of houses at risk for lead contamination</a:t>
             </a:r>
           </a:p>
           <a:p>
             <a:pPr lvl="1"/>
             <a:r>
-              <a:rPr/>
               <a:t>Use of Neighborhood Housing Conditions Survey</a:t>
             </a:r>
           </a:p>
@@ -8790,6 +8834,9 @@
       </p:sp>
     </p:spTree>
   </p:cSld>
+  <p:clrMapOvr>
+    <a:masterClrMapping/>
+  </p:clrMapOvr>
 </p:sld>
 </file>
 
@@ -8825,11 +8872,10 @@
           <a:bodyPr/>
           <a:lstStyle/>
           <a:p>
-            <a:pPr lvl="0" indent="0" marL="0">
-              <a:buNone/>
-            </a:pPr>
-            <a:r>
-              <a:rPr/>
+            <a:pPr marL="0" lvl="0" indent="0">
+              <a:buNone/>
+            </a:pPr>
+            <a:r>
               <a:t>Overview of the Neighborhood Housing Conditions Survey (NHCS)</a:t>
             </a:r>
           </a:p>
@@ -8852,21 +8898,18 @@
           <a:p>
             <a:pPr lvl="0"/>
             <a:r>
-              <a:rPr/>
               <a:t>Windshield survey</a:t>
             </a:r>
           </a:p>
           <a:p>
             <a:pPr lvl="0"/>
             <a:r>
-              <a:rPr/>
               <a:t>Features visible at street level</a:t>
             </a:r>
           </a:p>
           <a:p>
             <a:pPr lvl="0"/>
             <a:r>
-              <a:rPr/>
               <a:t>Collection primarily of residential parcels</a:t>
             </a:r>
           </a:p>
@@ -8874,6 +8917,9 @@
       </p:sp>
     </p:spTree>
   </p:cSld>
+  <p:clrMapOvr>
+    <a:masterClrMapping/>
+  </p:clrMapOvr>
 </p:sld>
 </file>
 
@@ -8909,11 +8955,10 @@
           <a:bodyPr/>
           <a:lstStyle/>
           <a:p>
-            <a:pPr lvl="0" indent="0" marL="0">
-              <a:buNone/>
-            </a:pPr>
-            <a:r>
-              <a:rPr/>
+            <a:pPr marL="0" lvl="0" indent="0">
+              <a:buNone/>
+            </a:pPr>
+            <a:r>
               <a:t>NHCS classification data</a:t>
             </a:r>
           </a:p>
@@ -8936,35 +8981,30 @@
           <a:p>
             <a:pPr lvl="0"/>
             <a:r>
-              <a:rPr/>
               <a:t>Structure type,</a:t>
             </a:r>
           </a:p>
           <a:p>
             <a:pPr lvl="0"/>
             <a:r>
-              <a:rPr/>
               <a:t>Use type,</a:t>
             </a:r>
           </a:p>
           <a:p>
             <a:pPr lvl="0"/>
             <a:r>
-              <a:rPr/>
               <a:t>Residential type,</a:t>
             </a:r>
           </a:p>
           <a:p>
             <a:pPr lvl="0"/>
             <a:r>
-              <a:rPr/>
               <a:t>Structure profile, and</a:t>
             </a:r>
           </a:p>
           <a:p>
             <a:pPr lvl="0"/>
             <a:r>
-              <a:rPr/>
               <a:t>Visible address</a:t>
             </a:r>
           </a:p>
@@ -8972,6 +9012,9 @@
       </p:sp>
     </p:spTree>
   </p:cSld>
+  <p:clrMapOvr>
+    <a:masterClrMapping/>
+  </p:clrMapOvr>
 </p:sld>
 </file>
 
@@ -9007,11 +9050,10 @@
           <a:bodyPr/>
           <a:lstStyle/>
           <a:p>
-            <a:pPr lvl="0" indent="0" marL="0">
-              <a:buNone/>
-            </a:pPr>
-            <a:r>
-              <a:rPr/>
+            <a:pPr marL="0" lvl="0" indent="0">
+              <a:buNone/>
+            </a:pPr>
+            <a:r>
               <a:t>NHCS conditions data</a:t>
             </a:r>
           </a:p>
@@ -9034,28 +9076,24 @@
           <a:p>
             <a:pPr lvl="0"/>
             <a:r>
-              <a:rPr/>
               <a:t>Fifteen ratings</a:t>
             </a:r>
           </a:p>
           <a:p>
             <a:pPr lvl="1"/>
             <a:r>
-              <a:rPr/>
               <a:t>Structure</a:t>
             </a:r>
           </a:p>
           <a:p>
             <a:pPr lvl="1"/>
             <a:r>
-              <a:rPr/>
               <a:t>Grounds</a:t>
             </a:r>
           </a:p>
           <a:p>
             <a:pPr lvl="1"/>
             <a:r>
-              <a:rPr/>
               <a:t>Infrastructure</a:t>
             </a:r>
           </a:p>
@@ -9063,6 +9101,9 @@
       </p:sp>
     </p:spTree>
   </p:cSld>
+  <p:clrMapOvr>
+    <a:masterClrMapping/>
+  </p:clrMapOvr>
 </p:sld>
 </file>
 
@@ -9098,11 +9139,10 @@
           <a:bodyPr/>
           <a:lstStyle/>
           <a:p>
-            <a:pPr lvl="0" indent="0" marL="0">
-              <a:buNone/>
-            </a:pPr>
-            <a:r>
-              <a:rPr/>
+            <a:pPr marL="0" lvl="0" indent="0">
+              <a:buNone/>
+            </a:pPr>
+            <a:r>
               <a:t>NHCS conditions data on structure</a:t>
             </a:r>
           </a:p>
@@ -9125,35 +9165,30 @@
           <a:p>
             <a:pPr lvl="0"/>
             <a:r>
-              <a:rPr/>
               <a:t>Roof</a:t>
             </a:r>
           </a:p>
           <a:p>
             <a:pPr lvl="0"/>
             <a:r>
-              <a:rPr/>
               <a:t>Foundation/walls</a:t>
             </a:r>
           </a:p>
           <a:p>
             <a:pPr lvl="0"/>
             <a:r>
-              <a:rPr/>
               <a:t>Windows/doors</a:t>
             </a:r>
           </a:p>
           <a:p>
             <a:pPr lvl="0"/>
             <a:r>
-              <a:rPr/>
               <a:t>Porch</a:t>
             </a:r>
           </a:p>
           <a:p>
             <a:pPr lvl="0"/>
             <a:r>
-              <a:rPr/>
               <a:t>Exterior Paint</a:t>
             </a:r>
           </a:p>
@@ -9161,6 +9196,9 @@
       </p:sp>
     </p:spTree>
   </p:cSld>
+  <p:clrMapOvr>
+    <a:masterClrMapping/>
+  </p:clrMapOvr>
 </p:sld>
 </file>
 

</xml_diff>